<commit_message>
added fitness landscape bubbles
</commit_message>
<xml_diff>
--- a/poster.pptx
+++ b/poster.pptx
@@ -3319,7 +3319,7 @@
         <p:spPr bwMode="auto">
           <a:xfrm>
             <a:off x="29307712" y="6748834"/>
-            <a:ext cx="11520000" cy="20555177"/>
+            <a:ext cx="11520000" cy="19894425"/>
           </a:xfrm>
           <a:prstGeom prst="rect">
             <a:avLst/>
@@ -4478,7 +4478,7 @@
         </p:nvSpPr>
         <p:spPr bwMode="auto">
           <a:xfrm>
-            <a:off x="15914893" y="28060050"/>
+            <a:off x="14257884" y="28299444"/>
             <a:ext cx="11520000" cy="13368417"/>
           </a:xfrm>
           <a:prstGeom prst="rect">
@@ -4628,454 +4628,6 @@
       </p:sp>
       <p:sp>
         <p:nvSpPr>
-          <p:cNvPr id="46" name="Text Box 13"/>
-          <p:cNvSpPr txBox="1">
-            <a:spLocks noChangeArrowheads="1"/>
-          </p:cNvSpPr>
-          <p:nvPr/>
-        </p:nvSpPr>
-        <p:spPr bwMode="auto">
-          <a:xfrm>
-            <a:off x="15914068" y="6748834"/>
-            <a:ext cx="11520000" cy="6866365"/>
-          </a:xfrm>
-          <a:prstGeom prst="rect">
-            <a:avLst/>
-          </a:prstGeom>
-          <a:solidFill>
-            <a:srgbClr val="FFFFFF"/>
-          </a:solidFill>
-          <a:ln w="12700">
-            <a:solidFill>
-              <a:srgbClr val="4D4D4D"/>
-            </a:solidFill>
-            <a:miter lim="800000"/>
-            <a:headEnd/>
-            <a:tailEnd/>
-          </a:ln>
-        </p:spPr>
-        <p:txBody>
-          <a:bodyPr lIns="908920" tIns="454461" rIns="908920" bIns="908920"/>
-          <a:lstStyle>
-            <a:lvl1pPr eaLnBrk="0" hangingPunct="0">
-              <a:tabLst>
-                <a:tab pos="635000" algn="l"/>
-              </a:tabLst>
-              <a:defRPr sz="3200">
-                <a:solidFill>
-                  <a:schemeClr val="tx1"/>
-                </a:solidFill>
-                <a:latin typeface="Helvetica" pitchFamily="-111" charset="0"/>
-                <a:ea typeface="ＭＳ Ｐゴシック" pitchFamily="-111" charset="-128"/>
-              </a:defRPr>
-            </a:lvl1pPr>
-            <a:lvl2pPr marL="37931725" indent="-37474525" eaLnBrk="0" hangingPunct="0">
-              <a:tabLst>
-                <a:tab pos="635000" algn="l"/>
-              </a:tabLst>
-              <a:defRPr sz="3200">
-                <a:solidFill>
-                  <a:schemeClr val="tx1"/>
-                </a:solidFill>
-                <a:latin typeface="Helvetica" pitchFamily="-111" charset="0"/>
-                <a:ea typeface="ＭＳ Ｐゴシック" pitchFamily="-111" charset="-128"/>
-              </a:defRPr>
-            </a:lvl2pPr>
-            <a:lvl3pPr eaLnBrk="0" hangingPunct="0">
-              <a:tabLst>
-                <a:tab pos="635000" algn="l"/>
-              </a:tabLst>
-              <a:defRPr sz="3200">
-                <a:solidFill>
-                  <a:schemeClr val="tx1"/>
-                </a:solidFill>
-                <a:latin typeface="Helvetica" pitchFamily="-111" charset="0"/>
-                <a:ea typeface="ＭＳ Ｐゴシック" pitchFamily="-111" charset="-128"/>
-              </a:defRPr>
-            </a:lvl3pPr>
-            <a:lvl4pPr eaLnBrk="0" hangingPunct="0">
-              <a:tabLst>
-                <a:tab pos="635000" algn="l"/>
-              </a:tabLst>
-              <a:defRPr sz="3200">
-                <a:solidFill>
-                  <a:schemeClr val="tx1"/>
-                </a:solidFill>
-                <a:latin typeface="Helvetica" pitchFamily="-111" charset="0"/>
-                <a:ea typeface="ＭＳ Ｐゴシック" pitchFamily="-111" charset="-128"/>
-              </a:defRPr>
-            </a:lvl4pPr>
-            <a:lvl5pPr eaLnBrk="0" hangingPunct="0">
-              <a:tabLst>
-                <a:tab pos="635000" algn="l"/>
-              </a:tabLst>
-              <a:defRPr sz="3200">
-                <a:solidFill>
-                  <a:schemeClr val="tx1"/>
-                </a:solidFill>
-                <a:latin typeface="Helvetica" pitchFamily="-111" charset="0"/>
-                <a:ea typeface="ＭＳ Ｐゴシック" pitchFamily="-111" charset="-128"/>
-              </a:defRPr>
-            </a:lvl5pPr>
-            <a:lvl6pPr marL="457200" eaLnBrk="0" fontAlgn="base" hangingPunct="0">
-              <a:spcBef>
-                <a:spcPct val="0"/>
-              </a:spcBef>
-              <a:spcAft>
-                <a:spcPct val="0"/>
-              </a:spcAft>
-              <a:tabLst>
-                <a:tab pos="635000" algn="l"/>
-              </a:tabLst>
-              <a:defRPr sz="3200">
-                <a:solidFill>
-                  <a:schemeClr val="tx1"/>
-                </a:solidFill>
-                <a:latin typeface="Helvetica" pitchFamily="-111" charset="0"/>
-                <a:ea typeface="ＭＳ Ｐゴシック" pitchFamily="-111" charset="-128"/>
-              </a:defRPr>
-            </a:lvl6pPr>
-            <a:lvl7pPr marL="914400" eaLnBrk="0" fontAlgn="base" hangingPunct="0">
-              <a:spcBef>
-                <a:spcPct val="0"/>
-              </a:spcBef>
-              <a:spcAft>
-                <a:spcPct val="0"/>
-              </a:spcAft>
-              <a:tabLst>
-                <a:tab pos="635000" algn="l"/>
-              </a:tabLst>
-              <a:defRPr sz="3200">
-                <a:solidFill>
-                  <a:schemeClr val="tx1"/>
-                </a:solidFill>
-                <a:latin typeface="Helvetica" pitchFamily="-111" charset="0"/>
-                <a:ea typeface="ＭＳ Ｐゴシック" pitchFamily="-111" charset="-128"/>
-              </a:defRPr>
-            </a:lvl7pPr>
-            <a:lvl8pPr marL="1371600" eaLnBrk="0" fontAlgn="base" hangingPunct="0">
-              <a:spcBef>
-                <a:spcPct val="0"/>
-              </a:spcBef>
-              <a:spcAft>
-                <a:spcPct val="0"/>
-              </a:spcAft>
-              <a:tabLst>
-                <a:tab pos="635000" algn="l"/>
-              </a:tabLst>
-              <a:defRPr sz="3200">
-                <a:solidFill>
-                  <a:schemeClr val="tx1"/>
-                </a:solidFill>
-                <a:latin typeface="Helvetica" pitchFamily="-111" charset="0"/>
-                <a:ea typeface="ＭＳ Ｐゴシック" pitchFamily="-111" charset="-128"/>
-              </a:defRPr>
-            </a:lvl8pPr>
-            <a:lvl9pPr marL="1828800" eaLnBrk="0" fontAlgn="base" hangingPunct="0">
-              <a:spcBef>
-                <a:spcPct val="0"/>
-              </a:spcBef>
-              <a:spcAft>
-                <a:spcPct val="0"/>
-              </a:spcAft>
-              <a:tabLst>
-                <a:tab pos="635000" algn="l"/>
-              </a:tabLst>
-              <a:defRPr sz="3200">
-                <a:solidFill>
-                  <a:schemeClr val="tx1"/>
-                </a:solidFill>
-                <a:latin typeface="Helvetica" pitchFamily="-111" charset="0"/>
-                <a:ea typeface="ＭＳ Ｐゴシック" pitchFamily="-111" charset="-128"/>
-              </a:defRPr>
-            </a:lvl9pPr>
-          </a:lstStyle>
-          <a:p>
-            <a:pPr indent="205704" algn="just" defTabSz="908920" rtl="0" eaLnBrk="1" hangingPunct="1">
-              <a:spcBef>
-                <a:spcPct val="50000"/>
-              </a:spcBef>
-              <a:tabLst>
-                <a:tab pos="497067" algn="l"/>
-              </a:tabLst>
-              <a:defRPr/>
-            </a:pPr>
-            <a:r>
-              <a:rPr lang="en-US" sz="4400" b="1" kern="0" dirty="0" err="1">
-                <a:solidFill>
-                  <a:schemeClr val="accent2"/>
-                </a:solidFill>
-              </a:rPr>
-              <a:t>Bla</a:t>
-            </a:r>
-            <a:r>
-              <a:rPr lang="en-US" sz="4400" b="1" kern="0" dirty="0">
-                <a:solidFill>
-                  <a:schemeClr val="accent2"/>
-                </a:solidFill>
-              </a:rPr>
-              <a:t> </a:t>
-            </a:r>
-            <a:r>
-              <a:rPr lang="en-US" sz="4400" b="1" kern="0" dirty="0" err="1">
-                <a:solidFill>
-                  <a:schemeClr val="accent2"/>
-                </a:solidFill>
-              </a:rPr>
-              <a:t>bla</a:t>
-            </a:r>
-            <a:r>
-              <a:rPr lang="en-US" sz="4400" b="1" kern="0" dirty="0">
-                <a:solidFill>
-                  <a:schemeClr val="accent2"/>
-                </a:solidFill>
-              </a:rPr>
-              <a:t> </a:t>
-            </a:r>
-            <a:r>
-              <a:rPr lang="en-US" sz="4400" b="1" kern="0" dirty="0" err="1">
-                <a:solidFill>
-                  <a:schemeClr val="accent2"/>
-                </a:solidFill>
-              </a:rPr>
-              <a:t>bla</a:t>
-            </a:r>
-            <a:endParaRPr lang="en-US" sz="4400" b="1" kern="0" dirty="0">
-              <a:solidFill>
-                <a:schemeClr val="accent2"/>
-              </a:solidFill>
-            </a:endParaRPr>
-          </a:p>
-          <a:p>
-            <a:pPr algn="l" defTabSz="908920" rtl="0">
-              <a:tabLst>
-                <a:tab pos="631195" algn="l"/>
-              </a:tabLst>
-              <a:defRPr/>
-            </a:pPr>
-            <a:endParaRPr lang="en-US" sz="2800" kern="0" dirty="0">
-              <a:solidFill>
-                <a:srgbClr val="000000"/>
-              </a:solidFill>
-              <a:latin typeface="Times New Roman" pitchFamily="-111" charset="0"/>
-            </a:endParaRPr>
-          </a:p>
-          <a:p>
-            <a:pPr algn="l" defTabSz="908920" rtl="0">
-              <a:tabLst>
-                <a:tab pos="631195" algn="l"/>
-              </a:tabLst>
-              <a:defRPr/>
-            </a:pPr>
-            <a:endParaRPr lang="en-US" sz="2800" kern="0" dirty="0">
-              <a:solidFill>
-                <a:srgbClr val="000000"/>
-              </a:solidFill>
-              <a:latin typeface="Times New Roman"/>
-            </a:endParaRPr>
-          </a:p>
-          <a:p>
-            <a:pPr indent="205704" algn="l" defTabSz="908920" rtl="0">
-              <a:tabLst>
-                <a:tab pos="631195" algn="l"/>
-              </a:tabLst>
-              <a:defRPr/>
-            </a:pPr>
-            <a:endParaRPr lang="en-US" sz="2800" kern="0" dirty="0">
-              <a:solidFill>
-                <a:srgbClr val="000000"/>
-              </a:solidFill>
-              <a:latin typeface="Times New Roman"/>
-            </a:endParaRPr>
-          </a:p>
-          <a:p>
-            <a:pPr indent="205704" algn="l" defTabSz="908920" rtl="0">
-              <a:tabLst>
-                <a:tab pos="631195" algn="l"/>
-              </a:tabLst>
-              <a:defRPr/>
-            </a:pPr>
-            <a:endParaRPr lang="en-US" sz="2800" kern="0" dirty="0">
-              <a:solidFill>
-                <a:srgbClr val="000000"/>
-              </a:solidFill>
-              <a:latin typeface="Times New Roman"/>
-            </a:endParaRPr>
-          </a:p>
-          <a:p>
-            <a:pPr indent="205704" algn="l" defTabSz="908920" rtl="0">
-              <a:tabLst>
-                <a:tab pos="631195" algn="l"/>
-              </a:tabLst>
-              <a:defRPr/>
-            </a:pPr>
-            <a:endParaRPr lang="en-US" sz="2800" kern="0" dirty="0">
-              <a:solidFill>
-                <a:srgbClr val="000000"/>
-              </a:solidFill>
-              <a:latin typeface="Times New Roman"/>
-            </a:endParaRPr>
-          </a:p>
-          <a:p>
-            <a:pPr indent="205704" algn="l" defTabSz="908920" rtl="0">
-              <a:tabLst>
-                <a:tab pos="631195" algn="l"/>
-              </a:tabLst>
-              <a:defRPr/>
-            </a:pPr>
-            <a:endParaRPr lang="en-US" sz="2800" kern="0" dirty="0">
-              <a:solidFill>
-                <a:srgbClr val="000000"/>
-              </a:solidFill>
-              <a:latin typeface="Times New Roman"/>
-            </a:endParaRPr>
-          </a:p>
-          <a:p>
-            <a:pPr indent="205704" algn="l" defTabSz="908920" rtl="0">
-              <a:tabLst>
-                <a:tab pos="631195" algn="l"/>
-              </a:tabLst>
-              <a:defRPr/>
-            </a:pPr>
-            <a:endParaRPr lang="en-US" sz="2800" kern="0" dirty="0">
-              <a:solidFill>
-                <a:srgbClr val="000000"/>
-              </a:solidFill>
-              <a:latin typeface="Times New Roman"/>
-            </a:endParaRPr>
-          </a:p>
-          <a:p>
-            <a:pPr indent="205704" algn="l" defTabSz="908920" rtl="0">
-              <a:tabLst>
-                <a:tab pos="631195" algn="l"/>
-              </a:tabLst>
-              <a:defRPr/>
-            </a:pPr>
-            <a:endParaRPr lang="en-US" sz="2800" kern="0" dirty="0">
-              <a:solidFill>
-                <a:srgbClr val="000000"/>
-              </a:solidFill>
-              <a:latin typeface="Times New Roman"/>
-            </a:endParaRPr>
-          </a:p>
-          <a:p>
-            <a:pPr indent="205704" algn="l" defTabSz="908920" rtl="0">
-              <a:tabLst>
-                <a:tab pos="631195" algn="l"/>
-              </a:tabLst>
-              <a:defRPr/>
-            </a:pPr>
-            <a:endParaRPr lang="en-US" sz="2800" kern="0" dirty="0">
-              <a:solidFill>
-                <a:srgbClr val="000000"/>
-              </a:solidFill>
-              <a:latin typeface="Times New Roman"/>
-            </a:endParaRPr>
-          </a:p>
-          <a:p>
-            <a:pPr indent="205704" algn="l" defTabSz="908920" rtl="0">
-              <a:tabLst>
-                <a:tab pos="631195" algn="l"/>
-              </a:tabLst>
-              <a:defRPr/>
-            </a:pPr>
-            <a:endParaRPr lang="en-US" sz="2800" kern="0" dirty="0">
-              <a:solidFill>
-                <a:srgbClr val="000000"/>
-              </a:solidFill>
-              <a:latin typeface="Times New Roman"/>
-            </a:endParaRPr>
-          </a:p>
-          <a:p>
-            <a:pPr indent="205704" algn="l" defTabSz="908920" rtl="0">
-              <a:tabLst>
-                <a:tab pos="631195" algn="l"/>
-              </a:tabLst>
-              <a:defRPr/>
-            </a:pPr>
-            <a:endParaRPr lang="en-US" sz="2800" kern="0" dirty="0">
-              <a:solidFill>
-                <a:srgbClr val="000000"/>
-              </a:solidFill>
-              <a:latin typeface="Times New Roman"/>
-            </a:endParaRPr>
-          </a:p>
-          <a:p>
-            <a:pPr indent="205704" algn="l" defTabSz="908920" rtl="0">
-              <a:tabLst>
-                <a:tab pos="631195" algn="l"/>
-              </a:tabLst>
-              <a:defRPr/>
-            </a:pPr>
-            <a:endParaRPr lang="en-US" sz="2800" kern="0" dirty="0">
-              <a:solidFill>
-                <a:srgbClr val="000000"/>
-              </a:solidFill>
-              <a:latin typeface="Times New Roman"/>
-            </a:endParaRPr>
-          </a:p>
-          <a:p>
-            <a:pPr indent="205704" algn="l" defTabSz="908920" rtl="0">
-              <a:tabLst>
-                <a:tab pos="631195" algn="l"/>
-              </a:tabLst>
-              <a:defRPr/>
-            </a:pPr>
-            <a:endParaRPr lang="en-US" sz="2800" kern="0" dirty="0">
-              <a:solidFill>
-                <a:srgbClr val="000000"/>
-              </a:solidFill>
-              <a:latin typeface="Times New Roman"/>
-            </a:endParaRPr>
-          </a:p>
-          <a:p>
-            <a:pPr indent="205704" algn="l" defTabSz="908920" rtl="0">
-              <a:tabLst>
-                <a:tab pos="631195" algn="l"/>
-              </a:tabLst>
-              <a:defRPr/>
-            </a:pPr>
-            <a:r>
-              <a:rPr lang="en-US" sz="2800" kern="0" dirty="0">
-                <a:solidFill>
-                  <a:srgbClr val="000000"/>
-                </a:solidFill>
-                <a:latin typeface="Times New Roman"/>
-              </a:rPr>
-              <a:t>	</a:t>
-            </a:r>
-          </a:p>
-          <a:p>
-            <a:pPr indent="205704" algn="l" defTabSz="908920" rtl="0">
-              <a:tabLst>
-                <a:tab pos="631195" algn="l"/>
-              </a:tabLst>
-              <a:defRPr/>
-            </a:pPr>
-            <a:endParaRPr lang="en-US" sz="2800" i="1" kern="0" dirty="0">
-              <a:solidFill>
-                <a:srgbClr val="FF0000"/>
-              </a:solidFill>
-            </a:endParaRPr>
-          </a:p>
-          <a:p>
-            <a:pPr indent="205704" algn="l" defTabSz="908920" rtl="0">
-              <a:tabLst>
-                <a:tab pos="631195" algn="l"/>
-              </a:tabLst>
-              <a:defRPr/>
-            </a:pPr>
-            <a:endParaRPr lang="en-US" sz="2800" kern="0" dirty="0">
-              <a:solidFill>
-                <a:srgbClr val="000000"/>
-              </a:solidFill>
-              <a:latin typeface="Times New Roman"/>
-            </a:endParaRPr>
-          </a:p>
-        </p:txBody>
-      </p:sp>
-      <p:sp>
-        <p:nvSpPr>
           <p:cNvPr id="23" name="Text Box 7"/>
           <p:cNvSpPr txBox="1">
             <a:spLocks noChangeArrowheads="1"/>
@@ -5084,8 +4636,8 @@
         </p:nvSpPr>
         <p:spPr bwMode="auto">
           <a:xfrm>
-            <a:off x="2400000" y="6748833"/>
-            <a:ext cx="11520000" cy="20555177"/>
+            <a:off x="2400000" y="6748834"/>
+            <a:ext cx="11520000" cy="19894426"/>
           </a:xfrm>
           <a:prstGeom prst="rect">
             <a:avLst/>
@@ -6250,8 +5802,8 @@
         </p:nvSpPr>
         <p:spPr bwMode="auto">
           <a:xfrm>
-            <a:off x="15914068" y="14437162"/>
-            <a:ext cx="11520000" cy="12866851"/>
+            <a:off x="2400000" y="28060049"/>
+            <a:ext cx="11520000" cy="13607811"/>
           </a:xfrm>
           <a:prstGeom prst="rect">
             <a:avLst/>
@@ -6415,45 +5967,125 @@
               <a:defRPr/>
             </a:pPr>
             <a:r>
-              <a:rPr lang="en-US" sz="4400" b="1" kern="0" dirty="0">
+              <a:rPr lang="en-US" sz="4400" b="1" kern="0" dirty="0" smtClean="0">
                 <a:solidFill>
                   <a:schemeClr val="accent2"/>
                 </a:solidFill>
               </a:rPr>
-              <a:t>Stochastic model</a:t>
-            </a:r>
+              <a:t>Model</a:t>
+            </a:r>
+            <a:endParaRPr lang="en-US" sz="2800" kern="0" dirty="0">
+              <a:solidFill>
+                <a:srgbClr val="000000"/>
+              </a:solidFill>
+              <a:latin typeface="Times New Roman" pitchFamily="-111" charset="0"/>
+            </a:endParaRPr>
+          </a:p>
+          <a:p>
+            <a:pPr indent="205704" algn="l" defTabSz="908920" rtl="0">
+              <a:defRPr/>
+            </a:pPr>
             <a:r>
               <a:rPr lang="en-US" sz="2800" kern="0" dirty="0">
                 <a:solidFill>
-                  <a:srgbClr val="FF8000"/>
-                </a:solidFill>
-                <a:latin typeface="Times New Roman" pitchFamily="-111" charset="0"/>
+                  <a:srgbClr val="000000"/>
+                </a:solidFill>
               </a:rPr>
-              <a:t>	</a:t>
+              <a:t>Consider an asexual population with two bi-allelic loci, </a:t>
+            </a:r>
+            <a:r>
+              <a:rPr lang="en-US" sz="2800" i="1" kern="0" dirty="0">
+                <a:solidFill>
+                  <a:srgbClr val="000000"/>
+                </a:solidFill>
+              </a:rPr>
+              <a:t>a/A</a:t>
+            </a:r>
+            <a:r>
+              <a:rPr lang="en-US" sz="2800" kern="0" dirty="0">
+                <a:solidFill>
+                  <a:srgbClr val="000000"/>
+                </a:solidFill>
+              </a:rPr>
+              <a:t> and </a:t>
+            </a:r>
+            <a:r>
+              <a:rPr lang="en-US" sz="2800" i="1" kern="0" dirty="0">
+                <a:solidFill>
+                  <a:srgbClr val="000000"/>
+                </a:solidFill>
+              </a:rPr>
+              <a:t>b/B</a:t>
+            </a:r>
+            <a:r>
+              <a:rPr lang="en-US" sz="2800" kern="0" dirty="0">
+                <a:solidFill>
+                  <a:srgbClr val="000000"/>
+                </a:solidFill>
+              </a:rPr>
+              <a:t> at a mutation-selection balance. An environmental change causes the previously deleterious combination </a:t>
+            </a:r>
+            <a:r>
+              <a:rPr lang="en-US" sz="2800" i="1" kern="0" dirty="0">
+                <a:solidFill>
+                  <a:srgbClr val="000000"/>
+                </a:solidFill>
+              </a:rPr>
+              <a:t>AB</a:t>
+            </a:r>
+            <a:r>
+              <a:rPr lang="en-US" sz="2800" kern="0" dirty="0">
+                <a:solidFill>
+                  <a:srgbClr val="000000"/>
+                </a:solidFill>
+              </a:rPr>
+              <a:t> to be favorable, but the intermediate types </a:t>
+            </a:r>
+            <a:r>
+              <a:rPr lang="en-US" sz="2800" i="1" kern="0" dirty="0" err="1">
+                <a:solidFill>
+                  <a:srgbClr val="000000"/>
+                </a:solidFill>
+              </a:rPr>
+              <a:t>Ab</a:t>
+            </a:r>
+            <a:r>
+              <a:rPr lang="en-US" sz="2800" kern="0" dirty="0">
+                <a:solidFill>
+                  <a:srgbClr val="000000"/>
+                </a:solidFill>
+              </a:rPr>
+              <a:t> and </a:t>
+            </a:r>
+            <a:r>
+              <a:rPr lang="en-US" sz="2800" i="1" kern="0" dirty="0" err="1">
+                <a:solidFill>
+                  <a:srgbClr val="000000"/>
+                </a:solidFill>
+              </a:rPr>
+              <a:t>aB</a:t>
+            </a:r>
+            <a:r>
+              <a:rPr lang="en-US" sz="2800" kern="0" dirty="0">
+                <a:solidFill>
+                  <a:srgbClr val="000000"/>
+                </a:solidFill>
+              </a:rPr>
+              <a:t> are still deleterious</a:t>
+            </a:r>
+            <a:r>
+              <a:rPr lang="en-US" sz="2800" kern="0" dirty="0" smtClean="0">
+                <a:solidFill>
+                  <a:srgbClr val="000000"/>
+                </a:solidFill>
+              </a:rPr>
+              <a:t>. In addition to adaptation, the population must also cope with deleterious mutations.</a:t>
             </a:r>
             <a:endParaRPr lang="en-US" sz="2800" kern="0" dirty="0">
               <a:solidFill>
                 <a:srgbClr val="000000"/>
               </a:solidFill>
-              <a:latin typeface="Times New Roman" pitchFamily="-111" charset="0"/>
-            </a:endParaRPr>
-          </a:p>
-          <a:p>
-            <a:pPr indent="205704" algn="l" defTabSz="908920" rtl="0">
-              <a:tabLst>
-                <a:tab pos="504955" algn="l"/>
-              </a:tabLst>
-              <a:defRPr/>
-            </a:pPr>
-            <a:r>
-              <a:rPr lang="en-US" sz="2800" kern="0" dirty="0">
-                <a:solidFill>
-                  <a:srgbClr val="000000"/>
-                </a:solidFill>
-                <a:latin typeface="+mn-lt"/>
-              </a:rPr>
-              <a:t>We modeled a population</a:t>
-            </a:r>
+            </a:endParaRPr>
           </a:p>
         </p:txBody>
       </p:sp>
@@ -6469,8 +6101,8 @@
             </p:nvSpPr>
             <p:spPr bwMode="auto">
               <a:xfrm>
-                <a:off x="2399473" y="28060047"/>
-                <a:ext cx="11520000" cy="13368416"/>
+                <a:off x="15762877" y="6722078"/>
+                <a:ext cx="11520000" cy="19921181"/>
               </a:xfrm>
               <a:prstGeom prst="rect">
                 <a:avLst/>
@@ -6636,143 +6268,7 @@
                       <a:schemeClr val="accent2"/>
                     </a:solidFill>
                   </a:rPr>
-                  <a:t>Model</a:t>
-                </a:r>
-              </a:p>
-              <a:p>
-                <a:pPr indent="205704" algn="l" defTabSz="908920" rtl="0">
-                  <a:defRPr/>
-                </a:pPr>
-                <a:r>
-                  <a:rPr lang="en-US" sz="2800" kern="0" dirty="0" smtClean="0">
-                    <a:solidFill>
-                      <a:srgbClr val="000000"/>
-                    </a:solidFill>
-                    <a:latin typeface="+mn-lt"/>
-                  </a:rPr>
-                  <a:t>Consider an asexual population with two bi-allelic loci, </a:t>
-                </a:r>
-                <a:r>
-                  <a:rPr lang="en-US" sz="2800" i="1" kern="0" dirty="0" smtClean="0">
-                    <a:solidFill>
-                      <a:srgbClr val="000000"/>
-                    </a:solidFill>
-                    <a:latin typeface="+mn-lt"/>
-                  </a:rPr>
-                  <a:t>a/A</a:t>
-                </a:r>
-                <a:r>
-                  <a:rPr lang="en-US" sz="2800" kern="0" dirty="0" smtClean="0">
-                    <a:solidFill>
-                      <a:srgbClr val="000000"/>
-                    </a:solidFill>
-                    <a:latin typeface="+mn-lt"/>
-                  </a:rPr>
-                  <a:t> and </a:t>
-                </a:r>
-                <a:r>
-                  <a:rPr lang="en-US" sz="2800" i="1" kern="0" dirty="0" smtClean="0">
-                    <a:solidFill>
-                      <a:srgbClr val="000000"/>
-                    </a:solidFill>
-                    <a:latin typeface="+mn-lt"/>
-                  </a:rPr>
-                  <a:t>b/B</a:t>
-                </a:r>
-                <a:r>
-                  <a:rPr lang="en-US" sz="2800" kern="0" dirty="0" smtClean="0">
-                    <a:solidFill>
-                      <a:srgbClr val="000000"/>
-                    </a:solidFill>
-                    <a:latin typeface="+mn-lt"/>
-                  </a:rPr>
-                  <a:t> at a mutation-selection balance. An environmental change causes the previously deleterious combination </a:t>
-                </a:r>
-                <a:r>
-                  <a:rPr lang="en-US" sz="2800" i="1" kern="0" dirty="0" smtClean="0">
-                    <a:solidFill>
-                      <a:srgbClr val="000000"/>
-                    </a:solidFill>
-                    <a:latin typeface="+mn-lt"/>
-                  </a:rPr>
-                  <a:t>AB</a:t>
-                </a:r>
-                <a:r>
-                  <a:rPr lang="en-US" sz="2800" kern="0" dirty="0" smtClean="0">
-                    <a:solidFill>
-                      <a:srgbClr val="000000"/>
-                    </a:solidFill>
-                    <a:latin typeface="+mn-lt"/>
-                  </a:rPr>
-                  <a:t> to be favorable, but the intermediate types </a:t>
-                </a:r>
-                <a:r>
-                  <a:rPr lang="en-US" sz="2800" i="1" kern="0" dirty="0" err="1" smtClean="0">
-                    <a:solidFill>
-                      <a:srgbClr val="000000"/>
-                    </a:solidFill>
-                    <a:latin typeface="+mn-lt"/>
-                  </a:rPr>
-                  <a:t>Ab</a:t>
-                </a:r>
-                <a:r>
-                  <a:rPr lang="en-US" sz="2800" kern="0" dirty="0" smtClean="0">
-                    <a:solidFill>
-                      <a:srgbClr val="000000"/>
-                    </a:solidFill>
-                    <a:latin typeface="+mn-lt"/>
-                  </a:rPr>
-                  <a:t> and </a:t>
-                </a:r>
-                <a:r>
-                  <a:rPr lang="en-US" sz="2800" i="1" kern="0" dirty="0" err="1" smtClean="0">
-                    <a:solidFill>
-                      <a:srgbClr val="000000"/>
-                    </a:solidFill>
-                    <a:latin typeface="+mn-lt"/>
-                  </a:rPr>
-                  <a:t>aB</a:t>
-                </a:r>
-                <a:r>
-                  <a:rPr lang="en-US" sz="2800" kern="0" dirty="0" smtClean="0">
-                    <a:solidFill>
-                      <a:srgbClr val="000000"/>
-                    </a:solidFill>
-                    <a:latin typeface="+mn-lt"/>
-                  </a:rPr>
-                  <a:t> are still deleterious. </a:t>
-                </a:r>
-              </a:p>
-              <a:p>
-                <a:pPr indent="205704" algn="l" defTabSz="908920" rtl="0">
-                  <a:defRPr/>
-                </a:pPr>
-                <a:r>
-                  <a:rPr lang="en-US" sz="2800" kern="0" dirty="0" smtClean="0">
-                    <a:solidFill>
-                      <a:srgbClr val="000000"/>
-                    </a:solidFill>
-                    <a:latin typeface="+mn-lt"/>
-                  </a:rPr>
-                  <a:t>How much time does it for the favorable </a:t>
-                </a:r>
-                <a:r>
-                  <a:rPr lang="en-US" sz="2800" i="1" kern="0" dirty="0" smtClean="0">
-                    <a:solidFill>
-                      <a:srgbClr val="000000"/>
-                    </a:solidFill>
-                    <a:latin typeface="+mn-lt"/>
-                  </a:rPr>
-                  <a:t>AB </a:t>
-                </a:r>
-                <a:r>
-                  <a:rPr lang="en-US" sz="2800" kern="0" dirty="0" smtClean="0">
-                    <a:solidFill>
-                      <a:srgbClr val="000000"/>
-                    </a:solidFill>
-                    <a:latin typeface="+mn-lt"/>
-                  </a:rPr>
-                  <a:t>genotype to appear and fixate in the population? </a:t>
+                  <a:t>Results</a:t>
                 </a:r>
               </a:p>
               <a:p>
@@ -7735,8 +7231,8 @@
             </p:nvSpPr>
             <p:spPr bwMode="auto">
               <a:xfrm>
-                <a:off x="2399473" y="28060047"/>
-                <a:ext cx="11520000" cy="13368416"/>
+                <a:off x="15762877" y="6722078"/>
+                <a:ext cx="11520000" cy="19921181"/>
               </a:xfrm>
               <a:prstGeom prst="rect">
                 <a:avLst/>
@@ -8558,52 +8054,6 @@
           </a:p>
         </p:txBody>
       </p:sp>
-      <p:sp>
-        <p:nvSpPr>
-          <p:cNvPr id="9" name="Oval 8"/>
-          <p:cNvSpPr/>
-          <p:nvPr/>
-        </p:nvSpPr>
-        <p:spPr>
-          <a:xfrm>
-            <a:off x="4348097" y="32712589"/>
-            <a:ext cx="492868" cy="217841"/>
-          </a:xfrm>
-          <a:prstGeom prst="ellipse">
-            <a:avLst/>
-          </a:prstGeom>
-          <a:solidFill>
-            <a:schemeClr val="bg1"/>
-          </a:solidFill>
-          <a:ln>
-            <a:noFill/>
-          </a:ln>
-        </p:spPr>
-        <p:style>
-          <a:lnRef idx="2">
-            <a:schemeClr val="accent1">
-              <a:shade val="50000"/>
-            </a:schemeClr>
-          </a:lnRef>
-          <a:fillRef idx="1">
-            <a:schemeClr val="accent1"/>
-          </a:fillRef>
-          <a:effectRef idx="0">
-            <a:schemeClr val="accent1"/>
-          </a:effectRef>
-          <a:fontRef idx="minor">
-            <a:schemeClr val="lt1"/>
-          </a:fontRef>
-        </p:style>
-        <p:txBody>
-          <a:bodyPr lIns="104498" tIns="52249" rIns="104498" bIns="52249" rtlCol="0" anchor="ctr"/>
-          <a:lstStyle/>
-          <a:p>
-            <a:pPr algn="ctr"/>
-            <a:endParaRPr lang="en-US" sz="9600"/>
-          </a:p>
-        </p:txBody>
-      </p:sp>
       <p:grpSp>
         <p:nvGrpSpPr>
           <p:cNvPr id="3" name="Group 2"/>
@@ -9603,6 +9053,374 @@
           </p:txBody>
         </p:sp>
       </p:grpSp>
+      <p:sp>
+        <p:nvSpPr>
+          <p:cNvPr id="15" name="Rectangle 14"/>
+          <p:cNvSpPr/>
+          <p:nvPr/>
+        </p:nvSpPr>
+        <p:spPr>
+          <a:xfrm>
+            <a:off x="3368480" y="39086123"/>
+            <a:ext cx="9584690" cy="2246769"/>
+          </a:xfrm>
+          <a:prstGeom prst="rect">
+            <a:avLst/>
+          </a:prstGeom>
+        </p:spPr>
+        <p:txBody>
+          <a:bodyPr wrap="square">
+            <a:spAutoFit/>
+          </a:bodyPr>
+          <a:lstStyle/>
+          <a:p>
+            <a:pPr algn="l" rtl="0"/>
+            <a:r>
+              <a:rPr lang="en-GB" sz="2000" b="1" kern="0" dirty="0">
+                <a:solidFill>
+                  <a:sysClr val="windowText" lastClr="000000"/>
+                </a:solidFill>
+                <a:latin typeface="Helvetica" pitchFamily="34" charset="0"/>
+                <a:cs typeface="Helvetica" pitchFamily="34" charset="0"/>
+              </a:rPr>
+              <a:t>Figure </a:t>
+            </a:r>
+            <a:r>
+              <a:rPr lang="en-GB" sz="2000" b="1" kern="0" dirty="0" smtClean="0">
+                <a:solidFill>
+                  <a:sysClr val="windowText" lastClr="000000"/>
+                </a:solidFill>
+                <a:latin typeface="Helvetica" pitchFamily="34" charset="0"/>
+                <a:cs typeface="Helvetica" pitchFamily="34" charset="0"/>
+              </a:rPr>
+              <a:t>2 </a:t>
+            </a:r>
+            <a:r>
+              <a:rPr lang="en-GB" sz="2000" b="1" kern="0" dirty="0">
+                <a:solidFill>
+                  <a:sysClr val="windowText" lastClr="000000"/>
+                </a:solidFill>
+                <a:latin typeface="Helvetica" pitchFamily="34" charset="0"/>
+                <a:cs typeface="Helvetica" pitchFamily="34" charset="0"/>
+              </a:rPr>
+              <a:t>– Fitness landscape illustration.</a:t>
+            </a:r>
+            <a:r>
+              <a:rPr lang="en-GB" sz="2000" kern="0" dirty="0">
+                <a:solidFill>
+                  <a:sysClr val="windowText" lastClr="000000"/>
+                </a:solidFill>
+                <a:latin typeface="Helvetica" pitchFamily="34" charset="0"/>
+                <a:cs typeface="Helvetica" pitchFamily="34" charset="0"/>
+              </a:rPr>
+              <a:t> </a:t>
+            </a:r>
+            <a:r>
+              <a:rPr lang="en-GB" sz="2000" kern="0" dirty="0">
+                <a:solidFill>
+                  <a:sysClr val="windowText" lastClr="000000"/>
+                </a:solidFill>
+                <a:latin typeface="Helvetica" pitchFamily="34" charset="0"/>
+                <a:cs typeface="Helvetica" pitchFamily="34" charset="0"/>
+              </a:rPr>
+              <a:t>Each node represent a specific genotype. Node labels specify the alleles at the</a:t>
+            </a:r>
+            <a:r>
+              <a:rPr lang="en-GB" sz="2000" i="1" kern="0" dirty="0">
+                <a:solidFill>
+                  <a:sysClr val="windowText" lastClr="000000"/>
+                </a:solidFill>
+                <a:latin typeface="Helvetica" pitchFamily="34" charset="0"/>
+                <a:cs typeface="Helvetica" pitchFamily="34" charset="0"/>
+              </a:rPr>
+              <a:t> A/a </a:t>
+            </a:r>
+            <a:r>
+              <a:rPr lang="en-GB" sz="2000" kern="0" dirty="0">
+                <a:solidFill>
+                  <a:sysClr val="windowText" lastClr="000000"/>
+                </a:solidFill>
+                <a:latin typeface="Helvetica" pitchFamily="34" charset="0"/>
+                <a:cs typeface="Helvetica" pitchFamily="34" charset="0"/>
+              </a:rPr>
+              <a:t>and </a:t>
+            </a:r>
+            <a:r>
+              <a:rPr lang="en-GB" sz="2000" i="1" kern="0" dirty="0">
+                <a:solidFill>
+                  <a:sysClr val="windowText" lastClr="000000"/>
+                </a:solidFill>
+                <a:latin typeface="Helvetica" pitchFamily="34" charset="0"/>
+                <a:cs typeface="Helvetica" pitchFamily="34" charset="0"/>
+              </a:rPr>
+              <a:t>B/b</a:t>
+            </a:r>
+            <a:r>
+              <a:rPr lang="en-GB" sz="2000" kern="0" dirty="0">
+                <a:solidFill>
+                  <a:sysClr val="windowText" lastClr="000000"/>
+                </a:solidFill>
+                <a:latin typeface="Helvetica" pitchFamily="34" charset="0"/>
+                <a:cs typeface="Helvetica" pitchFamily="34" charset="0"/>
+              </a:rPr>
+              <a:t> loci and the number of additional deleterious alleles after the forward slash, but only as much as 3 deleterious mutations are shown to keep the figure simple. Arrows define the direction of mutation and their labels denote the relevant mutation rate. Node </a:t>
+            </a:r>
+            <a:r>
+              <a:rPr lang="en-GB" sz="2000" kern="0" dirty="0" err="1">
+                <a:solidFill>
+                  <a:sysClr val="windowText" lastClr="000000"/>
+                </a:solidFill>
+                <a:latin typeface="Helvetica" pitchFamily="34" charset="0"/>
+                <a:cs typeface="Helvetica" pitchFamily="34" charset="0"/>
+              </a:rPr>
+              <a:t>color</a:t>
+            </a:r>
+            <a:r>
+              <a:rPr lang="en-GB" sz="2000" kern="0" dirty="0">
+                <a:solidFill>
+                  <a:sysClr val="windowText" lastClr="000000"/>
+                </a:solidFill>
+                <a:latin typeface="Helvetica" pitchFamily="34" charset="0"/>
+                <a:cs typeface="Helvetica" pitchFamily="34" charset="0"/>
+              </a:rPr>
+              <a:t> indicates the fitness of a genotype, from pale brown for optimal fitness (</a:t>
+            </a:r>
+            <a:r>
+              <a:rPr lang="en-GB" sz="2000" i="1" kern="0" dirty="0">
+                <a:solidFill>
+                  <a:sysClr val="windowText" lastClr="000000"/>
+                </a:solidFill>
+                <a:latin typeface="Helvetica" pitchFamily="34" charset="0"/>
+                <a:cs typeface="Helvetica" pitchFamily="34" charset="0"/>
+              </a:rPr>
+              <a:t>1+sH</a:t>
+            </a:r>
+            <a:r>
+              <a:rPr lang="en-GB" sz="2000" kern="0" dirty="0">
+                <a:solidFill>
+                  <a:sysClr val="windowText" lastClr="000000"/>
+                </a:solidFill>
+                <a:latin typeface="Helvetica" pitchFamily="34" charset="0"/>
+                <a:cs typeface="Helvetica" pitchFamily="34" charset="0"/>
+              </a:rPr>
+              <a:t>) to dark brown for lower fitness (</a:t>
+            </a:r>
+            <a:r>
+              <a:rPr lang="en-GB" sz="2000" i="1" kern="0" dirty="0">
+                <a:solidFill>
+                  <a:sysClr val="windowText" lastClr="000000"/>
+                </a:solidFill>
+                <a:latin typeface="Helvetica" pitchFamily="34" charset="0"/>
+                <a:cs typeface="Helvetica" pitchFamily="34" charset="0"/>
+              </a:rPr>
+              <a:t>(1-s)</a:t>
+            </a:r>
+            <a:r>
+              <a:rPr lang="en-GB" sz="2000" i="1" kern="0" baseline="30000" dirty="0">
+                <a:solidFill>
+                  <a:sysClr val="windowText" lastClr="000000"/>
+                </a:solidFill>
+                <a:latin typeface="Helvetica" pitchFamily="34" charset="0"/>
+                <a:cs typeface="Helvetica" pitchFamily="34" charset="0"/>
+              </a:rPr>
+              <a:t>3</a:t>
+            </a:r>
+            <a:r>
+              <a:rPr lang="en-GB" sz="2000" i="1" kern="0" dirty="0">
+                <a:solidFill>
+                  <a:sysClr val="windowText" lastClr="000000"/>
+                </a:solidFill>
+                <a:latin typeface="Helvetica" pitchFamily="34" charset="0"/>
+                <a:cs typeface="Helvetica" pitchFamily="34" charset="0"/>
+              </a:rPr>
+              <a:t>)</a:t>
+            </a:r>
+            <a:r>
+              <a:rPr lang="en-GB" sz="2000" kern="0" dirty="0">
+                <a:solidFill>
+                  <a:sysClr val="windowText" lastClr="000000"/>
+                </a:solidFill>
+                <a:latin typeface="Helvetica" pitchFamily="34" charset="0"/>
+                <a:cs typeface="Helvetica" pitchFamily="34" charset="0"/>
+              </a:rPr>
+              <a:t> – see the </a:t>
+            </a:r>
+            <a:r>
+              <a:rPr lang="en-GB" sz="2000" kern="0" dirty="0" err="1">
+                <a:solidFill>
+                  <a:sysClr val="windowText" lastClr="000000"/>
+                </a:solidFill>
+                <a:latin typeface="Helvetica" pitchFamily="34" charset="0"/>
+                <a:cs typeface="Helvetica" pitchFamily="34" charset="0"/>
+              </a:rPr>
+              <a:t>colorbar</a:t>
+            </a:r>
+            <a:r>
+              <a:rPr lang="en-GB" sz="2000" kern="0" dirty="0">
+                <a:solidFill>
+                  <a:sysClr val="windowText" lastClr="000000"/>
+                </a:solidFill>
+                <a:latin typeface="Helvetica" pitchFamily="34" charset="0"/>
+                <a:cs typeface="Helvetica" pitchFamily="34" charset="0"/>
+              </a:rPr>
+              <a:t>. </a:t>
+            </a:r>
+            <a:r>
+              <a:rPr lang="en-GB" sz="2000" kern="0" dirty="0" smtClean="0">
+                <a:solidFill>
+                  <a:sysClr val="windowText" lastClr="000000"/>
+                </a:solidFill>
+                <a:latin typeface="Helvetica" pitchFamily="34" charset="0"/>
+                <a:cs typeface="Helvetica" pitchFamily="34" charset="0"/>
+              </a:rPr>
+              <a:t>Parameters: </a:t>
+            </a:r>
+            <a:r>
+              <a:rPr lang="en-GB" sz="2000" kern="0" dirty="0">
+                <a:solidFill>
+                  <a:sysClr val="windowText" lastClr="000000"/>
+                </a:solidFill>
+                <a:latin typeface="Helvetica" pitchFamily="34" charset="0"/>
+                <a:cs typeface="Helvetica" pitchFamily="34" charset="0"/>
+              </a:rPr>
+              <a:t>s=0.01, H=2.</a:t>
+            </a:r>
+            <a:endParaRPr lang="he-IL" sz="2000" kern="0" dirty="0">
+              <a:solidFill>
+                <a:sysClr val="windowText" lastClr="000000"/>
+              </a:solidFill>
+              <a:latin typeface="Helvetica" pitchFamily="34" charset="0"/>
+              <a:cs typeface="Helvetica" pitchFamily="34" charset="0"/>
+            </a:endParaRPr>
+          </a:p>
+        </p:txBody>
+      </p:sp>
+      <p:grpSp>
+        <p:nvGrpSpPr>
+          <p:cNvPr id="17" name="Group 16"/>
+          <p:cNvGrpSpPr/>
+          <p:nvPr/>
+        </p:nvGrpSpPr>
+        <p:grpSpPr>
+          <a:xfrm>
+            <a:off x="5328892" y="32043498"/>
+            <a:ext cx="5661117" cy="6986478"/>
+            <a:chOff x="18137188" y="16166796"/>
+            <a:chExt cx="5303858" cy="6300000"/>
+          </a:xfrm>
+        </p:grpSpPr>
+        <p:pic>
+          <p:nvPicPr>
+            <p:cNvPr id="1025" name="Picture 1" descr="D:\workspace\ruggedsim\manuscript\fitness_landscape.png"/>
+            <p:cNvPicPr>
+              <a:picLocks noChangeAspect="1" noChangeArrowheads="1"/>
+            </p:cNvPicPr>
+            <p:nvPr/>
+          </p:nvPicPr>
+          <p:blipFill>
+            <a:blip r:embed="rId8">
+              <a:extLst>
+                <a:ext uri="{28A0092B-C50C-407E-A947-70E740481C1C}">
+                  <a14:useLocalDpi xmlns:a14="http://schemas.microsoft.com/office/drawing/2010/main" val="0"/>
+                </a:ext>
+              </a:extLst>
+            </a:blip>
+            <a:srcRect/>
+            <a:stretch>
+              <a:fillRect/>
+            </a:stretch>
+          </p:blipFill>
+          <p:spPr bwMode="auto">
+            <a:xfrm>
+              <a:off x="18137188" y="16202025"/>
+              <a:ext cx="4152900" cy="6143625"/>
+            </a:xfrm>
+            <a:prstGeom prst="rect">
+              <a:avLst/>
+            </a:prstGeom>
+            <a:noFill/>
+            <a:extLst>
+              <a:ext uri="{909E8E84-426E-40DD-AFC4-6F175D3DCCD1}">
+                <a14:hiddenFill xmlns:a14="http://schemas.microsoft.com/office/drawing/2010/main">
+                  <a:solidFill>
+                    <a:srgbClr val="FFFFFF"/>
+                  </a:solidFill>
+                </a14:hiddenFill>
+              </a:ext>
+            </a:extLst>
+          </p:spPr>
+        </p:pic>
+        <p:pic>
+          <p:nvPicPr>
+            <p:cNvPr id="16" name="Picture 2" descr="D:\workspace\ruggedsim\manuscript\fitness_landscape_colorbar.png"/>
+            <p:cNvPicPr>
+              <a:picLocks noChangeAspect="1" noChangeArrowheads="1"/>
+            </p:cNvPicPr>
+            <p:nvPr/>
+          </p:nvPicPr>
+          <p:blipFill rotWithShape="1">
+            <a:blip r:embed="rId9">
+              <a:extLst>
+                <a:ext uri="{28A0092B-C50C-407E-A947-70E740481C1C}">
+                  <a14:useLocalDpi xmlns:a14="http://schemas.microsoft.com/office/drawing/2010/main" val="0"/>
+                </a:ext>
+              </a:extLst>
+            </a:blip>
+            <a:srcRect l="77619" t="5537" r="16198" b="8115"/>
+            <a:stretch/>
+          </p:blipFill>
+          <p:spPr bwMode="auto">
+            <a:xfrm>
+              <a:off x="22538804" y="16166796"/>
+              <a:ext cx="902242" cy="6300000"/>
+            </a:xfrm>
+            <a:prstGeom prst="rect">
+              <a:avLst/>
+            </a:prstGeom>
+            <a:noFill/>
+            <a:extLst>
+              <a:ext uri="{909E8E84-426E-40DD-AFC4-6F175D3DCCD1}">
+                <a14:hiddenFill xmlns:a14="http://schemas.microsoft.com/office/drawing/2010/main">
+                  <a:solidFill>
+                    <a:srgbClr val="FFFFFF"/>
+                  </a:solidFill>
+                </a14:hiddenFill>
+              </a:ext>
+            </a:extLst>
+          </p:spPr>
+        </p:pic>
+      </p:grpSp>
+      <p:sp>
+        <p:nvSpPr>
+          <p:cNvPr id="56" name="TextBox 55"/>
+          <p:cNvSpPr txBox="1"/>
+          <p:nvPr/>
+        </p:nvSpPr>
+        <p:spPr>
+          <a:xfrm>
+            <a:off x="8755658" y="31870227"/>
+            <a:ext cx="3269978" cy="461665"/>
+          </a:xfrm>
+          <a:prstGeom prst="rect">
+            <a:avLst/>
+          </a:prstGeom>
+          <a:noFill/>
+        </p:spPr>
+        <p:txBody>
+          <a:bodyPr wrap="square" rtlCol="1">
+            <a:spAutoFit/>
+          </a:bodyPr>
+          <a:lstStyle/>
+          <a:p>
+            <a:pPr algn="ctr"/>
+            <a:r>
+              <a:rPr lang="en-US" sz="2400" dirty="0" smtClean="0"/>
+              <a:t>fitness</a:t>
+            </a:r>
+            <a:endParaRPr lang="he-IL" sz="2400" dirty="0"/>
+          </a:p>
+        </p:txBody>
+      </p:sp>
     </p:spTree>
     <p:extLst>
       <p:ext uri="{BB962C8B-B14F-4D97-AF65-F5344CB8AC3E}">

</xml_diff>

<commit_message>
updated with figures from ipynb
</commit_message>
<xml_diff>
--- a/poster.pptx
+++ b/poster.pptx
@@ -3278,7 +3278,7 @@
         </p:nvSpPr>
         <p:spPr bwMode="auto">
           <a:xfrm>
-            <a:off x="1180964" y="759375"/>
+            <a:off x="1224436" y="1368452"/>
             <a:ext cx="40800000" cy="41680575"/>
           </a:xfrm>
           <a:prstGeom prst="rect">
@@ -4520,7 +4520,16 @@
                 </a:solidFill>
                 <a:latin typeface="+mn-lt"/>
               </a:rPr>
-              <a:t>We performed Wright-Fisher simulations without </a:t>
+              <a:t>We performed Wright-Fisher simulations without recombination, tracking the frequency of </a:t>
+            </a:r>
+            <a:r>
+              <a:rPr lang="en-US" sz="2800" i="1" kern="0" dirty="0" err="1" smtClean="0">
+                <a:solidFill>
+                  <a:srgbClr val="000000"/>
+                </a:solidFill>
+                <a:latin typeface="+mn-lt"/>
+              </a:rPr>
+              <a:t>ab</a:t>
             </a:r>
             <a:r>
               <a:rPr lang="en-US" sz="2800" kern="0" dirty="0" smtClean="0">
@@ -4529,7 +4538,16 @@
                 </a:solidFill>
                 <a:latin typeface="+mn-lt"/>
               </a:rPr>
-              <a:t>recombination, tracking </a:t>
+              <a:t>, </a:t>
+            </a:r>
+            <a:r>
+              <a:rPr lang="en-US" sz="2800" i="1" kern="0" dirty="0" err="1" smtClean="0">
+                <a:solidFill>
+                  <a:srgbClr val="000000"/>
+                </a:solidFill>
+                <a:latin typeface="+mn-lt"/>
+              </a:rPr>
+              <a:t>Ab</a:t>
             </a:r>
             <a:r>
               <a:rPr lang="en-US" sz="2800" kern="0" dirty="0" smtClean="0">
@@ -4538,7 +4556,7 @@
                 </a:solidFill>
                 <a:latin typeface="+mn-lt"/>
               </a:rPr>
-              <a:t>the frequency of </a:t>
+              <a:t>, </a:t>
             </a:r>
             <a:r>
               <a:rPr lang="en-US" sz="2800" i="1" kern="0" dirty="0" err="1" smtClean="0">
@@ -4547,7 +4565,16 @@
                 </a:solidFill>
                 <a:latin typeface="+mn-lt"/>
               </a:rPr>
-              <a:t>ab</a:t>
+              <a:t>aB</a:t>
+            </a:r>
+            <a:r>
+              <a:rPr lang="en-US" sz="2800" kern="0" dirty="0">
+                <a:solidFill>
+                  <a:srgbClr val="000000"/>
+                </a:solidFill>
+                <a:latin typeface="+mn-lt"/>
+              </a:rPr>
+              <a:t> </a:t>
             </a:r>
             <a:r>
               <a:rPr lang="en-US" sz="2800" kern="0" dirty="0" smtClean="0">
@@ -4556,16 +4583,16 @@
                 </a:solidFill>
                 <a:latin typeface="+mn-lt"/>
               </a:rPr>
-              <a:t>, </a:t>
-            </a:r>
-            <a:r>
-              <a:rPr lang="en-US" sz="2800" i="1" kern="0" dirty="0" err="1" smtClean="0">
+              <a:t>and </a:t>
+            </a:r>
+            <a:r>
+              <a:rPr lang="en-US" sz="2800" i="1" kern="0" dirty="0" smtClean="0">
                 <a:solidFill>
                   <a:srgbClr val="000000"/>
                 </a:solidFill>
                 <a:latin typeface="+mn-lt"/>
               </a:rPr>
-              <a:t>Ab</a:t>
+              <a:t>AB</a:t>
             </a:r>
             <a:r>
               <a:rPr lang="en-US" sz="2800" kern="0" dirty="0" smtClean="0">
@@ -4574,61 +4601,7 @@
                 </a:solidFill>
                 <a:latin typeface="+mn-lt"/>
               </a:rPr>
-              <a:t>, </a:t>
-            </a:r>
-            <a:r>
-              <a:rPr lang="en-US" sz="2800" i="1" kern="0" dirty="0" err="1" smtClean="0">
-                <a:solidFill>
-                  <a:srgbClr val="000000"/>
-                </a:solidFill>
-                <a:latin typeface="+mn-lt"/>
-              </a:rPr>
-              <a:t>aB</a:t>
-            </a:r>
-            <a:r>
-              <a:rPr lang="en-US" sz="2800" kern="0" dirty="0">
-                <a:solidFill>
-                  <a:srgbClr val="000000"/>
-                </a:solidFill>
-                <a:latin typeface="+mn-lt"/>
-              </a:rPr>
-              <a:t> </a:t>
-            </a:r>
-            <a:r>
-              <a:rPr lang="en-US" sz="2800" kern="0" dirty="0" smtClean="0">
-                <a:solidFill>
-                  <a:srgbClr val="000000"/>
-                </a:solidFill>
-                <a:latin typeface="+mn-lt"/>
-              </a:rPr>
-              <a:t>and </a:t>
-            </a:r>
-            <a:r>
-              <a:rPr lang="en-US" sz="2800" i="1" kern="0" dirty="0" smtClean="0">
-                <a:solidFill>
-                  <a:srgbClr val="000000"/>
-                </a:solidFill>
-                <a:latin typeface="+mn-lt"/>
-              </a:rPr>
-              <a:t>AB</a:t>
-            </a:r>
-            <a:r>
-              <a:rPr lang="en-US" sz="2800" kern="0" dirty="0" smtClean="0">
-                <a:solidFill>
-                  <a:srgbClr val="000000"/>
-                </a:solidFill>
-                <a:latin typeface="+mn-lt"/>
-              </a:rPr>
-              <a:t> and the number of deleterious mutations in each type – see Figure </a:t>
-            </a:r>
-            <a:r>
-              <a:rPr lang="en-US" sz="2800" kern="0" dirty="0" smtClean="0">
-                <a:solidFill>
-                  <a:srgbClr val="000000"/>
-                </a:solidFill>
-                <a:latin typeface="+mn-lt"/>
-              </a:rPr>
-              <a:t>3.</a:t>
+              <a:t> and the number of deleterious mutations in each type – see Figure 3.</a:t>
             </a:r>
             <a:endParaRPr lang="en-US" sz="2800" i="1" kern="0" dirty="0">
               <a:solidFill>
@@ -5307,16 +5280,7 @@
                 </a:solidFill>
                 <a:latin typeface="+mn-lt"/>
               </a:rPr>
-              <a:t>in v</a:t>
-            </a:r>
-            <a:r>
-              <a:rPr lang="en-US" sz="2800" kern="0" dirty="0" smtClean="0">
-                <a:solidFill>
-                  <a:srgbClr val="000000"/>
-                </a:solidFill>
-                <a:latin typeface="+mn-lt"/>
-              </a:rPr>
-              <a:t>arious species </a:t>
+              <a:t>in various species </a:t>
             </a:r>
             <a:r>
               <a:rPr lang="en-US" sz="2800" kern="0" dirty="0">
@@ -5348,16 +5312,7 @@
                 </a:solidFill>
                 <a:latin typeface="+mn-lt"/>
               </a:rPr>
-              <a:t>In </a:t>
-            </a:r>
-            <a:r>
-              <a:rPr lang="en-US" sz="2800" kern="0" dirty="0" smtClean="0">
-                <a:solidFill>
-                  <a:srgbClr val="000000"/>
-                </a:solidFill>
-                <a:latin typeface="+mn-lt"/>
-              </a:rPr>
-              <a:t>a previous work (4) we modeled the evolution of stress-induced mutagenesis in asexual population in constant and changing environments. Our results showed that </a:t>
+              <a:t>In a previous work (4) we modeled the evolution of stress-induced mutagenesis in asexual population in constant and changing environments. Our results showed that </a:t>
             </a:r>
             <a:r>
               <a:rPr lang="en-US" sz="2800" b="1" kern="0" dirty="0" smtClean="0">
@@ -6227,8 +6182,8 @@
           </a:p>
         </p:txBody>
       </p:sp>
-      <mc:AlternateContent xmlns:mc="http://schemas.openxmlformats.org/markup-compatibility/2006">
-        <mc:Choice xmlns:a14="http://schemas.microsoft.com/office/drawing/2010/main" Requires="a14">
+      <mc:AlternateContent xmlns:mc="http://schemas.openxmlformats.org/markup-compatibility/2006" xmlns:a14="http://schemas.microsoft.com/office/drawing/2010/main">
+        <mc:Choice Requires="a14">
           <p:sp>
             <p:nvSpPr>
               <p:cNvPr id="101" name="Text Box 13"/>
@@ -8600,7 +8555,7 @@
             </p:txBody>
           </p:sp>
         </mc:Choice>
-        <mc:Fallback>
+        <mc:Fallback xmlns="">
           <p:sp>
             <p:nvSpPr>
               <p:cNvPr id="101" name="Text Box 13"/>
@@ -12092,13 +12047,13 @@
       </p:sp>
       <p:pic>
         <p:nvPicPr>
-          <p:cNvPr id="1030" name="Picture 6" descr="D:\workspace\ruggedsim\manuscript\fitness_landscape_4_types.png"/>
+          <p:cNvPr id="1033" name="Picture 9" descr="C:\Users\yoavram\Pictures\yoav_mypictr_Facebook.jpg"/>
           <p:cNvPicPr>
             <a:picLocks noChangeAspect="1" noChangeArrowheads="1"/>
           </p:cNvPicPr>
           <p:nvPr/>
         </p:nvPicPr>
-        <p:blipFill rotWithShape="1">
+        <p:blipFill>
           <a:blip r:embed="rId5">
             <a:extLst>
               <a:ext uri="{28A0092B-C50C-407E-A947-70E740481C1C}">
@@ -12106,13 +12061,15 @@
               </a:ext>
             </a:extLst>
           </a:blip>
-          <a:srcRect l="12196"/>
-          <a:stretch/>
+          <a:srcRect/>
+          <a:stretch>
+            <a:fillRect/>
+          </a:stretch>
         </p:blipFill>
         <p:spPr bwMode="auto">
           <a:xfrm>
-            <a:off x="4752828" y="32619924"/>
-            <a:ext cx="7108839" cy="6115050"/>
+            <a:off x="38956628" y="39172652"/>
+            <a:ext cx="1679338" cy="2099173"/>
           </a:xfrm>
           <a:prstGeom prst="rect">
             <a:avLst/>
@@ -12129,9 +12086,72 @@
           </a:extLst>
         </p:spPr>
       </p:pic>
+      <p:sp>
+        <p:nvSpPr>
+          <p:cNvPr id="44" name="Rectangle 11"/>
+          <p:cNvSpPr>
+            <a:spLocks noChangeArrowheads="1"/>
+          </p:cNvSpPr>
+          <p:nvPr/>
+        </p:nvSpPr>
+        <p:spPr bwMode="auto">
+          <a:xfrm>
+            <a:off x="0" y="0"/>
+            <a:ext cx="43205400" cy="0"/>
+          </a:xfrm>
+          <a:prstGeom prst="rect">
+            <a:avLst/>
+          </a:prstGeom>
+          <a:noFill/>
+          <a:ln>
+            <a:noFill/>
+          </a:ln>
+          <a:effectLst/>
+          <a:extLst>
+            <a:ext uri="{909E8E84-426E-40DD-AFC4-6F175D3DCCD1}">
+              <a14:hiddenFill xmlns:a14="http://schemas.microsoft.com/office/drawing/2010/main">
+                <a:solidFill>
+                  <a:schemeClr val="accent1"/>
+                </a:solidFill>
+              </a14:hiddenFill>
+            </a:ext>
+            <a:ext uri="{91240B29-F687-4F45-9708-019B960494DF}">
+              <a14:hiddenLine xmlns:a14="http://schemas.microsoft.com/office/drawing/2010/main" w="9525">
+                <a:solidFill>
+                  <a:schemeClr val="tx1"/>
+                </a:solidFill>
+                <a:miter lim="800000"/>
+                <a:headEnd/>
+                <a:tailEnd/>
+              </a14:hiddenLine>
+            </a:ext>
+            <a:ext uri="{AF507438-7753-43E0-B8FC-AC1667EBCBE1}">
+              <a14:hiddenEffects xmlns:a14="http://schemas.microsoft.com/office/drawing/2010/main">
+                <a:effectLst>
+                  <a:outerShdw dist="35921" dir="2700000" algn="ctr" rotWithShape="0">
+                    <a:schemeClr val="bg2"/>
+                  </a:outerShdw>
+                </a:effectLst>
+              </a14:hiddenEffects>
+            </a:ext>
+          </a:extLst>
+        </p:spPr>
+        <p:txBody>
+          <a:bodyPr vert="horz" wrap="none" lIns="91440" tIns="45720" rIns="91440" bIns="45720" numCol="1" anchor="ctr" anchorCtr="0" compatLnSpc="1">
+            <a:prstTxWarp prst="textNoShape">
+              <a:avLst/>
+            </a:prstTxWarp>
+            <a:spAutoFit/>
+          </a:bodyPr>
+          <a:lstStyle/>
+          <a:p>
+            <a:endParaRPr lang="he-IL"/>
+          </a:p>
+        </p:txBody>
+      </p:sp>
       <p:pic>
         <p:nvPicPr>
-          <p:cNvPr id="1032" name="Picture 8" descr="D:\workspace\ruggedsim\manuscript\fitness_landscape.png"/>
+          <p:cNvPr id="1036" name="Picture 12"/>
           <p:cNvPicPr>
             <a:picLocks noChangeAspect="1" noChangeArrowheads="1"/>
           </p:cNvPicPr>
@@ -12152,8 +12172,650 @@
         </p:blipFill>
         <p:spPr bwMode="auto">
           <a:xfrm>
-            <a:off x="16850172" y="31118677"/>
-            <a:ext cx="7621927" cy="7621927"/>
+            <a:off x="33110324" y="40756828"/>
+            <a:ext cx="3914775" cy="619125"/>
+          </a:xfrm>
+          <a:prstGeom prst="rect">
+            <a:avLst/>
+          </a:prstGeom>
+          <a:noFill/>
+          <a:ln>
+            <a:noFill/>
+          </a:ln>
+          <a:effectLst/>
+          <a:extLst>
+            <a:ext uri="{909E8E84-426E-40DD-AFC4-6F175D3DCCD1}">
+              <a14:hiddenFill xmlns:a14="http://schemas.microsoft.com/office/drawing/2010/main">
+                <a:solidFill>
+                  <a:schemeClr val="accent1"/>
+                </a:solidFill>
+              </a14:hiddenFill>
+            </a:ext>
+            <a:ext uri="{91240B29-F687-4F45-9708-019B960494DF}">
+              <a14:hiddenLine xmlns:a14="http://schemas.microsoft.com/office/drawing/2010/main" w="9525">
+                <a:solidFill>
+                  <a:schemeClr val="tx1"/>
+                </a:solidFill>
+                <a:miter lim="800000"/>
+                <a:headEnd/>
+                <a:tailEnd/>
+              </a14:hiddenLine>
+            </a:ext>
+            <a:ext uri="{AF507438-7753-43E0-B8FC-AC1667EBCBE1}">
+              <a14:hiddenEffects xmlns:a14="http://schemas.microsoft.com/office/drawing/2010/main">
+                <a:effectLst>
+                  <a:outerShdw dist="35921" dir="2700000" algn="ctr" rotWithShape="0">
+                    <a:schemeClr val="bg2"/>
+                  </a:outerShdw>
+                </a:effectLst>
+              </a14:hiddenEffects>
+            </a:ext>
+          </a:extLst>
+        </p:spPr>
+      </p:pic>
+      <p:sp>
+        <p:nvSpPr>
+          <p:cNvPr id="78" name="TextBox 77"/>
+          <p:cNvSpPr txBox="1"/>
+          <p:nvPr/>
+        </p:nvSpPr>
+        <p:spPr>
+          <a:xfrm>
+            <a:off x="35481015" y="7988860"/>
+            <a:ext cx="5203805" cy="4054957"/>
+          </a:xfrm>
+          <a:prstGeom prst="rect">
+            <a:avLst/>
+          </a:prstGeom>
+          <a:noFill/>
+          <a:ln>
+            <a:noFill/>
+          </a:ln>
+        </p:spPr>
+        <p:txBody>
+          <a:bodyPr wrap="square" lIns="104498" tIns="52249" rIns="104498" bIns="52249" rtlCol="0" anchor="ctr">
+            <a:noAutofit/>
+          </a:bodyPr>
+          <a:lstStyle/>
+          <a:p>
+            <a:pPr algn="ctr" defTabSz="1044976" rtl="0">
+              <a:defRPr/>
+            </a:pPr>
+            <a:r>
+              <a:rPr lang="en-US" sz="2000" b="1" kern="0" dirty="0">
+                <a:solidFill>
+                  <a:sysClr val="windowText" lastClr="000000"/>
+                </a:solidFill>
+                <a:latin typeface="Helvetica" pitchFamily="34" charset="0"/>
+                <a:cs typeface="Helvetica" pitchFamily="34" charset="0"/>
+              </a:rPr>
+              <a:t>Figure 5. </a:t>
+            </a:r>
+            <a:r>
+              <a:rPr lang="en-US" sz="2000" b="1" kern="0" dirty="0" smtClean="0">
+                <a:solidFill>
+                  <a:sysClr val="windowText" lastClr="000000"/>
+                </a:solidFill>
+                <a:latin typeface="Helvetica" pitchFamily="34" charset="0"/>
+                <a:cs typeface="Helvetica" pitchFamily="34" charset="0"/>
+              </a:rPr>
+              <a:t>Waiting time for appearance of double mutant. </a:t>
+            </a:r>
+            <a:r>
+              <a:rPr lang="en-US" sz="2000" kern="0" dirty="0">
+                <a:solidFill>
+                  <a:sysClr val="windowText" lastClr="000000"/>
+                </a:solidFill>
+                <a:latin typeface="Helvetica" pitchFamily="34" charset="0"/>
+                <a:cs typeface="Helvetica" pitchFamily="34" charset="0"/>
+              </a:rPr>
+              <a:t>The number of </a:t>
+            </a:r>
+            <a:r>
+              <a:rPr lang="en-US" sz="2000" kern="0" dirty="0" smtClean="0">
+                <a:solidFill>
+                  <a:sysClr val="windowText" lastClr="000000"/>
+                </a:solidFill>
+                <a:latin typeface="Helvetica" pitchFamily="34" charset="0"/>
+                <a:cs typeface="Helvetica" pitchFamily="34" charset="0"/>
+              </a:rPr>
+              <a:t> generations before the appearance of a double mutant. Approximated by </a:t>
+            </a:r>
+            <a:r>
+              <a:rPr lang="en-US" sz="2000" i="1" kern="0" dirty="0" smtClean="0">
+                <a:solidFill>
+                  <a:sysClr val="windowText" lastClr="000000"/>
+                </a:solidFill>
+                <a:latin typeface="Helvetica" pitchFamily="34" charset="0"/>
+                <a:cs typeface="Helvetica" pitchFamily="34" charset="0"/>
+              </a:rPr>
+              <a:t>1/</a:t>
+            </a:r>
+            <a:r>
+              <a:rPr lang="en-US" sz="2000" i="1" kern="0" dirty="0" err="1" smtClean="0">
+                <a:solidFill>
+                  <a:sysClr val="windowText" lastClr="000000"/>
+                </a:solidFill>
+                <a:latin typeface="Helvetica" pitchFamily="34" charset="0"/>
+                <a:cs typeface="Helvetica" pitchFamily="34" charset="0"/>
+              </a:rPr>
+              <a:t>Nq</a:t>
+            </a:r>
+            <a:r>
+              <a:rPr lang="en-US" sz="2000" kern="0" dirty="0" smtClean="0">
+                <a:solidFill>
+                  <a:sysClr val="windowText" lastClr="000000"/>
+                </a:solidFill>
+                <a:latin typeface="Helvetica" pitchFamily="34" charset="0"/>
+                <a:cs typeface="Helvetica" pitchFamily="34" charset="0"/>
+              </a:rPr>
+              <a:t>. </a:t>
+            </a:r>
+            <a:r>
+              <a:rPr lang="en-US" sz="2000" kern="0" dirty="0">
+                <a:solidFill>
+                  <a:sysClr val="windowText" lastClr="000000"/>
+                </a:solidFill>
+                <a:latin typeface="Helvetica" pitchFamily="34" charset="0"/>
+                <a:cs typeface="Helvetica" pitchFamily="34" charset="0"/>
+              </a:rPr>
+              <a:t>Parameters used: </a:t>
+            </a:r>
+            <a:r>
+              <a:rPr lang="en-US" sz="2000" i="1" kern="0" dirty="0">
+                <a:solidFill>
+                  <a:sysClr val="windowText" lastClr="000000"/>
+                </a:solidFill>
+                <a:latin typeface="Helvetica" pitchFamily="34" charset="0"/>
+                <a:cs typeface="Helvetica" pitchFamily="34" charset="0"/>
+              </a:rPr>
+              <a:t>U</a:t>
+            </a:r>
+            <a:r>
+              <a:rPr lang="en-US" sz="2000" kern="0" dirty="0">
+                <a:solidFill>
+                  <a:sysClr val="windowText" lastClr="000000"/>
+                </a:solidFill>
+                <a:latin typeface="Helvetica" pitchFamily="34" charset="0"/>
+                <a:cs typeface="Helvetica" pitchFamily="34" charset="0"/>
+              </a:rPr>
+              <a:t>=0.0004, </a:t>
+            </a:r>
+            <a:r>
+              <a:rPr lang="en-US" sz="2000" i="1" kern="0" dirty="0">
+                <a:solidFill>
+                  <a:sysClr val="windowText" lastClr="000000"/>
+                </a:solidFill>
+                <a:latin typeface="Helvetica" pitchFamily="34" charset="0"/>
+                <a:cs typeface="Helvetica" pitchFamily="34" charset="0"/>
+              </a:rPr>
+              <a:t>µ</a:t>
+            </a:r>
+            <a:r>
+              <a:rPr lang="en-US" sz="2000" kern="0" dirty="0">
+                <a:solidFill>
+                  <a:sysClr val="windowText" lastClr="000000"/>
+                </a:solidFill>
+                <a:latin typeface="Helvetica" pitchFamily="34" charset="0"/>
+                <a:cs typeface="Helvetica" pitchFamily="34" charset="0"/>
+              </a:rPr>
+              <a:t>=</a:t>
+            </a:r>
+            <a:r>
+              <a:rPr lang="en-US" sz="2000" i="1" kern="0" dirty="0">
+                <a:solidFill>
+                  <a:sysClr val="windowText" lastClr="000000"/>
+                </a:solidFill>
+                <a:latin typeface="Helvetica" pitchFamily="34" charset="0"/>
+                <a:cs typeface="Helvetica" pitchFamily="34" charset="0"/>
+              </a:rPr>
+              <a:t>U</a:t>
+            </a:r>
+            <a:r>
+              <a:rPr lang="en-US" sz="2000" kern="0" dirty="0">
+                <a:solidFill>
+                  <a:sysClr val="windowText" lastClr="000000"/>
+                </a:solidFill>
+                <a:latin typeface="Helvetica" pitchFamily="34" charset="0"/>
+                <a:cs typeface="Helvetica" pitchFamily="34" charset="0"/>
+              </a:rPr>
+              <a:t>/5000, </a:t>
+            </a:r>
+            <a:r>
+              <a:rPr lang="en-US" sz="2000" i="1" kern="0" dirty="0">
+                <a:solidFill>
+                  <a:sysClr val="windowText" lastClr="000000"/>
+                </a:solidFill>
+                <a:latin typeface="Helvetica" pitchFamily="34" charset="0"/>
+                <a:cs typeface="Helvetica" pitchFamily="34" charset="0"/>
+              </a:rPr>
+              <a:t>s</a:t>
+            </a:r>
+            <a:r>
+              <a:rPr lang="en-US" sz="2000" kern="0" dirty="0">
+                <a:solidFill>
+                  <a:sysClr val="windowText" lastClr="000000"/>
+                </a:solidFill>
+                <a:latin typeface="Helvetica" pitchFamily="34" charset="0"/>
+                <a:cs typeface="Helvetica" pitchFamily="34" charset="0"/>
+              </a:rPr>
+              <a:t>=0.05, </a:t>
+            </a:r>
+            <a:r>
+              <a:rPr lang="en-US" sz="2000" i="1" kern="0" dirty="0" smtClean="0">
+                <a:solidFill>
+                  <a:sysClr val="windowText" lastClr="000000"/>
+                </a:solidFill>
+                <a:latin typeface="Helvetica" pitchFamily="34" charset="0"/>
+                <a:cs typeface="Helvetica" pitchFamily="34" charset="0"/>
+              </a:rPr>
+              <a:t>N</a:t>
+            </a:r>
+            <a:r>
+              <a:rPr lang="en-US" sz="2000" kern="0" dirty="0" smtClean="0">
+                <a:solidFill>
+                  <a:sysClr val="windowText" lastClr="000000"/>
+                </a:solidFill>
+                <a:latin typeface="Helvetica" pitchFamily="34" charset="0"/>
+                <a:cs typeface="Helvetica" pitchFamily="34" charset="0"/>
+              </a:rPr>
+              <a:t>=10</a:t>
+            </a:r>
+            <a:r>
+              <a:rPr lang="en-US" sz="2000" kern="0" baseline="30000" dirty="0" smtClean="0">
+                <a:solidFill>
+                  <a:sysClr val="windowText" lastClr="000000"/>
+                </a:solidFill>
+                <a:latin typeface="Helvetica" pitchFamily="34" charset="0"/>
+                <a:cs typeface="Helvetica" pitchFamily="34" charset="0"/>
+              </a:rPr>
+              <a:t>8</a:t>
+            </a:r>
+            <a:r>
+              <a:rPr lang="en-US" sz="2000" kern="0" dirty="0">
+                <a:solidFill>
+                  <a:sysClr val="windowText" lastClr="000000"/>
+                </a:solidFill>
+                <a:latin typeface="Helvetica" pitchFamily="34" charset="0"/>
+                <a:cs typeface="Helvetica" pitchFamily="34" charset="0"/>
+              </a:rPr>
+              <a:t>, see Table 1 for refs.</a:t>
+            </a:r>
+            <a:endParaRPr lang="en-US" sz="2000" b="1" kern="0" dirty="0">
+              <a:solidFill>
+                <a:sysClr val="windowText" lastClr="000000"/>
+              </a:solidFill>
+              <a:latin typeface="Helvetica" pitchFamily="34" charset="0"/>
+              <a:cs typeface="Helvetica" pitchFamily="34" charset="0"/>
+            </a:endParaRPr>
+          </a:p>
+        </p:txBody>
+      </p:sp>
+      <p:pic>
+        <p:nvPicPr>
+          <p:cNvPr id="1031" name="Picture 7" descr="D:\university\confrences\GRC2013\adaptation_time_s_0.05_logN_6.png"/>
+          <p:cNvPicPr>
+            <a:picLocks noChangeAspect="1" noChangeArrowheads="1"/>
+          </p:cNvPicPr>
+          <p:nvPr/>
+        </p:nvPicPr>
+        <p:blipFill>
+          <a:blip r:embed="rId7">
+            <a:extLst>
+              <a:ext uri="{28A0092B-C50C-407E-A947-70E740481C1C}">
+                <a14:useLocalDpi xmlns:a14="http://schemas.microsoft.com/office/drawing/2010/main" val="0"/>
+              </a:ext>
+            </a:extLst>
+          </a:blip>
+          <a:srcRect/>
+          <a:stretch>
+            <a:fillRect/>
+          </a:stretch>
+        </p:blipFill>
+        <p:spPr bwMode="auto">
+          <a:xfrm>
+            <a:off x="30459112" y="17498244"/>
+            <a:ext cx="9145588" cy="7316788"/>
+          </a:xfrm>
+          <a:prstGeom prst="rect">
+            <a:avLst/>
+          </a:prstGeom>
+          <a:noFill/>
+          <a:extLst>
+            <a:ext uri="{909E8E84-426E-40DD-AFC4-6F175D3DCCD1}">
+              <a14:hiddenFill xmlns:a14="http://schemas.microsoft.com/office/drawing/2010/main">
+                <a:solidFill>
+                  <a:srgbClr val="FFFFFF"/>
+                </a:solidFill>
+              </a14:hiddenFill>
+            </a:ext>
+          </a:extLst>
+        </p:spPr>
+      </p:pic>
+      <p:sp>
+        <p:nvSpPr>
+          <p:cNvPr id="77" name="TextBox 76"/>
+          <p:cNvSpPr txBox="1"/>
+          <p:nvPr/>
+        </p:nvSpPr>
+        <p:spPr>
+          <a:xfrm>
+            <a:off x="29862781" y="24719185"/>
+            <a:ext cx="10409860" cy="2140099"/>
+          </a:xfrm>
+          <a:prstGeom prst="rect">
+            <a:avLst/>
+          </a:prstGeom>
+          <a:noFill/>
+          <a:ln>
+            <a:noFill/>
+          </a:ln>
+        </p:spPr>
+        <p:txBody>
+          <a:bodyPr wrap="square" lIns="104498" tIns="52249" rIns="104498" bIns="52249" rtlCol="0">
+            <a:noAutofit/>
+          </a:bodyPr>
+          <a:lstStyle/>
+          <a:p>
+            <a:pPr algn="ctr" defTabSz="1044976" rtl="0">
+              <a:defRPr/>
+            </a:pPr>
+            <a:r>
+              <a:rPr lang="en-US" sz="2000" b="1" kern="0" dirty="0">
+                <a:solidFill>
+                  <a:sysClr val="windowText" lastClr="000000"/>
+                </a:solidFill>
+                <a:latin typeface="Helvetica" pitchFamily="34" charset="0"/>
+                <a:cs typeface="Helvetica" pitchFamily="34" charset="0"/>
+              </a:rPr>
+              <a:t>Figure 6</a:t>
+            </a:r>
+            <a:r>
+              <a:rPr lang="en-US" sz="2000" b="1" kern="0" dirty="0" smtClean="0">
+                <a:solidFill>
+                  <a:sysClr val="windowText" lastClr="000000"/>
+                </a:solidFill>
+                <a:latin typeface="Helvetica" pitchFamily="34" charset="0"/>
+                <a:cs typeface="Helvetica" pitchFamily="34" charset="0"/>
+              </a:rPr>
+              <a:t>. Adaptation time. </a:t>
+            </a:r>
+            <a:r>
+              <a:rPr lang="en-US" sz="2000" kern="0" dirty="0" smtClean="0">
+                <a:solidFill>
+                  <a:sysClr val="windowText" lastClr="000000"/>
+                </a:solidFill>
+                <a:latin typeface="Helvetica" pitchFamily="34" charset="0"/>
+                <a:cs typeface="Helvetica" pitchFamily="34" charset="0"/>
+              </a:rPr>
+              <a:t>The number of generations before fixation of a double mutant. The simulation results verify the analytical results: </a:t>
+            </a:r>
+            <a:r>
+              <a:rPr lang="en-US" sz="2000" b="1" i="1" kern="0" dirty="0" smtClean="0">
+                <a:solidFill>
+                  <a:sysClr val="windowText" lastClr="000000"/>
+                </a:solidFill>
+                <a:latin typeface="Helvetica" pitchFamily="34" charset="0"/>
+                <a:cs typeface="Helvetica" pitchFamily="34" charset="0"/>
+              </a:rPr>
+              <a:t>stress-induced </a:t>
+            </a:r>
+            <a:r>
+              <a:rPr lang="en-US" sz="2000" b="1" i="1" kern="0" dirty="0">
+                <a:solidFill>
+                  <a:sysClr val="windowText" lastClr="000000"/>
+                </a:solidFill>
+                <a:latin typeface="Helvetica" pitchFamily="34" charset="0"/>
+                <a:cs typeface="Helvetica" pitchFamily="34" charset="0"/>
+              </a:rPr>
+              <a:t>mutagenesis increases the adaptation </a:t>
+            </a:r>
+            <a:r>
+              <a:rPr lang="en-US" sz="2000" b="1" i="1" kern="0" dirty="0" smtClean="0">
+                <a:solidFill>
+                  <a:sysClr val="windowText" lastClr="000000"/>
+                </a:solidFill>
+                <a:latin typeface="Helvetica" pitchFamily="34" charset="0"/>
+                <a:cs typeface="Helvetica" pitchFamily="34" charset="0"/>
+              </a:rPr>
+              <a:t>rate</a:t>
+            </a:r>
+            <a:r>
+              <a:rPr lang="en-US" sz="2000" kern="0" dirty="0" smtClean="0">
+                <a:solidFill>
+                  <a:sysClr val="windowText" lastClr="000000"/>
+                </a:solidFill>
+                <a:latin typeface="Helvetica" pitchFamily="34" charset="0"/>
+                <a:cs typeface="Helvetica" pitchFamily="34" charset="0"/>
+              </a:rPr>
+              <a:t>. Parameters used: </a:t>
+            </a:r>
+            <a:r>
+              <a:rPr lang="en-US" sz="2000" i="1" kern="0" dirty="0" smtClean="0">
+                <a:solidFill>
+                  <a:sysClr val="windowText" lastClr="000000"/>
+                </a:solidFill>
+                <a:latin typeface="Helvetica" pitchFamily="34" charset="0"/>
+                <a:cs typeface="Helvetica" pitchFamily="34" charset="0"/>
+              </a:rPr>
+              <a:t>U</a:t>
+            </a:r>
+            <a:r>
+              <a:rPr lang="en-US" sz="2000" kern="0" dirty="0" smtClean="0">
+                <a:solidFill>
+                  <a:sysClr val="windowText" lastClr="000000"/>
+                </a:solidFill>
+                <a:latin typeface="Helvetica" pitchFamily="34" charset="0"/>
+                <a:cs typeface="Helvetica" pitchFamily="34" charset="0"/>
+              </a:rPr>
+              <a:t>=0.0004, </a:t>
+            </a:r>
+            <a:r>
+              <a:rPr lang="en-US" sz="2000" i="1" kern="0" dirty="0" smtClean="0">
+                <a:solidFill>
+                  <a:sysClr val="windowText" lastClr="000000"/>
+                </a:solidFill>
+                <a:latin typeface="Helvetica" pitchFamily="34" charset="0"/>
+                <a:cs typeface="Helvetica" pitchFamily="34" charset="0"/>
+              </a:rPr>
+              <a:t>µ</a:t>
+            </a:r>
+            <a:r>
+              <a:rPr lang="en-US" sz="2000" kern="0" dirty="0" smtClean="0">
+                <a:solidFill>
+                  <a:sysClr val="windowText" lastClr="000000"/>
+                </a:solidFill>
+                <a:latin typeface="Helvetica" pitchFamily="34" charset="0"/>
+                <a:cs typeface="Helvetica" pitchFamily="34" charset="0"/>
+              </a:rPr>
+              <a:t>=</a:t>
+            </a:r>
+            <a:r>
+              <a:rPr lang="en-US" sz="2000" i="1" kern="0" dirty="0" smtClean="0">
+                <a:solidFill>
+                  <a:sysClr val="windowText" lastClr="000000"/>
+                </a:solidFill>
+                <a:latin typeface="Helvetica" pitchFamily="34" charset="0"/>
+                <a:cs typeface="Helvetica" pitchFamily="34" charset="0"/>
+              </a:rPr>
+              <a:t>U</a:t>
+            </a:r>
+            <a:r>
+              <a:rPr lang="en-US" sz="2000" kern="0" dirty="0" smtClean="0">
+                <a:solidFill>
+                  <a:sysClr val="windowText" lastClr="000000"/>
+                </a:solidFill>
+                <a:latin typeface="Helvetica" pitchFamily="34" charset="0"/>
+                <a:cs typeface="Helvetica" pitchFamily="34" charset="0"/>
+              </a:rPr>
+              <a:t>/5000, </a:t>
+            </a:r>
+            <a:r>
+              <a:rPr lang="en-US" sz="2000" i="1" kern="0" dirty="0" smtClean="0">
+                <a:solidFill>
+                  <a:sysClr val="windowText" lastClr="000000"/>
+                </a:solidFill>
+                <a:latin typeface="Helvetica" pitchFamily="34" charset="0"/>
+                <a:cs typeface="Helvetica" pitchFamily="34" charset="0"/>
+              </a:rPr>
+              <a:t>s</a:t>
+            </a:r>
+            <a:r>
+              <a:rPr lang="en-US" sz="2000" kern="0" dirty="0" smtClean="0">
+                <a:solidFill>
+                  <a:sysClr val="windowText" lastClr="000000"/>
+                </a:solidFill>
+                <a:latin typeface="Helvetica" pitchFamily="34" charset="0"/>
+                <a:cs typeface="Helvetica" pitchFamily="34" charset="0"/>
+              </a:rPr>
+              <a:t>=0.05, </a:t>
+            </a:r>
+            <a:r>
+              <a:rPr lang="en-US" sz="2000" i="1" kern="0" dirty="0">
+                <a:solidFill>
+                  <a:sysClr val="windowText" lastClr="000000"/>
+                </a:solidFill>
+                <a:latin typeface="Helvetica" pitchFamily="34" charset="0"/>
+                <a:cs typeface="Helvetica" pitchFamily="34" charset="0"/>
+              </a:rPr>
+              <a:t>H</a:t>
+            </a:r>
+            <a:r>
+              <a:rPr lang="en-US" sz="2000" kern="0" dirty="0">
+                <a:solidFill>
+                  <a:sysClr val="windowText" lastClr="000000"/>
+                </a:solidFill>
+                <a:latin typeface="Helvetica" pitchFamily="34" charset="0"/>
+                <a:cs typeface="Helvetica" pitchFamily="34" charset="0"/>
+              </a:rPr>
+              <a:t>=2</a:t>
+            </a:r>
+            <a:r>
+              <a:rPr lang="en-US" sz="2000" kern="0" dirty="0" smtClean="0">
+                <a:solidFill>
+                  <a:sysClr val="windowText" lastClr="000000"/>
+                </a:solidFill>
+                <a:latin typeface="Helvetica" pitchFamily="34" charset="0"/>
+                <a:cs typeface="Helvetica" pitchFamily="34" charset="0"/>
+              </a:rPr>
+              <a:t>, </a:t>
+            </a:r>
+            <a:r>
+              <a:rPr lang="en-US" sz="2000" i="1" kern="0" dirty="0" smtClean="0">
+                <a:solidFill>
+                  <a:sysClr val="windowText" lastClr="000000"/>
+                </a:solidFill>
+                <a:latin typeface="Helvetica" pitchFamily="34" charset="0"/>
+                <a:cs typeface="Helvetica" pitchFamily="34" charset="0"/>
+              </a:rPr>
+              <a:t>N</a:t>
+            </a:r>
+            <a:r>
+              <a:rPr lang="en-US" sz="2000" kern="0" dirty="0" smtClean="0">
+                <a:solidFill>
+                  <a:sysClr val="windowText" lastClr="000000"/>
+                </a:solidFill>
+                <a:latin typeface="Helvetica" pitchFamily="34" charset="0"/>
+                <a:cs typeface="Helvetica" pitchFamily="34" charset="0"/>
+              </a:rPr>
+              <a:t>=10</a:t>
+            </a:r>
+            <a:r>
+              <a:rPr lang="en-US" sz="2000" kern="0" baseline="30000" dirty="0" smtClean="0">
+                <a:solidFill>
+                  <a:sysClr val="windowText" lastClr="000000"/>
+                </a:solidFill>
+                <a:latin typeface="Helvetica" pitchFamily="34" charset="0"/>
+                <a:cs typeface="Helvetica" pitchFamily="34" charset="0"/>
+              </a:rPr>
+              <a:t>8</a:t>
+            </a:r>
+            <a:r>
+              <a:rPr lang="en-US" sz="2000" kern="0" dirty="0" smtClean="0">
+                <a:solidFill>
+                  <a:sysClr val="windowText" lastClr="000000"/>
+                </a:solidFill>
+                <a:latin typeface="Helvetica" pitchFamily="34" charset="0"/>
+                <a:cs typeface="Helvetica" pitchFamily="34" charset="0"/>
+              </a:rPr>
+              <a:t>, see Table 1 for refs.</a:t>
+            </a:r>
+            <a:endParaRPr lang="en-US" sz="2000" kern="0" dirty="0">
+              <a:solidFill>
+                <a:sysClr val="windowText" lastClr="000000"/>
+              </a:solidFill>
+              <a:latin typeface="Helvetica" pitchFamily="34" charset="0"/>
+              <a:cs typeface="Helvetica" pitchFamily="34" charset="0"/>
+            </a:endParaRPr>
+          </a:p>
+        </p:txBody>
+      </p:sp>
+      <p:pic>
+        <p:nvPicPr>
+          <p:cNvPr id="9" name="Picture 6" descr="D:\university\confrences\GRC2013\app_fix_probs_s_0.05_logN_6.png"/>
+          <p:cNvPicPr>
+            <a:picLocks noChangeAspect="1" noChangeArrowheads="1"/>
+          </p:cNvPicPr>
+          <p:nvPr/>
+        </p:nvPicPr>
+        <p:blipFill>
+          <a:blip r:embed="rId8">
+            <a:extLst>
+              <a:ext uri="{28A0092B-C50C-407E-A947-70E740481C1C}">
+                <a14:useLocalDpi xmlns:a14="http://schemas.microsoft.com/office/drawing/2010/main" val="0"/>
+              </a:ext>
+            </a:extLst>
+          </a:blip>
+          <a:srcRect/>
+          <a:stretch>
+            <a:fillRect/>
+          </a:stretch>
+        </p:blipFill>
+        <p:spPr bwMode="auto">
+          <a:xfrm>
+            <a:off x="29451572" y="7921180"/>
+            <a:ext cx="6084888" cy="9742487"/>
+          </a:xfrm>
+          <a:prstGeom prst="rect">
+            <a:avLst/>
+          </a:prstGeom>
+          <a:noFill/>
+          <a:extLst>
+            <a:ext uri="{909E8E84-426E-40DD-AFC4-6F175D3DCCD1}">
+              <a14:hiddenFill xmlns:a14="http://schemas.microsoft.com/office/drawing/2010/main">
+                <a:solidFill>
+                  <a:srgbClr val="FFFFFF"/>
+                </a:solidFill>
+              </a14:hiddenFill>
+            </a:ext>
+          </a:extLst>
+        </p:spPr>
+      </p:pic>
+      <p:pic>
+        <p:nvPicPr>
+          <p:cNvPr id="1035" name="Picture 11" descr="D:\university\confrences\GRC2013\fitness_landscape_stochastic_model.png"/>
+          <p:cNvPicPr>
+            <a:picLocks noChangeAspect="1" noChangeArrowheads="1"/>
+          </p:cNvPicPr>
+          <p:nvPr/>
+        </p:nvPicPr>
+        <p:blipFill>
+          <a:blip r:embed="rId9">
+            <a:extLst>
+              <a:ext uri="{28A0092B-C50C-407E-A947-70E740481C1C}">
+                <a14:useLocalDpi xmlns:a14="http://schemas.microsoft.com/office/drawing/2010/main" val="0"/>
+              </a:ext>
+            </a:extLst>
+          </a:blip>
+          <a:srcRect/>
+          <a:stretch>
+            <a:fillRect/>
+          </a:stretch>
+        </p:blipFill>
+        <p:spPr bwMode="auto">
+          <a:xfrm>
+            <a:off x="17426236" y="30937690"/>
+            <a:ext cx="7562850" cy="7562850"/>
           </a:xfrm>
           <a:prstGeom prst="rect">
             <a:avLst/>
@@ -12178,7 +12840,7 @@
         </p:nvGrpSpPr>
         <p:grpSpPr>
           <a:xfrm>
-            <a:off x="23013763" y="30824632"/>
+            <a:off x="23301795" y="30649658"/>
             <a:ext cx="3629497" cy="7946930"/>
             <a:chOff x="8755658" y="31870227"/>
             <a:chExt cx="3269978" cy="7159749"/>
@@ -12193,7 +12855,7 @@
             <p:nvPr/>
           </p:nvPicPr>
           <p:blipFill rotWithShape="1">
-            <a:blip r:embed="rId7">
+            <a:blip r:embed="rId10">
               <a:extLst>
                 <a:ext uri="{28A0092B-C50C-407E-A947-70E740481C1C}">
                   <a14:useLocalDpi xmlns:a14="http://schemas.microsoft.com/office/drawing/2010/main" val="0"/>
@@ -12257,216 +12919,7 @@
       </p:grpSp>
       <p:pic>
         <p:nvPicPr>
-          <p:cNvPr id="1033" name="Picture 9" descr="C:\Users\yoavram\Pictures\yoav_mypictr_Facebook.jpg"/>
-          <p:cNvPicPr>
-            <a:picLocks noChangeAspect="1" noChangeArrowheads="1"/>
-          </p:cNvPicPr>
-          <p:nvPr/>
-        </p:nvPicPr>
-        <p:blipFill>
-          <a:blip r:embed="rId8">
-            <a:extLst>
-              <a:ext uri="{28A0092B-C50C-407E-A947-70E740481C1C}">
-                <a14:useLocalDpi xmlns:a14="http://schemas.microsoft.com/office/drawing/2010/main" val="0"/>
-              </a:ext>
-            </a:extLst>
-          </a:blip>
-          <a:srcRect/>
-          <a:stretch>
-            <a:fillRect/>
-          </a:stretch>
-        </p:blipFill>
-        <p:spPr bwMode="auto">
-          <a:xfrm>
-            <a:off x="38956628" y="39172652"/>
-            <a:ext cx="1679338" cy="2099173"/>
-          </a:xfrm>
-          <a:prstGeom prst="rect">
-            <a:avLst/>
-          </a:prstGeom>
-          <a:noFill/>
-          <a:extLst>
-            <a:ext uri="{909E8E84-426E-40DD-AFC4-6F175D3DCCD1}">
-              <a14:hiddenFill xmlns:a14="http://schemas.microsoft.com/office/drawing/2010/main">
-                <a:solidFill>
-                  <a:srgbClr val="FFFFFF"/>
-                </a:solidFill>
-              </a14:hiddenFill>
-            </a:ext>
-          </a:extLst>
-        </p:spPr>
-      </p:pic>
-      <p:sp>
-        <p:nvSpPr>
-          <p:cNvPr id="44" name="Rectangle 11"/>
-          <p:cNvSpPr>
-            <a:spLocks noChangeArrowheads="1"/>
-          </p:cNvSpPr>
-          <p:nvPr/>
-        </p:nvSpPr>
-        <p:spPr bwMode="auto">
-          <a:xfrm>
-            <a:off x="0" y="0"/>
-            <a:ext cx="43205400" cy="0"/>
-          </a:xfrm>
-          <a:prstGeom prst="rect">
-            <a:avLst/>
-          </a:prstGeom>
-          <a:noFill/>
-          <a:ln>
-            <a:noFill/>
-          </a:ln>
-          <a:effectLst/>
-          <a:extLst>
-            <a:ext uri="{909E8E84-426E-40DD-AFC4-6F175D3DCCD1}">
-              <a14:hiddenFill xmlns:a14="http://schemas.microsoft.com/office/drawing/2010/main">
-                <a:solidFill>
-                  <a:schemeClr val="accent1"/>
-                </a:solidFill>
-              </a14:hiddenFill>
-            </a:ext>
-            <a:ext uri="{91240B29-F687-4F45-9708-019B960494DF}">
-              <a14:hiddenLine xmlns:a14="http://schemas.microsoft.com/office/drawing/2010/main" w="9525">
-                <a:solidFill>
-                  <a:schemeClr val="tx1"/>
-                </a:solidFill>
-                <a:miter lim="800000"/>
-                <a:headEnd/>
-                <a:tailEnd/>
-              </a14:hiddenLine>
-            </a:ext>
-            <a:ext uri="{AF507438-7753-43E0-B8FC-AC1667EBCBE1}">
-              <a14:hiddenEffects xmlns:a14="http://schemas.microsoft.com/office/drawing/2010/main">
-                <a:effectLst>
-                  <a:outerShdw dist="35921" dir="2700000" algn="ctr" rotWithShape="0">
-                    <a:schemeClr val="bg2"/>
-                  </a:outerShdw>
-                </a:effectLst>
-              </a14:hiddenEffects>
-            </a:ext>
-          </a:extLst>
-        </p:spPr>
-        <p:txBody>
-          <a:bodyPr vert="horz" wrap="none" lIns="91440" tIns="45720" rIns="91440" bIns="45720" numCol="1" anchor="ctr" anchorCtr="0" compatLnSpc="1">
-            <a:prstTxWarp prst="textNoShape">
-              <a:avLst/>
-            </a:prstTxWarp>
-            <a:spAutoFit/>
-          </a:bodyPr>
-          <a:lstStyle/>
-          <a:p>
-            <a:endParaRPr lang="he-IL"/>
-          </a:p>
-        </p:txBody>
-      </p:sp>
-      <p:pic>
-        <p:nvPicPr>
-          <p:cNvPr id="1036" name="Picture 12"/>
-          <p:cNvPicPr>
-            <a:picLocks noChangeAspect="1" noChangeArrowheads="1"/>
-          </p:cNvPicPr>
-          <p:nvPr/>
-        </p:nvPicPr>
-        <p:blipFill>
-          <a:blip r:embed="rId9">
-            <a:extLst>
-              <a:ext uri="{28A0092B-C50C-407E-A947-70E740481C1C}">
-                <a14:useLocalDpi xmlns:a14="http://schemas.microsoft.com/office/drawing/2010/main" val="0"/>
-              </a:ext>
-            </a:extLst>
-          </a:blip>
-          <a:srcRect/>
-          <a:stretch>
-            <a:fillRect/>
-          </a:stretch>
-        </p:blipFill>
-        <p:spPr bwMode="auto">
-          <a:xfrm>
-            <a:off x="33110324" y="40756828"/>
-            <a:ext cx="3914775" cy="619125"/>
-          </a:xfrm>
-          <a:prstGeom prst="rect">
-            <a:avLst/>
-          </a:prstGeom>
-          <a:noFill/>
-          <a:ln>
-            <a:noFill/>
-          </a:ln>
-          <a:effectLst/>
-          <a:extLst>
-            <a:ext uri="{909E8E84-426E-40DD-AFC4-6F175D3DCCD1}">
-              <a14:hiddenFill xmlns:a14="http://schemas.microsoft.com/office/drawing/2010/main">
-                <a:solidFill>
-                  <a:schemeClr val="accent1"/>
-                </a:solidFill>
-              </a14:hiddenFill>
-            </a:ext>
-            <a:ext uri="{91240B29-F687-4F45-9708-019B960494DF}">
-              <a14:hiddenLine xmlns:a14="http://schemas.microsoft.com/office/drawing/2010/main" w="9525">
-                <a:solidFill>
-                  <a:schemeClr val="tx1"/>
-                </a:solidFill>
-                <a:miter lim="800000"/>
-                <a:headEnd/>
-                <a:tailEnd/>
-              </a14:hiddenLine>
-            </a:ext>
-            <a:ext uri="{AF507438-7753-43E0-B8FC-AC1667EBCBE1}">
-              <a14:hiddenEffects xmlns:a14="http://schemas.microsoft.com/office/drawing/2010/main">
-                <a:effectLst>
-                  <a:outerShdw dist="35921" dir="2700000" algn="ctr" rotWithShape="0">
-                    <a:schemeClr val="bg2"/>
-                  </a:outerShdw>
-                </a:effectLst>
-              </a14:hiddenEffects>
-            </a:ext>
-          </a:extLst>
-        </p:spPr>
-      </p:pic>
-      <p:pic>
-        <p:nvPicPr>
-          <p:cNvPr id="1037" name="Picture 13" descr="D:\workspace\ruggedsim\manuscript\analytic_simulation_comparison_SIM_U_0.0004_s_0.05_logN_8.png"/>
-          <p:cNvPicPr>
-            <a:picLocks noChangeAspect="1" noChangeArrowheads="1"/>
-          </p:cNvPicPr>
-          <p:nvPr/>
-        </p:nvPicPr>
-        <p:blipFill>
-          <a:blip r:embed="rId10">
-            <a:extLst>
-              <a:ext uri="{28A0092B-C50C-407E-A947-70E740481C1C}">
-                <a14:useLocalDpi xmlns:a14="http://schemas.microsoft.com/office/drawing/2010/main" val="0"/>
-              </a:ext>
-            </a:extLst>
-          </a:blip>
-          <a:srcRect/>
-          <a:stretch>
-            <a:fillRect/>
-          </a:stretch>
-        </p:blipFill>
-        <p:spPr bwMode="auto">
-          <a:xfrm>
-            <a:off x="30689237" y="17523825"/>
-            <a:ext cx="8756948" cy="6568186"/>
-          </a:xfrm>
-          <a:prstGeom prst="rect">
-            <a:avLst/>
-          </a:prstGeom>
-          <a:noFill/>
-          <a:extLst>
-            <a:ext uri="{909E8E84-426E-40DD-AFC4-6F175D3DCCD1}">
-              <a14:hiddenFill xmlns:a14="http://schemas.microsoft.com/office/drawing/2010/main">
-                <a:solidFill>
-                  <a:srgbClr val="FFFFFF"/>
-                </a:solidFill>
-              </a14:hiddenFill>
-            </a:ext>
-          </a:extLst>
-        </p:spPr>
-      </p:pic>
-      <p:pic>
-        <p:nvPicPr>
-          <p:cNvPr id="1038" name="Picture 14" descr="D:\workspace\ruggedsim\manuscript\analytic_simulation_comparison_appearance_SIM_U_0.0004_s_0.05_logN_8.png"/>
+          <p:cNvPr id="17" name="Picture 13" descr="D:\university\confrences\GRC2013\fitness_landscape_analytic_model.png"/>
           <p:cNvPicPr>
             <a:picLocks noChangeAspect="1" noChangeArrowheads="1"/>
           </p:cNvPicPr>
@@ -12487,8 +12940,8 @@
         </p:blipFill>
         <p:spPr bwMode="auto">
           <a:xfrm>
-            <a:off x="29523580" y="7833793"/>
-            <a:ext cx="6120000" cy="4590333"/>
+            <a:off x="4176764" y="32553546"/>
+            <a:ext cx="6115051" cy="6115050"/>
           </a:xfrm>
           <a:prstGeom prst="rect">
             <a:avLst/>
@@ -12505,791 +12958,91 @@
           </a:extLst>
         </p:spPr>
       </p:pic>
-      <p:pic>
-        <p:nvPicPr>
-          <p:cNvPr id="1039" name="Picture 15" descr="D:\workspace\ruggedsim\manuscript\analytic_simulation_comparison_fixation_SIM_U_0.0004_s_0.05_logN_8.png"/>
-          <p:cNvPicPr>
-            <a:picLocks noChangeAspect="1" noChangeArrowheads="1"/>
-          </p:cNvPicPr>
+      <p:grpSp>
+        <p:nvGrpSpPr>
+          <p:cNvPr id="61" name="Group 60"/>
+          <p:cNvGrpSpPr/>
           <p:nvPr/>
-        </p:nvPicPr>
-        <p:blipFill>
-          <a:blip r:embed="rId12">
+        </p:nvGrpSpPr>
+        <p:grpSpPr>
+          <a:xfrm>
+            <a:off x="9321075" y="32344543"/>
+            <a:ext cx="2986964" cy="6540077"/>
+            <a:chOff x="8755658" y="31870227"/>
+            <a:chExt cx="3269978" cy="7159749"/>
+          </a:xfrm>
+        </p:grpSpPr>
+        <p:pic>
+          <p:nvPicPr>
+            <p:cNvPr id="62" name="Picture 2" descr="D:\workspace\ruggedsim\manuscript\fitness_landscape_colorbar.png"/>
+            <p:cNvPicPr>
+              <a:picLocks noChangeAspect="1" noChangeArrowheads="1"/>
+            </p:cNvPicPr>
+            <p:nvPr/>
+          </p:nvPicPr>
+          <p:blipFill rotWithShape="1">
+            <a:blip r:embed="rId10">
+              <a:extLst>
+                <a:ext uri="{28A0092B-C50C-407E-A947-70E740481C1C}">
+                  <a14:useLocalDpi xmlns:a14="http://schemas.microsoft.com/office/drawing/2010/main" val="0"/>
+                </a:ext>
+              </a:extLst>
+            </a:blip>
+            <a:srcRect l="77619" t="5537" r="16198" b="8115"/>
+            <a:stretch/>
+          </p:blipFill>
+          <p:spPr bwMode="auto">
+            <a:xfrm>
+              <a:off x="10027006" y="32043498"/>
+              <a:ext cx="963016" cy="6986478"/>
+            </a:xfrm>
+            <a:prstGeom prst="rect">
+              <a:avLst/>
+            </a:prstGeom>
+            <a:noFill/>
             <a:extLst>
-              <a:ext uri="{28A0092B-C50C-407E-A947-70E740481C1C}">
-                <a14:useLocalDpi xmlns:a14="http://schemas.microsoft.com/office/drawing/2010/main" val="0"/>
+              <a:ext uri="{909E8E84-426E-40DD-AFC4-6F175D3DCCD1}">
+                <a14:hiddenFill xmlns:a14="http://schemas.microsoft.com/office/drawing/2010/main">
+                  <a:solidFill>
+                    <a:srgbClr val="FFFFFF"/>
+                  </a:solidFill>
+                </a14:hiddenFill>
               </a:ext>
             </a:extLst>
-          </a:blip>
-          <a:srcRect/>
-          <a:stretch>
-            <a:fillRect/>
-          </a:stretch>
-        </p:blipFill>
-        <p:spPr bwMode="auto">
-          <a:xfrm>
-            <a:off x="34564820" y="12691889"/>
-            <a:ext cx="6120000" cy="4590331"/>
-          </a:xfrm>
-          <a:prstGeom prst="rect">
-            <a:avLst/>
-          </a:prstGeom>
-          <a:noFill/>
-          <a:extLst>
-            <a:ext uri="{909E8E84-426E-40DD-AFC4-6F175D3DCCD1}">
-              <a14:hiddenFill xmlns:a14="http://schemas.microsoft.com/office/drawing/2010/main">
-                <a:solidFill>
-                  <a:srgbClr val="FFFFFF"/>
-                </a:solidFill>
-              </a14:hiddenFill>
-            </a:ext>
-          </a:extLst>
-        </p:spPr>
-      </p:pic>
-      <p:sp>
-        <p:nvSpPr>
-          <p:cNvPr id="77" name="TextBox 76"/>
-          <p:cNvSpPr txBox="1"/>
-          <p:nvPr/>
-        </p:nvSpPr>
-        <p:spPr>
-          <a:xfrm>
-            <a:off x="29862781" y="24503161"/>
-            <a:ext cx="10409860" cy="2140099"/>
-          </a:xfrm>
-          <a:prstGeom prst="rect">
-            <a:avLst/>
-          </a:prstGeom>
-          <a:noFill/>
-          <a:ln>
+          </p:spPr>
+        </p:pic>
+        <p:sp>
+          <p:nvSpPr>
+            <p:cNvPr id="63" name="TextBox 62"/>
+            <p:cNvSpPr txBox="1"/>
+            <p:nvPr/>
+          </p:nvSpPr>
+          <p:spPr>
+            <a:xfrm>
+              <a:off x="8755658" y="31870227"/>
+              <a:ext cx="3269978" cy="461665"/>
+            </a:xfrm>
+            <a:prstGeom prst="rect">
+              <a:avLst/>
+            </a:prstGeom>
             <a:noFill/>
-          </a:ln>
-        </p:spPr>
-        <p:txBody>
-          <a:bodyPr wrap="square" lIns="104498" tIns="52249" rIns="104498" bIns="52249" rtlCol="0">
-            <a:noAutofit/>
-          </a:bodyPr>
-          <a:lstStyle/>
-          <a:p>
-            <a:pPr algn="ctr" defTabSz="1044976" rtl="0">
-              <a:defRPr/>
-            </a:pPr>
-            <a:r>
-              <a:rPr lang="en-US" sz="2000" b="1" kern="0" dirty="0">
-                <a:solidFill>
-                  <a:sysClr val="windowText" lastClr="000000"/>
-                </a:solidFill>
-                <a:latin typeface="Helvetica" pitchFamily="34" charset="0"/>
-                <a:cs typeface="Helvetica" pitchFamily="34" charset="0"/>
-              </a:rPr>
-              <a:t>Figure 6</a:t>
-            </a:r>
-            <a:r>
-              <a:rPr lang="en-US" sz="2000" b="1" kern="0" dirty="0" smtClean="0">
-                <a:solidFill>
-                  <a:sysClr val="windowText" lastClr="000000"/>
-                </a:solidFill>
-                <a:latin typeface="Helvetica" pitchFamily="34" charset="0"/>
-                <a:cs typeface="Helvetica" pitchFamily="34" charset="0"/>
-              </a:rPr>
-              <a:t>. Adaptation time. </a:t>
-            </a:r>
-            <a:r>
-              <a:rPr lang="en-US" sz="2000" kern="0" dirty="0" smtClean="0">
-                <a:solidFill>
-                  <a:sysClr val="windowText" lastClr="000000"/>
-                </a:solidFill>
-                <a:latin typeface="Helvetica" pitchFamily="34" charset="0"/>
-                <a:cs typeface="Helvetica" pitchFamily="34" charset="0"/>
-              </a:rPr>
-              <a:t>The number of generations before fixation of a double mutant. The simulation results verify the analytical results: </a:t>
-            </a:r>
-            <a:r>
-              <a:rPr lang="en-US" sz="2000" b="1" i="1" kern="0" dirty="0" smtClean="0">
-                <a:solidFill>
-                  <a:sysClr val="windowText" lastClr="000000"/>
-                </a:solidFill>
-                <a:latin typeface="Helvetica" pitchFamily="34" charset="0"/>
-                <a:cs typeface="Helvetica" pitchFamily="34" charset="0"/>
-              </a:rPr>
-              <a:t>stress-induced </a:t>
-            </a:r>
-            <a:r>
-              <a:rPr lang="en-US" sz="2000" b="1" i="1" kern="0" dirty="0">
-                <a:solidFill>
-                  <a:sysClr val="windowText" lastClr="000000"/>
-                </a:solidFill>
-                <a:latin typeface="Helvetica" pitchFamily="34" charset="0"/>
-                <a:cs typeface="Helvetica" pitchFamily="34" charset="0"/>
-              </a:rPr>
-              <a:t>mutagenesis increases the adaptation </a:t>
-            </a:r>
-            <a:r>
-              <a:rPr lang="en-US" sz="2000" b="1" i="1" kern="0" dirty="0" smtClean="0">
-                <a:solidFill>
-                  <a:sysClr val="windowText" lastClr="000000"/>
-                </a:solidFill>
-                <a:latin typeface="Helvetica" pitchFamily="34" charset="0"/>
-                <a:cs typeface="Helvetica" pitchFamily="34" charset="0"/>
-              </a:rPr>
-              <a:t>rate</a:t>
-            </a:r>
-            <a:r>
-              <a:rPr lang="en-US" sz="2000" kern="0" dirty="0" smtClean="0">
-                <a:solidFill>
-                  <a:sysClr val="windowText" lastClr="000000"/>
-                </a:solidFill>
-                <a:latin typeface="Helvetica" pitchFamily="34" charset="0"/>
-                <a:cs typeface="Helvetica" pitchFamily="34" charset="0"/>
-              </a:rPr>
-              <a:t>. Parameters used: </a:t>
-            </a:r>
-            <a:r>
-              <a:rPr lang="en-US" sz="2000" i="1" kern="0" dirty="0" smtClean="0">
-                <a:solidFill>
-                  <a:sysClr val="windowText" lastClr="000000"/>
-                </a:solidFill>
-                <a:latin typeface="Helvetica" pitchFamily="34" charset="0"/>
-                <a:cs typeface="Helvetica" pitchFamily="34" charset="0"/>
-              </a:rPr>
-              <a:t>U</a:t>
-            </a:r>
-            <a:r>
-              <a:rPr lang="en-US" sz="2000" kern="0" dirty="0" smtClean="0">
-                <a:solidFill>
-                  <a:sysClr val="windowText" lastClr="000000"/>
-                </a:solidFill>
-                <a:latin typeface="Helvetica" pitchFamily="34" charset="0"/>
-                <a:cs typeface="Helvetica" pitchFamily="34" charset="0"/>
-              </a:rPr>
-              <a:t>=0.0004, </a:t>
-            </a:r>
-            <a:r>
-              <a:rPr lang="en-US" sz="2000" i="1" kern="0" dirty="0" smtClean="0">
-                <a:solidFill>
-                  <a:sysClr val="windowText" lastClr="000000"/>
-                </a:solidFill>
-                <a:latin typeface="Helvetica" pitchFamily="34" charset="0"/>
-                <a:cs typeface="Helvetica" pitchFamily="34" charset="0"/>
-              </a:rPr>
-              <a:t>µ</a:t>
-            </a:r>
-            <a:r>
-              <a:rPr lang="en-US" sz="2000" kern="0" dirty="0" smtClean="0">
-                <a:solidFill>
-                  <a:sysClr val="windowText" lastClr="000000"/>
-                </a:solidFill>
-                <a:latin typeface="Helvetica" pitchFamily="34" charset="0"/>
-                <a:cs typeface="Helvetica" pitchFamily="34" charset="0"/>
-              </a:rPr>
-              <a:t>=</a:t>
-            </a:r>
-            <a:r>
-              <a:rPr lang="en-US" sz="2000" i="1" kern="0" dirty="0" smtClean="0">
-                <a:solidFill>
-                  <a:sysClr val="windowText" lastClr="000000"/>
-                </a:solidFill>
-                <a:latin typeface="Helvetica" pitchFamily="34" charset="0"/>
-                <a:cs typeface="Helvetica" pitchFamily="34" charset="0"/>
-              </a:rPr>
-              <a:t>U</a:t>
-            </a:r>
-            <a:r>
-              <a:rPr lang="en-US" sz="2000" kern="0" dirty="0" smtClean="0">
-                <a:solidFill>
-                  <a:sysClr val="windowText" lastClr="000000"/>
-                </a:solidFill>
-                <a:latin typeface="Helvetica" pitchFamily="34" charset="0"/>
-                <a:cs typeface="Helvetica" pitchFamily="34" charset="0"/>
-              </a:rPr>
-              <a:t>/5000, </a:t>
-            </a:r>
-            <a:r>
-              <a:rPr lang="en-US" sz="2000" i="1" kern="0" dirty="0" smtClean="0">
-                <a:solidFill>
-                  <a:sysClr val="windowText" lastClr="000000"/>
-                </a:solidFill>
-                <a:latin typeface="Helvetica" pitchFamily="34" charset="0"/>
-                <a:cs typeface="Helvetica" pitchFamily="34" charset="0"/>
-              </a:rPr>
-              <a:t>s</a:t>
-            </a:r>
-            <a:r>
-              <a:rPr lang="en-US" sz="2000" kern="0" dirty="0" smtClean="0">
-                <a:solidFill>
-                  <a:sysClr val="windowText" lastClr="000000"/>
-                </a:solidFill>
-                <a:latin typeface="Helvetica" pitchFamily="34" charset="0"/>
-                <a:cs typeface="Helvetica" pitchFamily="34" charset="0"/>
-              </a:rPr>
-              <a:t>=0.05, </a:t>
-            </a:r>
-            <a:r>
-              <a:rPr lang="en-US" sz="2000" i="1" kern="0" dirty="0">
-                <a:solidFill>
-                  <a:sysClr val="windowText" lastClr="000000"/>
-                </a:solidFill>
-                <a:latin typeface="Helvetica" pitchFamily="34" charset="0"/>
-                <a:cs typeface="Helvetica" pitchFamily="34" charset="0"/>
-              </a:rPr>
-              <a:t>H</a:t>
-            </a:r>
-            <a:r>
-              <a:rPr lang="en-US" sz="2000" kern="0" dirty="0">
-                <a:solidFill>
-                  <a:sysClr val="windowText" lastClr="000000"/>
-                </a:solidFill>
-                <a:latin typeface="Helvetica" pitchFamily="34" charset="0"/>
-                <a:cs typeface="Helvetica" pitchFamily="34" charset="0"/>
-              </a:rPr>
-              <a:t>=2</a:t>
-            </a:r>
-            <a:r>
-              <a:rPr lang="en-US" sz="2000" kern="0" dirty="0" smtClean="0">
-                <a:solidFill>
-                  <a:sysClr val="windowText" lastClr="000000"/>
-                </a:solidFill>
-                <a:latin typeface="Helvetica" pitchFamily="34" charset="0"/>
-                <a:cs typeface="Helvetica" pitchFamily="34" charset="0"/>
-              </a:rPr>
-              <a:t>, </a:t>
-            </a:r>
-            <a:r>
-              <a:rPr lang="en-US" sz="2000" i="1" kern="0" dirty="0" smtClean="0">
-                <a:solidFill>
-                  <a:sysClr val="windowText" lastClr="000000"/>
-                </a:solidFill>
-                <a:latin typeface="Helvetica" pitchFamily="34" charset="0"/>
-                <a:cs typeface="Helvetica" pitchFamily="34" charset="0"/>
-              </a:rPr>
-              <a:t>N</a:t>
-            </a:r>
-            <a:r>
-              <a:rPr lang="en-US" sz="2000" kern="0" dirty="0" smtClean="0">
-                <a:solidFill>
-                  <a:sysClr val="windowText" lastClr="000000"/>
-                </a:solidFill>
-                <a:latin typeface="Helvetica" pitchFamily="34" charset="0"/>
-                <a:cs typeface="Helvetica" pitchFamily="34" charset="0"/>
-              </a:rPr>
-              <a:t>=10</a:t>
-            </a:r>
-            <a:r>
-              <a:rPr lang="en-US" sz="2000" kern="0" baseline="30000" dirty="0" smtClean="0">
-                <a:solidFill>
-                  <a:sysClr val="windowText" lastClr="000000"/>
-                </a:solidFill>
-                <a:latin typeface="Helvetica" pitchFamily="34" charset="0"/>
-                <a:cs typeface="Helvetica" pitchFamily="34" charset="0"/>
-              </a:rPr>
-              <a:t>8</a:t>
-            </a:r>
-            <a:r>
-              <a:rPr lang="en-US" sz="2000" kern="0" dirty="0" smtClean="0">
-                <a:solidFill>
-                  <a:sysClr val="windowText" lastClr="000000"/>
-                </a:solidFill>
-                <a:latin typeface="Helvetica" pitchFamily="34" charset="0"/>
-                <a:cs typeface="Helvetica" pitchFamily="34" charset="0"/>
-              </a:rPr>
-              <a:t>, see Table 1 for refs.</a:t>
-            </a:r>
-            <a:endParaRPr lang="en-US" sz="2000" kern="0" dirty="0">
-              <a:solidFill>
-                <a:sysClr val="windowText" lastClr="000000"/>
-              </a:solidFill>
-              <a:latin typeface="Helvetica" pitchFamily="34" charset="0"/>
-              <a:cs typeface="Helvetica" pitchFamily="34" charset="0"/>
-            </a:endParaRPr>
-          </a:p>
-        </p:txBody>
-      </p:sp>
-      <p:sp>
-        <p:nvSpPr>
-          <p:cNvPr id="78" name="TextBox 77"/>
-          <p:cNvSpPr txBox="1"/>
-          <p:nvPr/>
-        </p:nvSpPr>
-        <p:spPr>
-          <a:xfrm>
-            <a:off x="35068836" y="7988860"/>
-            <a:ext cx="5203805" cy="4054957"/>
-          </a:xfrm>
-          <a:prstGeom prst="rect">
-            <a:avLst/>
-          </a:prstGeom>
-          <a:noFill/>
-          <a:ln>
-            <a:noFill/>
-          </a:ln>
-        </p:spPr>
-        <p:txBody>
-          <a:bodyPr wrap="square" lIns="104498" tIns="52249" rIns="104498" bIns="52249" rtlCol="0" anchor="ctr">
-            <a:noAutofit/>
-          </a:bodyPr>
-          <a:lstStyle/>
-          <a:p>
-            <a:pPr algn="ctr" defTabSz="1044976" rtl="0">
-              <a:defRPr/>
-            </a:pPr>
-            <a:r>
-              <a:rPr lang="en-US" sz="2000" b="1" kern="0" dirty="0">
-                <a:solidFill>
-                  <a:sysClr val="windowText" lastClr="000000"/>
-                </a:solidFill>
-                <a:latin typeface="Helvetica" pitchFamily="34" charset="0"/>
-                <a:cs typeface="Helvetica" pitchFamily="34" charset="0"/>
-              </a:rPr>
-              <a:t>Figure 5. </a:t>
-            </a:r>
-            <a:r>
-              <a:rPr lang="en-US" sz="2000" b="1" kern="0" dirty="0" smtClean="0">
-                <a:solidFill>
-                  <a:sysClr val="windowText" lastClr="000000"/>
-                </a:solidFill>
-                <a:latin typeface="Helvetica" pitchFamily="34" charset="0"/>
-                <a:cs typeface="Helvetica" pitchFamily="34" charset="0"/>
-              </a:rPr>
-              <a:t>Waiting time for appearance of double mutant. </a:t>
-            </a:r>
-            <a:r>
-              <a:rPr lang="en-US" sz="2000" kern="0" dirty="0">
-                <a:solidFill>
-                  <a:sysClr val="windowText" lastClr="000000"/>
-                </a:solidFill>
-                <a:latin typeface="Helvetica" pitchFamily="34" charset="0"/>
-                <a:cs typeface="Helvetica" pitchFamily="34" charset="0"/>
-              </a:rPr>
-              <a:t>The number of </a:t>
-            </a:r>
-            <a:r>
-              <a:rPr lang="en-US" sz="2000" kern="0" dirty="0" smtClean="0">
-                <a:solidFill>
-                  <a:sysClr val="windowText" lastClr="000000"/>
-                </a:solidFill>
-                <a:latin typeface="Helvetica" pitchFamily="34" charset="0"/>
-                <a:cs typeface="Helvetica" pitchFamily="34" charset="0"/>
-              </a:rPr>
-              <a:t> generations before the appearance of a double mutant. Approximated by </a:t>
-            </a:r>
-            <a:r>
-              <a:rPr lang="en-US" sz="2000" i="1" kern="0" dirty="0" smtClean="0">
-                <a:solidFill>
-                  <a:sysClr val="windowText" lastClr="000000"/>
-                </a:solidFill>
-                <a:latin typeface="Helvetica" pitchFamily="34" charset="0"/>
-                <a:cs typeface="Helvetica" pitchFamily="34" charset="0"/>
-              </a:rPr>
-              <a:t>1/</a:t>
-            </a:r>
-            <a:r>
-              <a:rPr lang="en-US" sz="2000" i="1" kern="0" dirty="0" err="1" smtClean="0">
-                <a:solidFill>
-                  <a:sysClr val="windowText" lastClr="000000"/>
-                </a:solidFill>
-                <a:latin typeface="Helvetica" pitchFamily="34" charset="0"/>
-                <a:cs typeface="Helvetica" pitchFamily="34" charset="0"/>
-              </a:rPr>
-              <a:t>Nq</a:t>
-            </a:r>
-            <a:r>
-              <a:rPr lang="en-US" sz="2000" kern="0" dirty="0" smtClean="0">
-                <a:solidFill>
-                  <a:sysClr val="windowText" lastClr="000000"/>
-                </a:solidFill>
-                <a:latin typeface="Helvetica" pitchFamily="34" charset="0"/>
-                <a:cs typeface="Helvetica" pitchFamily="34" charset="0"/>
-              </a:rPr>
-              <a:t>. </a:t>
-            </a:r>
-            <a:r>
-              <a:rPr lang="en-US" sz="2000" kern="0" dirty="0">
-                <a:solidFill>
-                  <a:sysClr val="windowText" lastClr="000000"/>
-                </a:solidFill>
-                <a:latin typeface="Helvetica" pitchFamily="34" charset="0"/>
-                <a:cs typeface="Helvetica" pitchFamily="34" charset="0"/>
-              </a:rPr>
-              <a:t>Parameters used: </a:t>
-            </a:r>
-            <a:r>
-              <a:rPr lang="en-US" sz="2000" i="1" kern="0" dirty="0">
-                <a:solidFill>
-                  <a:sysClr val="windowText" lastClr="000000"/>
-                </a:solidFill>
-                <a:latin typeface="Helvetica" pitchFamily="34" charset="0"/>
-                <a:cs typeface="Helvetica" pitchFamily="34" charset="0"/>
-              </a:rPr>
-              <a:t>U</a:t>
-            </a:r>
-            <a:r>
-              <a:rPr lang="en-US" sz="2000" kern="0" dirty="0">
-                <a:solidFill>
-                  <a:sysClr val="windowText" lastClr="000000"/>
-                </a:solidFill>
-                <a:latin typeface="Helvetica" pitchFamily="34" charset="0"/>
-                <a:cs typeface="Helvetica" pitchFamily="34" charset="0"/>
-              </a:rPr>
-              <a:t>=0.0004, </a:t>
-            </a:r>
-            <a:r>
-              <a:rPr lang="en-US" sz="2000" i="1" kern="0" dirty="0">
-                <a:solidFill>
-                  <a:sysClr val="windowText" lastClr="000000"/>
-                </a:solidFill>
-                <a:latin typeface="Helvetica" pitchFamily="34" charset="0"/>
-                <a:cs typeface="Helvetica" pitchFamily="34" charset="0"/>
-              </a:rPr>
-              <a:t>µ</a:t>
-            </a:r>
-            <a:r>
-              <a:rPr lang="en-US" sz="2000" kern="0" dirty="0">
-                <a:solidFill>
-                  <a:sysClr val="windowText" lastClr="000000"/>
-                </a:solidFill>
-                <a:latin typeface="Helvetica" pitchFamily="34" charset="0"/>
-                <a:cs typeface="Helvetica" pitchFamily="34" charset="0"/>
-              </a:rPr>
-              <a:t>=</a:t>
-            </a:r>
-            <a:r>
-              <a:rPr lang="en-US" sz="2000" i="1" kern="0" dirty="0">
-                <a:solidFill>
-                  <a:sysClr val="windowText" lastClr="000000"/>
-                </a:solidFill>
-                <a:latin typeface="Helvetica" pitchFamily="34" charset="0"/>
-                <a:cs typeface="Helvetica" pitchFamily="34" charset="0"/>
-              </a:rPr>
-              <a:t>U</a:t>
-            </a:r>
-            <a:r>
-              <a:rPr lang="en-US" sz="2000" kern="0" dirty="0">
-                <a:solidFill>
-                  <a:sysClr val="windowText" lastClr="000000"/>
-                </a:solidFill>
-                <a:latin typeface="Helvetica" pitchFamily="34" charset="0"/>
-                <a:cs typeface="Helvetica" pitchFamily="34" charset="0"/>
-              </a:rPr>
-              <a:t>/5000, </a:t>
-            </a:r>
-            <a:r>
-              <a:rPr lang="en-US" sz="2000" i="1" kern="0" dirty="0">
-                <a:solidFill>
-                  <a:sysClr val="windowText" lastClr="000000"/>
-                </a:solidFill>
-                <a:latin typeface="Helvetica" pitchFamily="34" charset="0"/>
-                <a:cs typeface="Helvetica" pitchFamily="34" charset="0"/>
-              </a:rPr>
-              <a:t>s</a:t>
-            </a:r>
-            <a:r>
-              <a:rPr lang="en-US" sz="2000" kern="0" dirty="0">
-                <a:solidFill>
-                  <a:sysClr val="windowText" lastClr="000000"/>
-                </a:solidFill>
-                <a:latin typeface="Helvetica" pitchFamily="34" charset="0"/>
-                <a:cs typeface="Helvetica" pitchFamily="34" charset="0"/>
-              </a:rPr>
-              <a:t>=0.05, </a:t>
-            </a:r>
-            <a:r>
-              <a:rPr lang="en-US" sz="2000" i="1" kern="0" dirty="0" smtClean="0">
-                <a:solidFill>
-                  <a:sysClr val="windowText" lastClr="000000"/>
-                </a:solidFill>
-                <a:latin typeface="Helvetica" pitchFamily="34" charset="0"/>
-                <a:cs typeface="Helvetica" pitchFamily="34" charset="0"/>
-              </a:rPr>
-              <a:t>N</a:t>
-            </a:r>
-            <a:r>
-              <a:rPr lang="en-US" sz="2000" kern="0" dirty="0" smtClean="0">
-                <a:solidFill>
-                  <a:sysClr val="windowText" lastClr="000000"/>
-                </a:solidFill>
-                <a:latin typeface="Helvetica" pitchFamily="34" charset="0"/>
-                <a:cs typeface="Helvetica" pitchFamily="34" charset="0"/>
-              </a:rPr>
-              <a:t>=10</a:t>
-            </a:r>
-            <a:r>
-              <a:rPr lang="en-US" sz="2000" kern="0" baseline="30000" dirty="0" smtClean="0">
-                <a:solidFill>
-                  <a:sysClr val="windowText" lastClr="000000"/>
-                </a:solidFill>
-                <a:latin typeface="Helvetica" pitchFamily="34" charset="0"/>
-                <a:cs typeface="Helvetica" pitchFamily="34" charset="0"/>
-              </a:rPr>
-              <a:t>8</a:t>
-            </a:r>
-            <a:r>
-              <a:rPr lang="en-US" sz="2000" kern="0" dirty="0">
-                <a:solidFill>
-                  <a:sysClr val="windowText" lastClr="000000"/>
-                </a:solidFill>
-                <a:latin typeface="Helvetica" pitchFamily="34" charset="0"/>
-                <a:cs typeface="Helvetica" pitchFamily="34" charset="0"/>
-              </a:rPr>
-              <a:t>, see Table 1 for refs.</a:t>
-            </a:r>
-            <a:endParaRPr lang="en-US" sz="2000" b="1" kern="0" dirty="0">
-              <a:solidFill>
-                <a:sysClr val="windowText" lastClr="000000"/>
-              </a:solidFill>
-              <a:latin typeface="Helvetica" pitchFamily="34" charset="0"/>
-              <a:cs typeface="Helvetica" pitchFamily="34" charset="0"/>
-            </a:endParaRPr>
-          </a:p>
-        </p:txBody>
-      </p:sp>
-      <p:sp>
-        <p:nvSpPr>
-          <p:cNvPr id="79" name="TextBox 78"/>
-          <p:cNvSpPr txBox="1"/>
-          <p:nvPr/>
-        </p:nvSpPr>
-        <p:spPr>
-          <a:xfrm>
-            <a:off x="29361015" y="13021389"/>
-            <a:ext cx="5203805" cy="4054957"/>
-          </a:xfrm>
-          <a:prstGeom prst="rect">
-            <a:avLst/>
-          </a:prstGeom>
-          <a:noFill/>
-          <a:ln>
-            <a:noFill/>
-          </a:ln>
-        </p:spPr>
-        <p:txBody>
-          <a:bodyPr wrap="square" lIns="104498" tIns="52249" rIns="104498" bIns="52249" rtlCol="0" anchor="ctr">
-            <a:noAutofit/>
-          </a:bodyPr>
-          <a:lstStyle/>
-          <a:p>
-            <a:pPr algn="ctr" defTabSz="1044976" rtl="0">
-              <a:defRPr/>
-            </a:pPr>
-            <a:r>
-              <a:rPr lang="en-US" sz="2000" b="1" kern="0" dirty="0">
-                <a:solidFill>
-                  <a:sysClr val="windowText" lastClr="000000"/>
-                </a:solidFill>
-                <a:latin typeface="Helvetica" pitchFamily="34" charset="0"/>
-                <a:cs typeface="Helvetica" pitchFamily="34" charset="0"/>
-              </a:rPr>
-              <a:t>Figure </a:t>
-            </a:r>
-            <a:r>
-              <a:rPr lang="en-US" sz="2000" b="1" kern="0" dirty="0" smtClean="0">
-                <a:solidFill>
-                  <a:sysClr val="windowText" lastClr="000000"/>
-                </a:solidFill>
-                <a:latin typeface="Helvetica" pitchFamily="34" charset="0"/>
-                <a:cs typeface="Helvetica" pitchFamily="34" charset="0"/>
-              </a:rPr>
-              <a:t>5. Fixation attempts. </a:t>
-            </a:r>
-            <a:r>
-              <a:rPr lang="en-US" sz="2000" kern="0" dirty="0" smtClean="0">
-                <a:solidFill>
-                  <a:sysClr val="windowText" lastClr="000000"/>
-                </a:solidFill>
-                <a:latin typeface="Helvetica" pitchFamily="34" charset="0"/>
-                <a:cs typeface="Helvetica" pitchFamily="34" charset="0"/>
-              </a:rPr>
-              <a:t>The number of double mutants extinctions before fixation. Approximated by </a:t>
-            </a:r>
-            <a:r>
-              <a:rPr lang="en-US" sz="2000" i="1" kern="0" dirty="0" smtClean="0">
-                <a:solidFill>
-                  <a:sysClr val="windowText" lastClr="000000"/>
-                </a:solidFill>
-                <a:latin typeface="Helvetica" pitchFamily="34" charset="0"/>
-                <a:cs typeface="Helvetica" pitchFamily="34" charset="0"/>
-              </a:rPr>
-              <a:t>1/</a:t>
-            </a:r>
-            <a:r>
-              <a:rPr lang="el-GR" sz="2000" i="1" kern="0" dirty="0" smtClean="0">
-                <a:solidFill>
-                  <a:sysClr val="windowText" lastClr="000000"/>
-                </a:solidFill>
-                <a:latin typeface="Helvetica" pitchFamily="34" charset="0"/>
-                <a:cs typeface="Helvetica" pitchFamily="34" charset="0"/>
-              </a:rPr>
-              <a:t>ρ</a:t>
-            </a:r>
-            <a:r>
-              <a:rPr lang="en-US" sz="2000" kern="0" dirty="0" smtClean="0">
-                <a:solidFill>
-                  <a:sysClr val="windowText" lastClr="000000"/>
-                </a:solidFill>
-                <a:latin typeface="Helvetica" pitchFamily="34" charset="0"/>
-                <a:cs typeface="Helvetica" pitchFamily="34" charset="0"/>
-              </a:rPr>
-              <a:t>. </a:t>
-            </a:r>
-            <a:r>
-              <a:rPr lang="en-US" sz="2000" kern="0" dirty="0">
-                <a:solidFill>
-                  <a:sysClr val="windowText" lastClr="000000"/>
-                </a:solidFill>
-                <a:latin typeface="Helvetica" pitchFamily="34" charset="0"/>
-                <a:cs typeface="Helvetica" pitchFamily="34" charset="0"/>
-              </a:rPr>
-              <a:t>Parameters used: </a:t>
-            </a:r>
-            <a:r>
-              <a:rPr lang="en-US" sz="2000" i="1" kern="0" dirty="0">
-                <a:solidFill>
-                  <a:sysClr val="windowText" lastClr="000000"/>
-                </a:solidFill>
-                <a:latin typeface="Helvetica" pitchFamily="34" charset="0"/>
-                <a:cs typeface="Helvetica" pitchFamily="34" charset="0"/>
-              </a:rPr>
-              <a:t>U</a:t>
-            </a:r>
-            <a:r>
-              <a:rPr lang="en-US" sz="2000" kern="0" dirty="0">
-                <a:solidFill>
-                  <a:sysClr val="windowText" lastClr="000000"/>
-                </a:solidFill>
-                <a:latin typeface="Helvetica" pitchFamily="34" charset="0"/>
-                <a:cs typeface="Helvetica" pitchFamily="34" charset="0"/>
-              </a:rPr>
-              <a:t>=0.0004, </a:t>
-            </a:r>
-            <a:r>
-              <a:rPr lang="en-US" sz="2000" i="1" kern="0" dirty="0">
-                <a:solidFill>
-                  <a:sysClr val="windowText" lastClr="000000"/>
-                </a:solidFill>
-                <a:latin typeface="Helvetica" pitchFamily="34" charset="0"/>
-                <a:cs typeface="Helvetica" pitchFamily="34" charset="0"/>
-              </a:rPr>
-              <a:t>µ</a:t>
-            </a:r>
-            <a:r>
-              <a:rPr lang="en-US" sz="2000" kern="0" dirty="0">
-                <a:solidFill>
-                  <a:sysClr val="windowText" lastClr="000000"/>
-                </a:solidFill>
-                <a:latin typeface="Helvetica" pitchFamily="34" charset="0"/>
-                <a:cs typeface="Helvetica" pitchFamily="34" charset="0"/>
-              </a:rPr>
-              <a:t>=</a:t>
-            </a:r>
-            <a:r>
-              <a:rPr lang="en-US" sz="2000" i="1" kern="0" dirty="0">
-                <a:solidFill>
-                  <a:sysClr val="windowText" lastClr="000000"/>
-                </a:solidFill>
-                <a:latin typeface="Helvetica" pitchFamily="34" charset="0"/>
-                <a:cs typeface="Helvetica" pitchFamily="34" charset="0"/>
-              </a:rPr>
-              <a:t>U</a:t>
-            </a:r>
-            <a:r>
-              <a:rPr lang="en-US" sz="2000" kern="0" dirty="0">
-                <a:solidFill>
-                  <a:sysClr val="windowText" lastClr="000000"/>
-                </a:solidFill>
-                <a:latin typeface="Helvetica" pitchFamily="34" charset="0"/>
-                <a:cs typeface="Helvetica" pitchFamily="34" charset="0"/>
-              </a:rPr>
-              <a:t>/5000, </a:t>
-            </a:r>
-            <a:r>
-              <a:rPr lang="en-US" sz="2000" i="1" kern="0" dirty="0">
-                <a:solidFill>
-                  <a:sysClr val="windowText" lastClr="000000"/>
-                </a:solidFill>
-                <a:latin typeface="Helvetica" pitchFamily="34" charset="0"/>
-                <a:cs typeface="Helvetica" pitchFamily="34" charset="0"/>
-              </a:rPr>
-              <a:t>s</a:t>
-            </a:r>
-            <a:r>
-              <a:rPr lang="en-US" sz="2000" kern="0" dirty="0">
-                <a:solidFill>
-                  <a:sysClr val="windowText" lastClr="000000"/>
-                </a:solidFill>
-                <a:latin typeface="Helvetica" pitchFamily="34" charset="0"/>
-                <a:cs typeface="Helvetica" pitchFamily="34" charset="0"/>
-              </a:rPr>
-              <a:t>=0.05, </a:t>
-            </a:r>
-            <a:r>
-              <a:rPr lang="en-US" sz="2000" i="1" kern="0" dirty="0">
-                <a:solidFill>
-                  <a:sysClr val="windowText" lastClr="000000"/>
-                </a:solidFill>
-                <a:latin typeface="Helvetica" pitchFamily="34" charset="0"/>
-                <a:cs typeface="Helvetica" pitchFamily="34" charset="0"/>
-              </a:rPr>
-              <a:t>H</a:t>
-            </a:r>
-            <a:r>
-              <a:rPr lang="en-US" sz="2000" kern="0" dirty="0">
-                <a:solidFill>
-                  <a:sysClr val="windowText" lastClr="000000"/>
-                </a:solidFill>
-                <a:latin typeface="Helvetica" pitchFamily="34" charset="0"/>
-                <a:cs typeface="Helvetica" pitchFamily="34" charset="0"/>
-              </a:rPr>
-              <a:t>=2, </a:t>
-            </a:r>
-            <a:r>
-              <a:rPr lang="en-US" sz="2000" i="1" kern="0" dirty="0">
-                <a:solidFill>
-                  <a:sysClr val="windowText" lastClr="000000"/>
-                </a:solidFill>
-                <a:latin typeface="Helvetica" pitchFamily="34" charset="0"/>
-                <a:cs typeface="Helvetica" pitchFamily="34" charset="0"/>
-              </a:rPr>
-              <a:t>N</a:t>
-            </a:r>
-            <a:r>
-              <a:rPr lang="en-US" sz="2000" kern="0" dirty="0">
-                <a:solidFill>
-                  <a:sysClr val="windowText" lastClr="000000"/>
-                </a:solidFill>
-                <a:latin typeface="Helvetica" pitchFamily="34" charset="0"/>
-                <a:cs typeface="Helvetica" pitchFamily="34" charset="0"/>
-              </a:rPr>
-              <a:t>=10</a:t>
-            </a:r>
-            <a:r>
-              <a:rPr lang="en-US" sz="2000" kern="0" baseline="30000" dirty="0">
-                <a:solidFill>
-                  <a:sysClr val="windowText" lastClr="000000"/>
-                </a:solidFill>
-                <a:latin typeface="Helvetica" pitchFamily="34" charset="0"/>
-                <a:cs typeface="Helvetica" pitchFamily="34" charset="0"/>
-              </a:rPr>
-              <a:t>8</a:t>
-            </a:r>
-            <a:r>
-              <a:rPr lang="en-US" sz="2000" kern="0" dirty="0">
-                <a:solidFill>
-                  <a:sysClr val="windowText" lastClr="000000"/>
-                </a:solidFill>
-                <a:latin typeface="Helvetica" pitchFamily="34" charset="0"/>
-                <a:cs typeface="Helvetica" pitchFamily="34" charset="0"/>
-              </a:rPr>
-              <a:t>, see Table 1 for refs.</a:t>
-            </a:r>
-            <a:endParaRPr lang="en-US" sz="2000" b="1" kern="0" dirty="0">
-              <a:solidFill>
-                <a:sysClr val="windowText" lastClr="000000"/>
-              </a:solidFill>
-              <a:latin typeface="Helvetica" pitchFamily="34" charset="0"/>
-              <a:cs typeface="Helvetica" pitchFamily="34" charset="0"/>
-            </a:endParaRPr>
-          </a:p>
-        </p:txBody>
-      </p:sp>
+          </p:spPr>
+          <p:txBody>
+            <a:bodyPr wrap="square" rtlCol="1">
+              <a:spAutoFit/>
+            </a:bodyPr>
+            <a:lstStyle/>
+            <a:p>
+              <a:pPr algn="ctr"/>
+              <a:r>
+                <a:rPr lang="en-US" sz="2400" dirty="0" smtClean="0"/>
+                <a:t>fitness</a:t>
+              </a:r>
+              <a:endParaRPr lang="he-IL" sz="2400" dirty="0"/>
+            </a:p>
+          </p:txBody>
+        </p:sp>
+      </p:grpSp>
     </p:spTree>
     <p:extLst>
       <p:ext uri="{BB962C8B-B14F-4D97-AF65-F5344CB8AC3E}">

</xml_diff>

<commit_message>
qrcode and some rearrangements
</commit_message>
<xml_diff>
--- a/poster.pptx
+++ b/poster.pptx
@@ -4097,6 +4097,34 @@
               </a:tabLst>
               <a:defRPr/>
             </a:pPr>
+            <a:endParaRPr lang="en-US" sz="2800" kern="0" dirty="0" smtClean="0">
+              <a:latin typeface="+mn-lt"/>
+            </a:endParaRPr>
+          </a:p>
+          <a:p>
+            <a:pPr indent="205704" algn="just" defTabSz="908920" rtl="0" eaLnBrk="1" hangingPunct="1">
+              <a:spcBef>
+                <a:spcPct val="50000"/>
+              </a:spcBef>
+              <a:tabLst>
+                <a:tab pos="497067" algn="l"/>
+              </a:tabLst>
+              <a:defRPr/>
+            </a:pPr>
+            <a:endParaRPr lang="en-US" sz="2800" kern="0" dirty="0">
+              <a:latin typeface="+mn-lt"/>
+            </a:endParaRPr>
+          </a:p>
+          <a:p>
+            <a:pPr indent="205704" algn="just" defTabSz="908920" rtl="0" eaLnBrk="1" hangingPunct="1">
+              <a:spcBef>
+                <a:spcPct val="50000"/>
+              </a:spcBef>
+              <a:tabLst>
+                <a:tab pos="497067" algn="l"/>
+              </a:tabLst>
+              <a:defRPr/>
+            </a:pPr>
             <a:r>
               <a:rPr lang="en-US" sz="2800" kern="0" dirty="0" smtClean="0">
                 <a:latin typeface="+mn-lt"/>
@@ -7699,7 +7727,7 @@
                     </a:solidFill>
                     <a:latin typeface="+mj-lt"/>
                   </a:rPr>
-                  <a:t>Analytic approximations</a:t>
+                  <a:t>Analytic Approximations</a:t>
                 </a:r>
               </a:p>
               <a:p>
@@ -9936,8 +9964,8 @@
         </p:nvSpPr>
         <p:spPr bwMode="auto">
           <a:xfrm>
-            <a:off x="29308836" y="28062000"/>
-            <a:ext cx="11520000" cy="5430861"/>
+            <a:off x="29308836" y="28062001"/>
+            <a:ext cx="11520000" cy="4845956"/>
           </a:xfrm>
           <a:prstGeom prst="rect">
             <a:avLst/>
@@ -10231,8 +10259,8 @@
         </p:nvSpPr>
         <p:spPr bwMode="auto">
           <a:xfrm>
-            <a:off x="29308836" y="39029975"/>
-            <a:ext cx="11520000" cy="2398487"/>
+            <a:off x="29308836" y="38870073"/>
+            <a:ext cx="11520000" cy="2558389"/>
           </a:xfrm>
           <a:prstGeom prst="rect">
             <a:avLst/>
@@ -10473,7 +10501,7 @@
         </p:nvSpPr>
         <p:spPr bwMode="auto">
           <a:xfrm>
-            <a:off x="29308836" y="34291996"/>
+            <a:off x="29308836" y="34132092"/>
             <a:ext cx="11520000" cy="4737981"/>
           </a:xfrm>
           <a:prstGeom prst="rect">
@@ -10743,19 +10771,7 @@
               <a:rPr lang="en-US" sz="2400" dirty="0">
                 <a:latin typeface="+mn-lt"/>
               </a:rPr>
-              <a:t> I, </a:t>
-            </a:r>
-            <a:r>
-              <a:rPr lang="en-US" sz="2400" i="1" dirty="0">
-                <a:latin typeface="+mn-lt"/>
-              </a:rPr>
-              <a:t>et al</a:t>
-            </a:r>
-            <a:r>
-              <a:rPr lang="en-US" sz="2400" i="1" dirty="0" smtClean="0">
-                <a:latin typeface="+mn-lt"/>
-              </a:rPr>
-              <a:t>.</a:t>
+              <a:t> I, et al</a:t>
             </a:r>
             <a:r>
               <a:rPr lang="en-US" sz="2400" dirty="0" smtClean="0">
@@ -11025,19 +11041,37 @@
               <a:rPr lang="en-US" sz="2400" dirty="0">
                 <a:latin typeface="+mn-lt"/>
               </a:rPr>
-              <a:t> 2006, 152(</a:t>
-            </a:r>
-            <a:r>
-              <a:rPr lang="en-US" sz="2400" dirty="0" err="1">
+              <a:t> 2006, </a:t>
+            </a:r>
+            <a:endParaRPr lang="en-US" sz="2400" dirty="0" smtClean="0">
+              <a:latin typeface="+mn-lt"/>
+            </a:endParaRPr>
+          </a:p>
+          <a:p>
+            <a:pPr marL="0" lvl="0" indent="0" algn="l" rtl="0"/>
+            <a:r>
+              <a:rPr lang="en-US" sz="2400" dirty="0" smtClean="0">
+                <a:latin typeface="+mn-lt"/>
+              </a:rPr>
+              <a:t>       152(</a:t>
+            </a:r>
+            <a:r>
+              <a:rPr lang="en-US" sz="2400" dirty="0" err="1" smtClean="0">
                 <a:latin typeface="+mn-lt"/>
               </a:rPr>
               <a:t>Pt</a:t>
             </a:r>
             <a:r>
+              <a:rPr lang="en-US" sz="2400" dirty="0" smtClean="0">
+                <a:latin typeface="+mn-lt"/>
+              </a:rPr>
+              <a:t> </a:t>
+            </a:r>
+            <a:r>
               <a:rPr lang="en-US" sz="2400" dirty="0">
                 <a:latin typeface="+mn-lt"/>
               </a:rPr>
-              <a:t> 9):2505–14</a:t>
+              <a:t>9):2505–14</a:t>
             </a:r>
             <a:r>
               <a:rPr lang="en-US" sz="2400" dirty="0" smtClean="0">
@@ -11562,7 +11596,7 @@
           <p:nvPr>
             <p:extLst>
               <p:ext uri="{D42A27DB-BD31-4B8C-83A1-F6EECF244321}">
-                <p14:modId xmlns:p14="http://schemas.microsoft.com/office/powerpoint/2010/main" val="537653272"/>
+                <p14:modId xmlns:p14="http://schemas.microsoft.com/office/powerpoint/2010/main" val="1670391130"/>
               </p:ext>
             </p:extLst>
           </p:nvPr>
@@ -11592,13 +11626,13 @@
                       <a:pPr algn="ctr" rtl="0"/>
                       <a:r>
                         <a:rPr lang="en-US" sz="2800" dirty="0" smtClean="0">
-                          <a:latin typeface="Helvetica" pitchFamily="34" charset="0"/>
+                          <a:latin typeface="+mn-lt"/>
                           <a:cs typeface="Helvetica" pitchFamily="34" charset="0"/>
                         </a:rPr>
                         <a:t>Citation</a:t>
                       </a:r>
                       <a:endParaRPr lang="he-IL" sz="2800" dirty="0">
-                        <a:latin typeface="Helvetica" pitchFamily="34" charset="0"/>
+                        <a:latin typeface="+mn-lt"/>
                         <a:cs typeface="Helvetica" pitchFamily="34" charset="0"/>
                       </a:endParaRPr>
                     </a:p>
@@ -11613,13 +11647,13 @@
                       <a:pPr algn="ctr" rtl="0"/>
                       <a:r>
                         <a:rPr lang="en-US" sz="2800" dirty="0" smtClean="0">
-                          <a:latin typeface="Helvetica" pitchFamily="34" charset="0"/>
+                          <a:latin typeface="+mn-lt"/>
                           <a:cs typeface="Helvetica" pitchFamily="34" charset="0"/>
                         </a:rPr>
                         <a:t>Estimate</a:t>
                       </a:r>
                       <a:endParaRPr lang="he-IL" sz="2800" dirty="0">
-                        <a:latin typeface="Helvetica" pitchFamily="34" charset="0"/>
+                        <a:latin typeface="+mn-lt"/>
                         <a:cs typeface="Helvetica" pitchFamily="34" charset="0"/>
                       </a:endParaRPr>
                     </a:p>
@@ -11634,13 +11668,13 @@
                       <a:pPr algn="ctr" rtl="0"/>
                       <a:r>
                         <a:rPr lang="en-US" sz="2800" dirty="0" smtClean="0">
-                          <a:latin typeface="Helvetica" pitchFamily="34" charset="0"/>
+                          <a:latin typeface="+mn-lt"/>
                           <a:cs typeface="Helvetica" pitchFamily="34" charset="0"/>
                         </a:rPr>
                         <a:t>Name</a:t>
                       </a:r>
                       <a:endParaRPr lang="he-IL" sz="2800" dirty="0">
-                        <a:latin typeface="Helvetica" pitchFamily="34" charset="0"/>
+                        <a:latin typeface="+mn-lt"/>
                         <a:cs typeface="Helvetica" pitchFamily="34" charset="0"/>
                       </a:endParaRPr>
                     </a:p>
@@ -11655,13 +11689,13 @@
                       <a:pPr algn="ctr" rtl="0"/>
                       <a:r>
                         <a:rPr lang="en-US" sz="2800" dirty="0" smtClean="0">
-                          <a:latin typeface="Helvetica" pitchFamily="34" charset="0"/>
+                          <a:latin typeface="+mn-lt"/>
                           <a:cs typeface="Helvetica" pitchFamily="34" charset="0"/>
                         </a:rPr>
                         <a:t>Sign</a:t>
                       </a:r>
                       <a:endParaRPr lang="he-IL" sz="2800" dirty="0">
-                        <a:latin typeface="Helvetica" pitchFamily="34" charset="0"/>
+                        <a:latin typeface="+mn-lt"/>
                         <a:cs typeface="Helvetica" pitchFamily="34" charset="0"/>
                       </a:endParaRPr>
                     </a:p>
@@ -11678,13 +11712,13 @@
                       <a:pPr algn="ctr" rtl="0"/>
                       <a:r>
                         <a:rPr lang="en-US" sz="2800" dirty="0" smtClean="0">
-                          <a:latin typeface="Helvetica" pitchFamily="34" charset="0"/>
+                          <a:latin typeface="+mn-lt"/>
                           <a:cs typeface="Helvetica" pitchFamily="34" charset="0"/>
                         </a:rPr>
                         <a:t>5, 6</a:t>
                       </a:r>
                       <a:endParaRPr lang="he-IL" sz="2800" dirty="0">
-                        <a:latin typeface="Helvetica" pitchFamily="34" charset="0"/>
+                        <a:latin typeface="+mn-lt"/>
                         <a:cs typeface="Helvetica" pitchFamily="34" charset="0"/>
                       </a:endParaRPr>
                     </a:p>
@@ -11699,13 +11733,13 @@
                       <a:pPr algn="ctr" rtl="0"/>
                       <a:r>
                         <a:rPr lang="en-US" sz="2800" dirty="0" smtClean="0">
-                          <a:latin typeface="Helvetica" pitchFamily="34" charset="0"/>
+                          <a:latin typeface="+mn-lt"/>
                           <a:cs typeface="Helvetica" pitchFamily="34" charset="0"/>
                         </a:rPr>
                         <a:t>0.001-0.01</a:t>
                       </a:r>
                       <a:endParaRPr lang="he-IL" sz="2800" dirty="0">
-                        <a:latin typeface="Helvetica" pitchFamily="34" charset="0"/>
+                        <a:latin typeface="+mn-lt"/>
                         <a:cs typeface="Helvetica" pitchFamily="34" charset="0"/>
                       </a:endParaRPr>
                     </a:p>
@@ -11720,13 +11754,13 @@
                       <a:pPr algn="ctr" rtl="0"/>
                       <a:r>
                         <a:rPr lang="en-US" sz="2800" dirty="0" smtClean="0">
-                          <a:latin typeface="Helvetica" pitchFamily="34" charset="0"/>
+                          <a:latin typeface="+mn-lt"/>
                           <a:cs typeface="Helvetica" pitchFamily="34" charset="0"/>
                         </a:rPr>
                         <a:t>Selection coefficient</a:t>
                       </a:r>
                       <a:endParaRPr lang="he-IL" sz="2800" dirty="0">
-                        <a:latin typeface="Helvetica" pitchFamily="34" charset="0"/>
+                        <a:latin typeface="+mn-lt"/>
                         <a:cs typeface="Helvetica" pitchFamily="34" charset="0"/>
                       </a:endParaRPr>
                     </a:p>
@@ -11741,13 +11775,13 @@
                       <a:pPr algn="ctr" rtl="0"/>
                       <a:r>
                         <a:rPr lang="en-US" sz="2800" i="1" dirty="0" smtClean="0">
-                          <a:latin typeface="Helvetica" pitchFamily="34" charset="0"/>
+                          <a:latin typeface="+mn-lt"/>
                           <a:cs typeface="Helvetica" pitchFamily="34" charset="0"/>
                         </a:rPr>
                         <a:t>s</a:t>
                       </a:r>
                       <a:endParaRPr lang="he-IL" sz="2800" i="1" dirty="0">
-                        <a:latin typeface="Helvetica" pitchFamily="34" charset="0"/>
+                        <a:latin typeface="+mn-lt"/>
                         <a:cs typeface="Helvetica" pitchFamily="34" charset="0"/>
                       </a:endParaRPr>
                     </a:p>
@@ -11780,13 +11814,13 @@
                       </a:pPr>
                       <a:r>
                         <a:rPr lang="en-US" sz="2800" baseline="0" dirty="0" smtClean="0">
-                          <a:latin typeface="Helvetica" pitchFamily="34" charset="0"/>
+                          <a:latin typeface="+mn-lt"/>
                           <a:cs typeface="Helvetica" pitchFamily="34" charset="0"/>
                         </a:rPr>
                         <a:t>6</a:t>
                       </a:r>
                       <a:endParaRPr lang="he-IL" sz="2800" dirty="0" smtClean="0">
-                        <a:latin typeface="Helvetica" pitchFamily="34" charset="0"/>
+                        <a:latin typeface="+mn-lt"/>
                         <a:cs typeface="Helvetica" pitchFamily="34" charset="0"/>
                       </a:endParaRPr>
                     </a:p>
@@ -11801,13 +11835,13 @@
                       <a:pPr algn="ctr" rtl="0"/>
                       <a:r>
                         <a:rPr lang="en-US" sz="2800" dirty="0" smtClean="0">
-                          <a:latin typeface="Helvetica" pitchFamily="34" charset="0"/>
+                          <a:latin typeface="+mn-lt"/>
                           <a:cs typeface="Helvetica" pitchFamily="34" charset="0"/>
                         </a:rPr>
                         <a:t>1-10</a:t>
                       </a:r>
                       <a:endParaRPr lang="he-IL" sz="2800" dirty="0">
-                        <a:latin typeface="Helvetica" pitchFamily="34" charset="0"/>
+                        <a:latin typeface="+mn-lt"/>
                         <a:cs typeface="Helvetica" pitchFamily="34" charset="0"/>
                       </a:endParaRPr>
                     </a:p>
@@ -11822,13 +11856,13 @@
                       <a:pPr algn="ctr" rtl="0"/>
                       <a:r>
                         <a:rPr lang="en-US" sz="2800" dirty="0" smtClean="0">
-                          <a:latin typeface="Helvetica" pitchFamily="34" charset="0"/>
+                          <a:latin typeface="+mn-lt"/>
                           <a:cs typeface="Helvetica" pitchFamily="34" charset="0"/>
                         </a:rPr>
                         <a:t>Double mutant advantage</a:t>
                       </a:r>
                       <a:endParaRPr lang="he-IL" sz="2800" dirty="0">
-                        <a:latin typeface="Helvetica" pitchFamily="34" charset="0"/>
+                        <a:latin typeface="+mn-lt"/>
                         <a:cs typeface="Helvetica" pitchFamily="34" charset="0"/>
                       </a:endParaRPr>
                     </a:p>
@@ -11843,13 +11877,13 @@
                       <a:pPr algn="ctr" rtl="0"/>
                       <a:r>
                         <a:rPr lang="en-US" sz="2800" i="1" dirty="0" smtClean="0">
-                          <a:latin typeface="Helvetica" pitchFamily="34" charset="0"/>
+                          <a:latin typeface="+mn-lt"/>
                           <a:cs typeface="Helvetica" pitchFamily="34" charset="0"/>
                         </a:rPr>
                         <a:t>H</a:t>
                       </a:r>
                       <a:endParaRPr lang="he-IL" sz="2800" i="1" dirty="0">
-                        <a:latin typeface="Helvetica" pitchFamily="34" charset="0"/>
+                        <a:latin typeface="+mn-lt"/>
                         <a:cs typeface="Helvetica" pitchFamily="34" charset="0"/>
                       </a:endParaRPr>
                     </a:p>
@@ -11866,7 +11900,7 @@
                       <a:pPr algn="ctr" rtl="0"/>
                       <a:r>
                         <a:rPr lang="en-US" sz="2800" dirty="0" smtClean="0">
-                          <a:latin typeface="Helvetica" pitchFamily="34" charset="0"/>
+                          <a:latin typeface="+mn-lt"/>
                           <a:cs typeface="Helvetica" pitchFamily="34" charset="0"/>
                         </a:rPr>
                         <a:t>7, 8</a:t>
@@ -11883,13 +11917,13 @@
                       <a:pPr algn="ctr" rtl="0"/>
                       <a:r>
                         <a:rPr lang="en-US" sz="2800" dirty="0" smtClean="0">
-                          <a:latin typeface="Helvetica" pitchFamily="34" charset="0"/>
+                          <a:latin typeface="+mn-lt"/>
                           <a:cs typeface="Helvetica" pitchFamily="34" charset="0"/>
                         </a:rPr>
                         <a:t>0.003-0.0004</a:t>
                       </a:r>
                       <a:endParaRPr lang="he-IL" sz="2800" dirty="0">
-                        <a:latin typeface="Helvetica" pitchFamily="34" charset="0"/>
+                        <a:latin typeface="+mn-lt"/>
                         <a:cs typeface="Helvetica" pitchFamily="34" charset="0"/>
                       </a:endParaRPr>
                     </a:p>
@@ -11904,13 +11938,13 @@
                       <a:pPr algn="ctr" rtl="0"/>
                       <a:r>
                         <a:rPr lang="en-US" sz="2800" dirty="0" smtClean="0">
-                          <a:latin typeface="Helvetica" pitchFamily="34" charset="0"/>
+                          <a:latin typeface="+mn-lt"/>
                           <a:cs typeface="Helvetica" pitchFamily="34" charset="0"/>
                         </a:rPr>
                         <a:t>Genomic mutation rate</a:t>
                       </a:r>
                       <a:endParaRPr lang="he-IL" sz="2800" dirty="0">
-                        <a:latin typeface="Helvetica" pitchFamily="34" charset="0"/>
+                        <a:latin typeface="+mn-lt"/>
                         <a:cs typeface="Helvetica" pitchFamily="34" charset="0"/>
                       </a:endParaRPr>
                     </a:p>
@@ -11925,13 +11959,13 @@
                       <a:pPr algn="ctr" rtl="0"/>
                       <a:r>
                         <a:rPr lang="en-US" sz="2800" i="1" dirty="0" smtClean="0">
-                          <a:latin typeface="Helvetica" pitchFamily="34" charset="0"/>
+                          <a:latin typeface="+mn-lt"/>
                           <a:cs typeface="Helvetica" pitchFamily="34" charset="0"/>
                         </a:rPr>
                         <a:t>U</a:t>
                       </a:r>
                       <a:endParaRPr lang="he-IL" sz="2800" i="1" dirty="0">
-                        <a:latin typeface="Helvetica" pitchFamily="34" charset="0"/>
+                        <a:latin typeface="+mn-lt"/>
                         <a:cs typeface="Helvetica" pitchFamily="34" charset="0"/>
                       </a:endParaRPr>
                     </a:p>
@@ -11948,13 +11982,13 @@
                       <a:pPr algn="ctr" rtl="0"/>
                       <a:r>
                         <a:rPr lang="en-US" sz="2800" dirty="0" smtClean="0">
-                          <a:latin typeface="Helvetica" pitchFamily="34" charset="0"/>
+                          <a:latin typeface="+mn-lt"/>
                           <a:cs typeface="Helvetica" pitchFamily="34" charset="0"/>
                         </a:rPr>
                         <a:t>6</a:t>
                       </a:r>
                       <a:endParaRPr lang="he-IL" sz="2800" dirty="0">
-                        <a:latin typeface="Helvetica" pitchFamily="34" charset="0"/>
+                        <a:latin typeface="+mn-lt"/>
                         <a:cs typeface="Helvetica" pitchFamily="34" charset="0"/>
                       </a:endParaRPr>
                     </a:p>
@@ -11969,20 +12003,20 @@
                       <a:pPr algn="ctr" rtl="0"/>
                       <a:r>
                         <a:rPr lang="en-US" sz="2800" i="1" dirty="0" smtClean="0">
-                          <a:latin typeface="Helvetica" pitchFamily="34" charset="0"/>
+                          <a:latin typeface="+mn-lt"/>
                           <a:cs typeface="Helvetica" pitchFamily="34" charset="0"/>
                         </a:rPr>
                         <a:t>U</a:t>
                       </a:r>
                       <a:r>
                         <a:rPr lang="en-US" sz="2800" dirty="0" smtClean="0">
-                          <a:latin typeface="Helvetica" pitchFamily="34" charset="0"/>
+                          <a:latin typeface="+mn-lt"/>
                           <a:cs typeface="Helvetica" pitchFamily="34" charset="0"/>
                         </a:rPr>
                         <a:t>/5000</a:t>
                       </a:r>
                       <a:endParaRPr lang="he-IL" sz="2800" dirty="0">
-                        <a:latin typeface="Helvetica" pitchFamily="34" charset="0"/>
+                        <a:latin typeface="+mn-lt"/>
                         <a:cs typeface="Helvetica" pitchFamily="34" charset="0"/>
                       </a:endParaRPr>
                     </a:p>
@@ -11997,13 +12031,13 @@
                       <a:pPr algn="ctr" rtl="0"/>
                       <a:r>
                         <a:rPr lang="en-US" sz="2800" dirty="0" smtClean="0">
-                          <a:latin typeface="Helvetica" pitchFamily="34" charset="0"/>
+                          <a:latin typeface="+mn-lt"/>
                           <a:cs typeface="Helvetica" pitchFamily="34" charset="0"/>
                         </a:rPr>
                         <a:t>Beneficial site mutation rate</a:t>
                       </a:r>
                       <a:endParaRPr lang="he-IL" sz="2800" dirty="0">
-                        <a:latin typeface="Helvetica" pitchFamily="34" charset="0"/>
+                        <a:latin typeface="+mn-lt"/>
                         <a:cs typeface="Helvetica" pitchFamily="34" charset="0"/>
                       </a:endParaRPr>
                     </a:p>
@@ -12018,13 +12052,13 @@
                       <a:pPr algn="ctr" rtl="0"/>
                       <a:r>
                         <a:rPr lang="he-IL" sz="2800" i="1" dirty="0" smtClean="0">
-                          <a:latin typeface="Helvetica" pitchFamily="34" charset="0"/>
+                          <a:latin typeface="+mn-lt"/>
                           <a:cs typeface="Helvetica" pitchFamily="34" charset="0"/>
                         </a:rPr>
                         <a:t>µ</a:t>
                       </a:r>
                       <a:endParaRPr lang="he-IL" sz="2800" i="1" dirty="0">
-                        <a:latin typeface="Helvetica" pitchFamily="34" charset="0"/>
+                        <a:latin typeface="+mn-lt"/>
                         <a:cs typeface="Helvetica" pitchFamily="34" charset="0"/>
                       </a:endParaRPr>
                     </a:p>
@@ -12041,13 +12075,13 @@
                       <a:pPr algn="ctr" rtl="0"/>
                       <a:r>
                         <a:rPr lang="en-US" sz="2800" dirty="0" smtClean="0">
-                          <a:latin typeface="Helvetica" pitchFamily="34" charset="0"/>
+                          <a:latin typeface="+mn-lt"/>
                           <a:cs typeface="Helvetica" pitchFamily="34" charset="0"/>
                         </a:rPr>
                         <a:t>9</a:t>
                       </a:r>
                       <a:endParaRPr lang="he-IL" sz="2800" dirty="0">
-                        <a:latin typeface="Helvetica" pitchFamily="34" charset="0"/>
+                        <a:latin typeface="+mn-lt"/>
                         <a:cs typeface="Helvetica" pitchFamily="34" charset="0"/>
                       </a:endParaRPr>
                     </a:p>
@@ -12062,13 +12096,13 @@
                       <a:pPr algn="ctr" rtl="0"/>
                       <a:r>
                         <a:rPr lang="en-US" sz="2800" dirty="0" smtClean="0">
-                          <a:latin typeface="Helvetica" pitchFamily="34" charset="0"/>
+                          <a:latin typeface="+mn-lt"/>
                           <a:cs typeface="Helvetica" pitchFamily="34" charset="0"/>
                         </a:rPr>
                         <a:t>1-100</a:t>
                       </a:r>
                       <a:endParaRPr lang="he-IL" sz="2800" dirty="0">
-                        <a:latin typeface="Helvetica" pitchFamily="34" charset="0"/>
+                        <a:latin typeface="+mn-lt"/>
                         <a:cs typeface="Helvetica" pitchFamily="34" charset="0"/>
                       </a:endParaRPr>
                     </a:p>
@@ -12083,13 +12117,13 @@
                       <a:pPr algn="ctr" rtl="0"/>
                       <a:r>
                         <a:rPr lang="en-US" sz="2800" dirty="0" smtClean="0">
-                          <a:latin typeface="Helvetica" pitchFamily="34" charset="0"/>
+                          <a:latin typeface="+mn-lt"/>
                           <a:cs typeface="Helvetica" pitchFamily="34" charset="0"/>
                         </a:rPr>
                         <a:t>Mutation rate increase</a:t>
                       </a:r>
                       <a:endParaRPr lang="he-IL" sz="2800" dirty="0">
-                        <a:latin typeface="Helvetica" pitchFamily="34" charset="0"/>
+                        <a:latin typeface="+mn-lt"/>
                         <a:cs typeface="Helvetica" pitchFamily="34" charset="0"/>
                       </a:endParaRPr>
                     </a:p>
@@ -12104,13 +12138,13 @@
                       <a:pPr algn="ctr" rtl="0"/>
                       <a:r>
                         <a:rPr lang="el-GR" sz="2800" i="1" dirty="0" smtClean="0">
-                          <a:latin typeface="Helvetica" pitchFamily="34" charset="0"/>
+                          <a:latin typeface="+mn-lt"/>
                           <a:cs typeface="Helvetica" pitchFamily="34" charset="0"/>
                         </a:rPr>
                         <a:t>τ</a:t>
                       </a:r>
                       <a:endParaRPr lang="he-IL" sz="2800" i="1" dirty="0">
-                        <a:latin typeface="Helvetica" pitchFamily="34" charset="0"/>
+                        <a:latin typeface="+mn-lt"/>
                         <a:cs typeface="Helvetica" pitchFamily="34" charset="0"/>
                       </a:endParaRPr>
                     </a:p>
@@ -12127,13 +12161,13 @@
                       <a:pPr algn="ctr" rtl="0"/>
                       <a:r>
                         <a:rPr lang="en-US" sz="2800" dirty="0" smtClean="0">
-                          <a:latin typeface="Helvetica" pitchFamily="34" charset="0"/>
+                          <a:latin typeface="+mn-lt"/>
                           <a:cs typeface="Helvetica" pitchFamily="34" charset="0"/>
                         </a:rPr>
                         <a:t>-</a:t>
                       </a:r>
                       <a:endParaRPr lang="he-IL" sz="2800" dirty="0">
-                        <a:latin typeface="Helvetica" pitchFamily="34" charset="0"/>
+                        <a:latin typeface="+mn-lt"/>
                         <a:cs typeface="Helvetica" pitchFamily="34" charset="0"/>
                       </a:endParaRPr>
                     </a:p>
@@ -12148,34 +12182,34 @@
                       <a:pPr algn="ctr" rtl="0"/>
                       <a:r>
                         <a:rPr lang="en-US" sz="2800" dirty="0" smtClean="0">
-                          <a:latin typeface="Helvetica" pitchFamily="34" charset="0"/>
+                          <a:latin typeface="+mn-lt"/>
                           <a:cs typeface="Helvetica" pitchFamily="34" charset="0"/>
                         </a:rPr>
                         <a:t>10</a:t>
                       </a:r>
                       <a:r>
                         <a:rPr lang="en-US" sz="2800" baseline="30000" dirty="0" smtClean="0">
-                          <a:latin typeface="Helvetica" pitchFamily="34" charset="0"/>
+                          <a:latin typeface="+mn-lt"/>
                           <a:cs typeface="Helvetica" pitchFamily="34" charset="0"/>
                         </a:rPr>
                         <a:t>4</a:t>
                       </a:r>
                       <a:r>
                         <a:rPr lang="en-US" sz="2800" baseline="0" dirty="0" smtClean="0">
-                          <a:latin typeface="Helvetica" pitchFamily="34" charset="0"/>
+                          <a:latin typeface="+mn-lt"/>
                           <a:cs typeface="Helvetica" pitchFamily="34" charset="0"/>
                         </a:rPr>
                         <a:t>-10</a:t>
                       </a:r>
                       <a:r>
                         <a:rPr lang="en-US" sz="2800" baseline="30000" dirty="0" smtClean="0">
-                          <a:latin typeface="Helvetica" pitchFamily="34" charset="0"/>
+                          <a:latin typeface="+mn-lt"/>
                           <a:cs typeface="Helvetica" pitchFamily="34" charset="0"/>
                         </a:rPr>
                         <a:t>10</a:t>
                       </a:r>
                       <a:endParaRPr lang="he-IL" sz="2800" dirty="0">
-                        <a:latin typeface="Helvetica" pitchFamily="34" charset="0"/>
+                        <a:latin typeface="+mn-lt"/>
                         <a:cs typeface="Helvetica" pitchFamily="34" charset="0"/>
                       </a:endParaRPr>
                     </a:p>
@@ -12190,13 +12224,13 @@
                       <a:pPr algn="ctr" rtl="0"/>
                       <a:r>
                         <a:rPr lang="en-US" sz="2800" dirty="0" smtClean="0">
-                          <a:latin typeface="Helvetica" pitchFamily="34" charset="0"/>
+                          <a:latin typeface="+mn-lt"/>
                           <a:cs typeface="Helvetica" pitchFamily="34" charset="0"/>
                         </a:rPr>
                         <a:t>Population size</a:t>
                       </a:r>
                       <a:endParaRPr lang="he-IL" sz="2800" dirty="0">
-                        <a:latin typeface="Helvetica" pitchFamily="34" charset="0"/>
+                        <a:latin typeface="+mn-lt"/>
                         <a:cs typeface="Helvetica" pitchFamily="34" charset="0"/>
                       </a:endParaRPr>
                     </a:p>
@@ -12211,13 +12245,13 @@
                       <a:pPr algn="ctr" rtl="0"/>
                       <a:r>
                         <a:rPr lang="en-US" sz="2800" i="1" dirty="0" smtClean="0">
-                          <a:latin typeface="Helvetica" pitchFamily="34" charset="0"/>
+                          <a:latin typeface="+mn-lt"/>
                           <a:cs typeface="Helvetica" pitchFamily="34" charset="0"/>
                         </a:rPr>
                         <a:t>N</a:t>
                       </a:r>
                       <a:endParaRPr lang="he-IL" sz="2800" i="1" dirty="0">
-                        <a:latin typeface="Helvetica" pitchFamily="34" charset="0"/>
+                        <a:latin typeface="+mn-lt"/>
                         <a:cs typeface="Helvetica" pitchFamily="34" charset="0"/>
                       </a:endParaRPr>
                     </a:p>
@@ -12276,7 +12310,7 @@
               <a:t>. </a:t>
             </a:r>
             <a:r>
-              <a:rPr lang="en-US" sz="2800" b="1" kern="0" dirty="0" smtClean="0">
+              <a:rPr lang="en-US" sz="2800" kern="0" dirty="0" smtClean="0">
                 <a:solidFill>
                   <a:sysClr val="windowText" lastClr="000000"/>
                 </a:solidFill>
@@ -12284,7 +12318,7 @@
               </a:rPr>
               <a:t>Model parameters and estimated values for bacteria.</a:t>
             </a:r>
-            <a:endParaRPr lang="en-US" sz="2800" b="1" kern="0" dirty="0">
+            <a:endParaRPr lang="en-US" sz="2800" kern="0" dirty="0">
               <a:solidFill>
                 <a:sysClr val="windowText" lastClr="000000"/>
               </a:solidFill>
@@ -12293,47 +12327,6 @@
           </a:p>
         </p:txBody>
       </p:sp>
-      <p:pic>
-        <p:nvPicPr>
-          <p:cNvPr id="1033" name="Picture 9" descr="C:\Users\yoavram\Pictures\yoav_mypictr_Facebook.jpg"/>
-          <p:cNvPicPr>
-            <a:picLocks noChangeAspect="1" noChangeArrowheads="1"/>
-          </p:cNvPicPr>
-          <p:nvPr/>
-        </p:nvPicPr>
-        <p:blipFill>
-          <a:blip r:embed="rId4">
-            <a:extLst>
-              <a:ext uri="{28A0092B-C50C-407E-A947-70E740481C1C}">
-                <a14:useLocalDpi xmlns:a14="http://schemas.microsoft.com/office/drawing/2010/main" val="0"/>
-              </a:ext>
-            </a:extLst>
-          </a:blip>
-          <a:srcRect/>
-          <a:stretch>
-            <a:fillRect/>
-          </a:stretch>
-        </p:blipFill>
-        <p:spPr bwMode="auto">
-          <a:xfrm>
-            <a:off x="38956628" y="39172652"/>
-            <a:ext cx="1679338" cy="2099173"/>
-          </a:xfrm>
-          <a:prstGeom prst="rect">
-            <a:avLst/>
-          </a:prstGeom>
-          <a:noFill/>
-          <a:extLst>
-            <a:ext uri="{909E8E84-426E-40DD-AFC4-6F175D3DCCD1}">
-              <a14:hiddenFill xmlns:a14="http://schemas.microsoft.com/office/drawing/2010/main">
-                <a:solidFill>
-                  <a:srgbClr val="FFFFFF"/>
-                </a:solidFill>
-              </a14:hiddenFill>
-            </a:ext>
-          </a:extLst>
-        </p:spPr>
-      </p:pic>
       <p:sp>
         <p:nvSpPr>
           <p:cNvPr id="44" name="Rectangle 11"/>
@@ -12406,7 +12399,7 @@
           <p:nvPr/>
         </p:nvPicPr>
         <p:blipFill>
-          <a:blip r:embed="rId5">
+          <a:blip r:embed="rId4">
             <a:extLst>
               <a:ext uri="{28A0092B-C50C-407E-A947-70E740481C1C}">
                 <a14:useLocalDpi xmlns:a14="http://schemas.microsoft.com/office/drawing/2010/main" val="0"/>
@@ -12420,7 +12413,7 @@
         </p:blipFill>
         <p:spPr bwMode="auto">
           <a:xfrm>
-            <a:off x="33110324" y="40756828"/>
+            <a:off x="33110324" y="40785775"/>
             <a:ext cx="3914775" cy="619125"/>
           </a:xfrm>
           <a:prstGeom prst="rect">
@@ -12470,6 +12463,47 @@
           <p:nvPr/>
         </p:nvPicPr>
         <p:blipFill>
+          <a:blip r:embed="rId5">
+            <a:extLst>
+              <a:ext uri="{28A0092B-C50C-407E-A947-70E740481C1C}">
+                <a14:useLocalDpi xmlns:a14="http://schemas.microsoft.com/office/drawing/2010/main" val="0"/>
+              </a:ext>
+            </a:extLst>
+          </a:blip>
+          <a:srcRect/>
+          <a:stretch>
+            <a:fillRect/>
+          </a:stretch>
+        </p:blipFill>
+        <p:spPr bwMode="auto">
+          <a:xfrm>
+            <a:off x="30459112" y="18938404"/>
+            <a:ext cx="9145588" cy="7316788"/>
+          </a:xfrm>
+          <a:prstGeom prst="rect">
+            <a:avLst/>
+          </a:prstGeom>
+          <a:noFill/>
+          <a:extLst>
+            <a:ext uri="{909E8E84-426E-40DD-AFC4-6F175D3DCCD1}">
+              <a14:hiddenFill xmlns:a14="http://schemas.microsoft.com/office/drawing/2010/main">
+                <a:solidFill>
+                  <a:srgbClr val="FFFFFF"/>
+                </a:solidFill>
+              </a14:hiddenFill>
+            </a:ext>
+          </a:extLst>
+        </p:spPr>
+      </p:pic>
+      <p:pic>
+        <p:nvPicPr>
+          <p:cNvPr id="9" name="Picture 6" descr="D:\university\confrences\GRC2013\app_fix_probs_s_0.05_logN_6.png"/>
+          <p:cNvPicPr>
+            <a:picLocks noChangeAspect="1" noChangeArrowheads="1"/>
+          </p:cNvPicPr>
+          <p:nvPr/>
+        </p:nvPicPr>
+        <p:blipFill>
           <a:blip r:embed="rId6">
             <a:extLst>
               <a:ext uri="{28A0092B-C50C-407E-A947-70E740481C1C}">
@@ -12484,48 +12518,7 @@
         </p:blipFill>
         <p:spPr bwMode="auto">
           <a:xfrm>
-            <a:off x="30459112" y="18290332"/>
-            <a:ext cx="9145588" cy="7316788"/>
-          </a:xfrm>
-          <a:prstGeom prst="rect">
-            <a:avLst/>
-          </a:prstGeom>
-          <a:noFill/>
-          <a:extLst>
-            <a:ext uri="{909E8E84-426E-40DD-AFC4-6F175D3DCCD1}">
-              <a14:hiddenFill xmlns:a14="http://schemas.microsoft.com/office/drawing/2010/main">
-                <a:solidFill>
-                  <a:srgbClr val="FFFFFF"/>
-                </a:solidFill>
-              </a14:hiddenFill>
-            </a:ext>
-          </a:extLst>
-        </p:spPr>
-      </p:pic>
-      <p:pic>
-        <p:nvPicPr>
-          <p:cNvPr id="9" name="Picture 6" descr="D:\university\confrences\GRC2013\app_fix_probs_s_0.05_logN_6.png"/>
-          <p:cNvPicPr>
-            <a:picLocks noChangeAspect="1" noChangeArrowheads="1"/>
-          </p:cNvPicPr>
-          <p:nvPr/>
-        </p:nvPicPr>
-        <p:blipFill>
-          <a:blip r:embed="rId7">
-            <a:extLst>
-              <a:ext uri="{28A0092B-C50C-407E-A947-70E740481C1C}">
-                <a14:useLocalDpi xmlns:a14="http://schemas.microsoft.com/office/drawing/2010/main" val="0"/>
-              </a:ext>
-            </a:extLst>
-          </a:blip>
-          <a:srcRect/>
-          <a:stretch>
-            <a:fillRect/>
-          </a:stretch>
-        </p:blipFill>
-        <p:spPr bwMode="auto">
-          <a:xfrm>
-            <a:off x="29451572" y="7921180"/>
+            <a:off x="29451572" y="8281220"/>
             <a:ext cx="6084888" cy="9742487"/>
           </a:xfrm>
           <a:prstGeom prst="rect">
@@ -12552,7 +12545,7 @@
           <p:nvPr/>
         </p:nvPicPr>
         <p:blipFill rotWithShape="1">
-          <a:blip r:embed="rId8">
+          <a:blip r:embed="rId7">
             <a:extLst>
               <a:ext uri="{28A0092B-C50C-407E-A947-70E740481C1C}">
                 <a14:useLocalDpi xmlns:a14="http://schemas.microsoft.com/office/drawing/2010/main" val="0"/>
@@ -12591,7 +12584,7 @@
           <p:nvPr/>
         </p:nvPicPr>
         <p:blipFill rotWithShape="1">
-          <a:blip r:embed="rId9">
+          <a:blip r:embed="rId8">
             <a:extLst>
               <a:ext uri="{28A0092B-C50C-407E-A947-70E740481C1C}">
                 <a14:useLocalDpi xmlns:a14="http://schemas.microsoft.com/office/drawing/2010/main" val="0"/>
@@ -12689,7 +12682,7 @@
               <p:nvPr/>
             </p:nvPicPr>
             <p:blipFill rotWithShape="1">
-              <a:blip r:embed="rId10">
+              <a:blip r:embed="rId9">
                 <a:extLst>
                   <a:ext uri="{28A0092B-C50C-407E-A947-70E740481C1C}">
                     <a14:useLocalDpi xmlns:a14="http://schemas.microsoft.com/office/drawing/2010/main" val="0"/>
@@ -13025,7 +13018,7 @@
           <p:nvPr/>
         </p:nvPicPr>
         <p:blipFill>
-          <a:blip r:embed="rId11">
+          <a:blip r:embed="rId10">
             <a:extLst>
               <a:ext uri="{28A0092B-C50C-407E-A947-70E740481C1C}">
                 <a14:useLocalDpi xmlns:a14="http://schemas.microsoft.com/office/drawing/2010/main" val="0"/>
@@ -13190,7 +13183,7 @@
           <p:nvPr/>
         </p:nvPicPr>
         <p:blipFill>
-          <a:blip r:embed="rId12">
+          <a:blip r:embed="rId11">
             <a:extLst>
               <a:ext uri="{28A0092B-C50C-407E-A947-70E740481C1C}">
                 <a14:useLocalDpi xmlns:a14="http://schemas.microsoft.com/office/drawing/2010/main" val="0"/>
@@ -13204,7 +13197,7 @@
         </p:blipFill>
         <p:spPr bwMode="auto">
           <a:xfrm>
-            <a:off x="16634148" y="31683820"/>
+            <a:off x="16634148" y="31611812"/>
             <a:ext cx="9629651" cy="9629651"/>
           </a:xfrm>
           <a:prstGeom prst="rect">
@@ -13261,7 +13254,7 @@
         </p:nvSpPr>
         <p:spPr>
           <a:xfrm>
-            <a:off x="30171652" y="8137204"/>
+            <a:off x="30171652" y="8497244"/>
             <a:ext cx="1519159" cy="830997"/>
           </a:xfrm>
           <a:prstGeom prst="rect">
@@ -13292,7 +13285,7 @@
         </p:nvSpPr>
         <p:spPr>
           <a:xfrm>
-            <a:off x="30171651" y="12706807"/>
+            <a:off x="30171651" y="13066847"/>
             <a:ext cx="1519159" cy="830997"/>
           </a:xfrm>
           <a:prstGeom prst="rect">
@@ -13323,7 +13316,7 @@
         </p:nvSpPr>
         <p:spPr>
           <a:xfrm>
-            <a:off x="30884741" y="18899495"/>
+            <a:off x="30884741" y="19519539"/>
             <a:ext cx="1519159" cy="830997"/>
           </a:xfrm>
           <a:prstGeom prst="rect">
@@ -13355,7 +13348,7 @@
           <p:nvPr/>
         </p:nvPicPr>
         <p:blipFill rotWithShape="1">
-          <a:blip r:embed="rId13">
+          <a:blip r:embed="rId12">
             <a:extLst>
               <a:ext uri="{28A0092B-C50C-407E-A947-70E740481C1C}">
                 <a14:useLocalDpi xmlns:a14="http://schemas.microsoft.com/office/drawing/2010/main" val="0"/>
@@ -13416,6 +13409,95 @@
           </a:p>
         </p:txBody>
       </p:sp>
+      <p:pic>
+        <p:nvPicPr>
+          <p:cNvPr id="1052" name="Picture 28" descr="D:\university\confrences\GRC2013\qrcode.png"/>
+          <p:cNvPicPr>
+            <a:picLocks noChangeAspect="1" noChangeArrowheads="1"/>
+          </p:cNvPicPr>
+          <p:nvPr/>
+        </p:nvPicPr>
+        <p:blipFill>
+          <a:blip r:embed="rId13">
+            <a:extLst>
+              <a:ext uri="{28A0092B-C50C-407E-A947-70E740481C1C}">
+                <a14:useLocalDpi xmlns:a14="http://schemas.microsoft.com/office/drawing/2010/main" val="0"/>
+              </a:ext>
+            </a:extLst>
+          </a:blip>
+          <a:srcRect/>
+          <a:stretch>
+            <a:fillRect/>
+          </a:stretch>
+        </p:blipFill>
+        <p:spPr bwMode="auto">
+          <a:xfrm>
+            <a:off x="38452572" y="39051084"/>
+            <a:ext cx="2209800" cy="2209800"/>
+          </a:xfrm>
+          <a:prstGeom prst="rect">
+            <a:avLst/>
+          </a:prstGeom>
+          <a:noFill/>
+          <a:extLst>
+            <a:ext uri="{909E8E84-426E-40DD-AFC4-6F175D3DCCD1}">
+              <a14:hiddenFill xmlns:a14="http://schemas.microsoft.com/office/drawing/2010/main">
+                <a:solidFill>
+                  <a:srgbClr val="FFFFFF"/>
+                </a:solidFill>
+              </a14:hiddenFill>
+            </a:ext>
+          </a:extLst>
+        </p:spPr>
+      </p:pic>
+      <p:pic>
+        <p:nvPicPr>
+          <p:cNvPr id="1053" name="Picture 29" descr="D:\university\confrences\GRC2013\yoav_mypictr_Facebook.jpg"/>
+          <p:cNvPicPr>
+            <a:picLocks noChangeAspect="1" noChangeArrowheads="1"/>
+          </p:cNvPicPr>
+          <p:nvPr/>
+        </p:nvPicPr>
+        <p:blipFill>
+          <a:blip r:embed="rId14">
+            <a:extLst>
+              <a:ext uri="{28A0092B-C50C-407E-A947-70E740481C1C}">
+                <a14:useLocalDpi xmlns:a14="http://schemas.microsoft.com/office/drawing/2010/main" val="0"/>
+              </a:ext>
+            </a:extLst>
+          </a:blip>
+          <a:srcRect/>
+          <a:stretch>
+            <a:fillRect/>
+          </a:stretch>
+        </p:blipFill>
+        <p:spPr bwMode="auto">
+          <a:xfrm>
+            <a:off x="38563796" y="36292332"/>
+            <a:ext cx="1905000" cy="2381250"/>
+          </a:xfrm>
+          <a:prstGeom prst="rect">
+            <a:avLst/>
+          </a:prstGeom>
+          <a:noFill/>
+          <a:effectLst>
+            <a:outerShdw blurRad="50800" dist="38100" dir="2700000" algn="tl" rotWithShape="0">
+              <a:prstClr val="black">
+                <a:alpha val="40000"/>
+              </a:prstClr>
+            </a:outerShdw>
+          </a:effectLst>
+          <a:extLst>
+            <a:ext uri="{909E8E84-426E-40DD-AFC4-6F175D3DCCD1}">
+              <a14:hiddenFill xmlns:a14="http://schemas.microsoft.com/office/drawing/2010/main">
+                <a:solidFill>
+                  <a:srgbClr val="FFFFFF"/>
+                </a:solidFill>
+              </a14:hiddenFill>
+            </a:ext>
+          </a:extLst>
+        </p:spPr>
+      </p:pic>
     </p:spTree>
     <p:extLst>
       <p:ext uri="{BB962C8B-B14F-4D97-AF65-F5344CB8AC3E}">

</xml_diff>

<commit_message>
added rosenbreg1998, reformatted citations and contact info
</commit_message>
<xml_diff>
--- a/poster.pptx
+++ b/poster.pptx
@@ -192,7 +192,7 @@
           <a:p>
             <a:fld id="{444624E0-9A66-4D44-B307-289A2C88DCD3}" type="datetimeFigureOut">
               <a:rPr lang="en-US" smtClean="0"/>
-              <a:t>5/22/2013</a:t>
+              <a:t>5/27/2013</a:t>
             </a:fld>
             <a:endParaRPr lang="en-US"/>
           </a:p>
@@ -456,7 +456,7 @@
           <a:p>
             <a:fld id="{26B2CB66-D8CA-45D3-A759-098C2835DC5E}" type="datetimeFigureOut">
               <a:rPr lang="he-IL" smtClean="0"/>
-              <a:t>י"ג/סיון/תשע"ג</a:t>
+              <a:t>י"ח/סיון/תשע"ג</a:t>
             </a:fld>
             <a:endParaRPr lang="he-IL"/>
           </a:p>
@@ -626,7 +626,7 @@
           <a:p>
             <a:fld id="{26B2CB66-D8CA-45D3-A759-098C2835DC5E}" type="datetimeFigureOut">
               <a:rPr lang="he-IL" smtClean="0"/>
-              <a:t>י"ג/סיון/תשע"ג</a:t>
+              <a:t>י"ח/סיון/תשע"ג</a:t>
             </a:fld>
             <a:endParaRPr lang="he-IL"/>
           </a:p>
@@ -806,7 +806,7 @@
           <a:p>
             <a:fld id="{26B2CB66-D8CA-45D3-A759-098C2835DC5E}" type="datetimeFigureOut">
               <a:rPr lang="he-IL" smtClean="0"/>
-              <a:t>י"ג/סיון/תשע"ג</a:t>
+              <a:t>י"ח/סיון/תשע"ג</a:t>
             </a:fld>
             <a:endParaRPr lang="he-IL"/>
           </a:p>
@@ -976,7 +976,7 @@
           <a:p>
             <a:fld id="{26B2CB66-D8CA-45D3-A759-098C2835DC5E}" type="datetimeFigureOut">
               <a:rPr lang="he-IL" smtClean="0"/>
-              <a:t>י"ג/סיון/תשע"ג</a:t>
+              <a:t>י"ח/סיון/תשע"ג</a:t>
             </a:fld>
             <a:endParaRPr lang="he-IL"/>
           </a:p>
@@ -1222,7 +1222,7 @@
           <a:p>
             <a:fld id="{26B2CB66-D8CA-45D3-A759-098C2835DC5E}" type="datetimeFigureOut">
               <a:rPr lang="he-IL" smtClean="0"/>
-              <a:t>י"ג/סיון/תשע"ג</a:t>
+              <a:t>י"ח/סיון/תשע"ג</a:t>
             </a:fld>
             <a:endParaRPr lang="he-IL"/>
           </a:p>
@@ -1510,7 +1510,7 @@
           <a:p>
             <a:fld id="{26B2CB66-D8CA-45D3-A759-098C2835DC5E}" type="datetimeFigureOut">
               <a:rPr lang="he-IL" smtClean="0"/>
-              <a:t>י"ג/סיון/תשע"ג</a:t>
+              <a:t>י"ח/סיון/תשע"ג</a:t>
             </a:fld>
             <a:endParaRPr lang="he-IL"/>
           </a:p>
@@ -1937,7 +1937,7 @@
           <a:p>
             <a:fld id="{26B2CB66-D8CA-45D3-A759-098C2835DC5E}" type="datetimeFigureOut">
               <a:rPr lang="he-IL" smtClean="0"/>
-              <a:t>י"ג/סיון/תשע"ג</a:t>
+              <a:t>י"ח/סיון/תשע"ג</a:t>
             </a:fld>
             <a:endParaRPr lang="he-IL"/>
           </a:p>
@@ -2055,7 +2055,7 @@
           <a:p>
             <a:fld id="{26B2CB66-D8CA-45D3-A759-098C2835DC5E}" type="datetimeFigureOut">
               <a:rPr lang="he-IL" smtClean="0"/>
-              <a:t>י"ג/סיון/תשע"ג</a:t>
+              <a:t>י"ח/סיון/תשע"ג</a:t>
             </a:fld>
             <a:endParaRPr lang="he-IL"/>
           </a:p>
@@ -2150,7 +2150,7 @@
           <a:p>
             <a:fld id="{26B2CB66-D8CA-45D3-A759-098C2835DC5E}" type="datetimeFigureOut">
               <a:rPr lang="he-IL" smtClean="0"/>
-              <a:t>י"ג/סיון/תשע"ג</a:t>
+              <a:t>י"ח/סיון/תשע"ג</a:t>
             </a:fld>
             <a:endParaRPr lang="he-IL"/>
           </a:p>
@@ -2427,7 +2427,7 @@
           <a:p>
             <a:fld id="{26B2CB66-D8CA-45D3-A759-098C2835DC5E}" type="datetimeFigureOut">
               <a:rPr lang="he-IL" smtClean="0"/>
-              <a:t>י"ג/סיון/תשע"ג</a:t>
+              <a:t>י"ח/סיון/תשע"ג</a:t>
             </a:fld>
             <a:endParaRPr lang="he-IL"/>
           </a:p>
@@ -2680,7 +2680,7 @@
           <a:p>
             <a:fld id="{26B2CB66-D8CA-45D3-A759-098C2835DC5E}" type="datetimeFigureOut">
               <a:rPr lang="he-IL" smtClean="0"/>
-              <a:t>י"ג/סיון/תשע"ג</a:t>
+              <a:t>י"ח/סיון/תשע"ג</a:t>
             </a:fld>
             <a:endParaRPr lang="he-IL"/>
           </a:p>
@@ -2893,7 +2893,7 @@
           <a:p>
             <a:fld id="{26B2CB66-D8CA-45D3-A759-098C2835DC5E}" type="datetimeFigureOut">
               <a:rPr lang="he-IL" smtClean="0"/>
-              <a:t>י"ג/סיון/תשע"ג</a:t>
+              <a:t>י"ח/סיון/תשע"ג</a:t>
             </a:fld>
             <a:endParaRPr lang="he-IL"/>
           </a:p>
@@ -3318,7 +3318,7 @@
         </p:nvSpPr>
         <p:spPr bwMode="auto">
           <a:xfrm>
-            <a:off x="29115966" y="6655388"/>
+            <a:off x="29307600" y="6721200"/>
             <a:ext cx="11520000" cy="19894425"/>
           </a:xfrm>
           <a:prstGeom prst="rect">
@@ -4054,7 +4054,7 @@
             </a:endParaRPr>
           </a:p>
           <a:p>
-            <a:pPr indent="205704" algn="just" defTabSz="908920" rtl="0" eaLnBrk="1" hangingPunct="1">
+            <a:pPr indent="205704" algn="l" defTabSz="908920" rtl="0" eaLnBrk="1" hangingPunct="1">
               <a:spcBef>
                 <a:spcPct val="50000"/>
               </a:spcBef>
@@ -4193,9 +4193,6 @@
               </a:rPr>
               <a:t>the simulation (black).</a:t>
             </a:r>
-            <a:endParaRPr lang="en-US" sz="2800" kern="0" dirty="0" smtClean="0">
-              <a:latin typeface="+mn-lt"/>
-            </a:endParaRPr>
           </a:p>
           <a:p>
             <a:pPr indent="205704" algn="just" defTabSz="908920" rtl="0" eaLnBrk="1" hangingPunct="1">
@@ -5286,7 +5283,16 @@
                 </a:solidFill>
                 <a:latin typeface="+mn-lt"/>
               </a:rPr>
-              <a:t>Fig. 5 describes the model in a similar way to Fig. 4, only node </a:t>
+              <a:t>Fig. 5 describes the model in a similar way to Fig. 4, only node labels specify both the alleles at the A/a and B/b loci </a:t>
+            </a:r>
+            <a:r>
+              <a:rPr lang="en-GB" sz="2800" b="1" kern="0" dirty="0">
+                <a:solidFill>
+                  <a:srgbClr val="000000"/>
+                </a:solidFill>
+                <a:latin typeface="+mn-lt"/>
+              </a:rPr>
+              <a:t>and the number of deleterious mutations</a:t>
             </a:r>
             <a:r>
               <a:rPr lang="en-GB" sz="2800" kern="0" dirty="0">
@@ -5295,70 +5301,7 @@
                 </a:solidFill>
                 <a:latin typeface="+mn-lt"/>
               </a:rPr>
-              <a:t>labels specify </a:t>
-            </a:r>
-            <a:r>
-              <a:rPr lang="en-GB" sz="2800" kern="0" dirty="0">
-                <a:solidFill>
-                  <a:srgbClr val="000000"/>
-                </a:solidFill>
-                <a:latin typeface="+mn-lt"/>
-              </a:rPr>
-              <a:t>both the </a:t>
-            </a:r>
-            <a:r>
-              <a:rPr lang="en-GB" sz="2800" kern="0" dirty="0">
-                <a:solidFill>
-                  <a:srgbClr val="000000"/>
-                </a:solidFill>
-                <a:latin typeface="+mn-lt"/>
-              </a:rPr>
-              <a:t>alleles at the A/a and B/b loci </a:t>
-            </a:r>
-            <a:r>
-              <a:rPr lang="en-GB" sz="2800" b="1" kern="0" dirty="0">
-                <a:solidFill>
-                  <a:srgbClr val="000000"/>
-                </a:solidFill>
-                <a:latin typeface="+mn-lt"/>
-              </a:rPr>
-              <a:t>and the number of deleterious </a:t>
-            </a:r>
-            <a:r>
-              <a:rPr lang="en-GB" sz="2800" b="1" kern="0" dirty="0">
-                <a:solidFill>
-                  <a:srgbClr val="000000"/>
-                </a:solidFill>
-                <a:latin typeface="+mn-lt"/>
-              </a:rPr>
-              <a:t>mutations</a:t>
-            </a:r>
-            <a:r>
-              <a:rPr lang="en-GB" sz="2800" kern="0" dirty="0">
-                <a:solidFill>
-                  <a:srgbClr val="000000"/>
-                </a:solidFill>
-                <a:latin typeface="+mn-lt"/>
-              </a:rPr>
-              <a:t>, </a:t>
-            </a:r>
-            <a:r>
-              <a:rPr lang="en-GB" sz="2800" kern="0" dirty="0">
-                <a:solidFill>
-                  <a:srgbClr val="000000"/>
-                </a:solidFill>
-                <a:latin typeface="+mn-lt"/>
-              </a:rPr>
-              <a:t>but only as much as 3 deleterious mutations are </a:t>
-            </a:r>
-            <a:r>
-              <a:rPr lang="en-GB" sz="2800" kern="0" dirty="0">
-                <a:solidFill>
-                  <a:srgbClr val="000000"/>
-                </a:solidFill>
-                <a:latin typeface="+mn-lt"/>
-              </a:rPr>
-              <a:t>shown to keep the figure simple. </a:t>
+              <a:t>, but only as much as 3 deleterious mutations are shown to keep the figure simple. </a:t>
             </a:r>
             <a:endParaRPr lang="en-US" sz="2800" kern="0" dirty="0">
               <a:solidFill>
@@ -5837,7 +5780,336 @@
                 </a:solidFill>
                 <a:latin typeface="+mn-lt"/>
               </a:rPr>
-              <a:t>if different alleles are separately deleterious but </a:t>
+              <a:t>if different alleles are separately deleterious but jointly advantageous, how can a population evolve from one co-adapted gene complex to a better one? </a:t>
+            </a:r>
+          </a:p>
+          <a:p>
+            <a:pPr indent="205704" algn="l" defTabSz="908920" rtl="0">
+              <a:defRPr/>
+            </a:pPr>
+            <a:r>
+              <a:rPr lang="en-US" sz="2800" kern="0" dirty="0" smtClean="0">
+                <a:solidFill>
+                  <a:srgbClr val="000000"/>
+                </a:solidFill>
+                <a:latin typeface="+mn-lt"/>
+              </a:rPr>
+              <a:t>The problem is illustrated using the </a:t>
+            </a:r>
+            <a:r>
+              <a:rPr lang="en-US" sz="2800" i="1" kern="0" dirty="0" smtClean="0">
+                <a:solidFill>
+                  <a:srgbClr val="000000"/>
+                </a:solidFill>
+                <a:latin typeface="+mn-lt"/>
+              </a:rPr>
+              <a:t>fitness landscape </a:t>
+            </a:r>
+            <a:r>
+              <a:rPr lang="en-US" sz="2800" kern="0" dirty="0" smtClean="0">
+                <a:solidFill>
+                  <a:srgbClr val="000000"/>
+                </a:solidFill>
+                <a:latin typeface="+mn-lt"/>
+              </a:rPr>
+              <a:t>metaphor:</a:t>
+            </a:r>
+          </a:p>
+          <a:p>
+            <a:pPr indent="205704" algn="l" defTabSz="908920" rtl="0">
+              <a:defRPr/>
+            </a:pPr>
+            <a:endParaRPr lang="en-US" sz="2800" kern="0" dirty="0" smtClean="0">
+              <a:solidFill>
+                <a:srgbClr val="000000"/>
+              </a:solidFill>
+              <a:latin typeface="+mn-lt"/>
+            </a:endParaRPr>
+          </a:p>
+          <a:p>
+            <a:pPr indent="205704" algn="l" defTabSz="908920" rtl="0">
+              <a:defRPr/>
+            </a:pPr>
+            <a:endParaRPr lang="en-US" sz="2800" kern="0" dirty="0">
+              <a:solidFill>
+                <a:srgbClr val="000000"/>
+              </a:solidFill>
+              <a:latin typeface="+mn-lt"/>
+            </a:endParaRPr>
+          </a:p>
+          <a:p>
+            <a:pPr indent="205704" algn="l" defTabSz="908920" rtl="0">
+              <a:defRPr/>
+            </a:pPr>
+            <a:endParaRPr lang="en-US" sz="2800" kern="0" dirty="0" smtClean="0">
+              <a:solidFill>
+                <a:srgbClr val="000000"/>
+              </a:solidFill>
+              <a:latin typeface="+mn-lt"/>
+            </a:endParaRPr>
+          </a:p>
+          <a:p>
+            <a:pPr indent="205704" algn="l" defTabSz="908920" rtl="0">
+              <a:defRPr/>
+            </a:pPr>
+            <a:endParaRPr lang="en-US" sz="2800" kern="0" dirty="0">
+              <a:solidFill>
+                <a:srgbClr val="000000"/>
+              </a:solidFill>
+              <a:latin typeface="+mn-lt"/>
+            </a:endParaRPr>
+          </a:p>
+          <a:p>
+            <a:pPr indent="205704" algn="l" defTabSz="908920" rtl="0">
+              <a:defRPr/>
+            </a:pPr>
+            <a:endParaRPr lang="en-US" sz="2800" kern="0" dirty="0" smtClean="0">
+              <a:solidFill>
+                <a:srgbClr val="000000"/>
+              </a:solidFill>
+              <a:latin typeface="+mn-lt"/>
+            </a:endParaRPr>
+          </a:p>
+          <a:p>
+            <a:pPr indent="205704" algn="l" defTabSz="908920" rtl="0">
+              <a:defRPr/>
+            </a:pPr>
+            <a:endParaRPr lang="en-US" sz="2800" kern="0" dirty="0">
+              <a:solidFill>
+                <a:srgbClr val="000000"/>
+              </a:solidFill>
+              <a:latin typeface="+mn-lt"/>
+            </a:endParaRPr>
+          </a:p>
+          <a:p>
+            <a:pPr indent="205704" algn="l" defTabSz="908920" rtl="0">
+              <a:defRPr/>
+            </a:pPr>
+            <a:endParaRPr lang="en-US" sz="2800" kern="0" dirty="0" smtClean="0">
+              <a:solidFill>
+                <a:srgbClr val="000000"/>
+              </a:solidFill>
+              <a:latin typeface="+mn-lt"/>
+            </a:endParaRPr>
+          </a:p>
+          <a:p>
+            <a:pPr indent="205704" algn="l" defTabSz="908920" rtl="0">
+              <a:defRPr/>
+            </a:pPr>
+            <a:endParaRPr lang="en-US" sz="2800" kern="0" dirty="0">
+              <a:solidFill>
+                <a:srgbClr val="000000"/>
+              </a:solidFill>
+              <a:latin typeface="+mn-lt"/>
+            </a:endParaRPr>
+          </a:p>
+          <a:p>
+            <a:pPr indent="205704" algn="l" defTabSz="908920" rtl="0">
+              <a:defRPr/>
+            </a:pPr>
+            <a:endParaRPr lang="en-US" sz="2800" kern="0" dirty="0" smtClean="0">
+              <a:solidFill>
+                <a:srgbClr val="000000"/>
+              </a:solidFill>
+              <a:latin typeface="+mn-lt"/>
+            </a:endParaRPr>
+          </a:p>
+          <a:p>
+            <a:pPr indent="205704" algn="l" defTabSz="908920" rtl="0">
+              <a:defRPr/>
+            </a:pPr>
+            <a:endParaRPr lang="en-US" sz="2800" kern="0" dirty="0">
+              <a:solidFill>
+                <a:srgbClr val="000000"/>
+              </a:solidFill>
+              <a:latin typeface="+mn-lt"/>
+            </a:endParaRPr>
+          </a:p>
+          <a:p>
+            <a:pPr indent="205704" algn="l" defTabSz="908920" rtl="0">
+              <a:defRPr/>
+            </a:pPr>
+            <a:endParaRPr lang="en-US" sz="2800" kern="0" dirty="0" smtClean="0">
+              <a:solidFill>
+                <a:srgbClr val="000000"/>
+              </a:solidFill>
+              <a:latin typeface="+mn-lt"/>
+            </a:endParaRPr>
+          </a:p>
+          <a:p>
+            <a:pPr indent="205704" algn="l" defTabSz="908920" rtl="0">
+              <a:defRPr/>
+            </a:pPr>
+            <a:endParaRPr lang="en-US" sz="2800" kern="0" dirty="0">
+              <a:solidFill>
+                <a:srgbClr val="000000"/>
+              </a:solidFill>
+              <a:latin typeface="+mn-lt"/>
+            </a:endParaRPr>
+          </a:p>
+          <a:p>
+            <a:pPr indent="205704" algn="l" defTabSz="908920" rtl="0">
+              <a:defRPr/>
+            </a:pPr>
+            <a:endParaRPr lang="en-US" sz="2800" kern="0" dirty="0" smtClean="0">
+              <a:solidFill>
+                <a:srgbClr val="000000"/>
+              </a:solidFill>
+              <a:latin typeface="+mn-lt"/>
+            </a:endParaRPr>
+          </a:p>
+          <a:p>
+            <a:pPr indent="205704" algn="l" defTabSz="908920" rtl="0">
+              <a:defRPr/>
+            </a:pPr>
+            <a:endParaRPr lang="en-US" sz="2800" kern="0" dirty="0">
+              <a:solidFill>
+                <a:srgbClr val="000000"/>
+              </a:solidFill>
+              <a:latin typeface="+mn-lt"/>
+            </a:endParaRPr>
+          </a:p>
+          <a:p>
+            <a:pPr indent="205704" algn="l" defTabSz="908920" rtl="0">
+              <a:defRPr/>
+            </a:pPr>
+            <a:endParaRPr lang="en-US" sz="2800" kern="0" dirty="0" smtClean="0">
+              <a:solidFill>
+                <a:srgbClr val="000000"/>
+              </a:solidFill>
+              <a:latin typeface="+mn-lt"/>
+            </a:endParaRPr>
+          </a:p>
+          <a:p>
+            <a:pPr indent="205704" algn="l" defTabSz="908920" rtl="0">
+              <a:defRPr/>
+            </a:pPr>
+            <a:endParaRPr lang="en-US" sz="2800" kern="0" dirty="0">
+              <a:solidFill>
+                <a:srgbClr val="000000"/>
+              </a:solidFill>
+              <a:latin typeface="+mn-lt"/>
+            </a:endParaRPr>
+          </a:p>
+          <a:p>
+            <a:pPr indent="205704" algn="l" defTabSz="908920" rtl="0">
+              <a:defRPr/>
+            </a:pPr>
+            <a:endParaRPr lang="en-US" sz="2800" kern="0" dirty="0" smtClean="0">
+              <a:solidFill>
+                <a:srgbClr val="000000"/>
+              </a:solidFill>
+              <a:latin typeface="+mn-lt"/>
+            </a:endParaRPr>
+          </a:p>
+          <a:p>
+            <a:pPr indent="205704" algn="l" defTabSz="908920" rtl="0">
+              <a:defRPr/>
+            </a:pPr>
+            <a:endParaRPr lang="en-US" sz="2800" kern="0" dirty="0">
+              <a:solidFill>
+                <a:srgbClr val="000000"/>
+              </a:solidFill>
+              <a:latin typeface="+mn-lt"/>
+            </a:endParaRPr>
+          </a:p>
+          <a:p>
+            <a:pPr indent="205704" algn="l" defTabSz="908920" rtl="0">
+              <a:defRPr/>
+            </a:pPr>
+            <a:endParaRPr lang="en-US" sz="2800" kern="0" dirty="0" smtClean="0">
+              <a:solidFill>
+                <a:srgbClr val="000000"/>
+              </a:solidFill>
+              <a:latin typeface="+mn-lt"/>
+            </a:endParaRPr>
+          </a:p>
+          <a:p>
+            <a:pPr indent="205704" algn="l" defTabSz="908920" rtl="0">
+              <a:defRPr/>
+            </a:pPr>
+            <a:endParaRPr lang="en-US" sz="2800" kern="0" dirty="0">
+              <a:solidFill>
+                <a:srgbClr val="000000"/>
+              </a:solidFill>
+              <a:latin typeface="+mn-lt"/>
+            </a:endParaRPr>
+          </a:p>
+          <a:p>
+            <a:pPr indent="205704" algn="l" defTabSz="908920" rtl="0">
+              <a:defRPr/>
+            </a:pPr>
+            <a:r>
+              <a:rPr lang="en-US" sz="2800" kern="0" dirty="0" smtClean="0">
+                <a:solidFill>
+                  <a:srgbClr val="000000"/>
+                </a:solidFill>
+                <a:latin typeface="+mn-lt"/>
+              </a:rPr>
+              <a:t>In a </a:t>
+            </a:r>
+            <a:r>
+              <a:rPr lang="en-US" sz="2800" kern="0" dirty="0">
+                <a:solidFill>
+                  <a:srgbClr val="000000"/>
+                </a:solidFill>
+                <a:latin typeface="+mn-lt"/>
+              </a:rPr>
+              <a:t>single-peak fitness </a:t>
+            </a:r>
+            <a:r>
+              <a:rPr lang="en-US" sz="2800" kern="0" dirty="0" smtClean="0">
+                <a:solidFill>
+                  <a:srgbClr val="000000"/>
+                </a:solidFill>
+                <a:latin typeface="+mn-lt"/>
+              </a:rPr>
+              <a:t>landscape selection </a:t>
+            </a:r>
+            <a:r>
+              <a:rPr lang="en-US" sz="2800" kern="0" dirty="0">
+                <a:solidFill>
+                  <a:srgbClr val="000000"/>
+                </a:solidFill>
+                <a:latin typeface="+mn-lt"/>
+              </a:rPr>
+              <a:t>drives the population uphill towards the global maximum (Fig. 1). In </a:t>
+            </a:r>
+            <a:r>
+              <a:rPr lang="en-US" sz="2800" kern="0" dirty="0" smtClean="0">
+                <a:solidFill>
+                  <a:srgbClr val="000000"/>
+                </a:solidFill>
+                <a:latin typeface="+mn-lt"/>
+              </a:rPr>
+              <a:t>a </a:t>
+            </a:r>
+            <a:r>
+              <a:rPr lang="en-US" sz="2800" kern="0" dirty="0">
+                <a:solidFill>
+                  <a:srgbClr val="000000"/>
+                </a:solidFill>
+                <a:latin typeface="+mn-lt"/>
+              </a:rPr>
+              <a:t>multi-peak rugged fitness </a:t>
+            </a:r>
+            <a:r>
+              <a:rPr lang="en-US" sz="2800" kern="0" dirty="0" smtClean="0">
+                <a:solidFill>
+                  <a:srgbClr val="000000"/>
+                </a:solidFill>
+                <a:latin typeface="+mn-lt"/>
+              </a:rPr>
+              <a:t>landscape selection </a:t>
+            </a:r>
+            <a:r>
+              <a:rPr lang="en-US" sz="2800" kern="0" dirty="0">
+                <a:solidFill>
+                  <a:srgbClr val="000000"/>
+                </a:solidFill>
+                <a:latin typeface="+mn-lt"/>
+              </a:rPr>
+              <a:t>drives the population uphill towards the closest peak, </a:t>
             </a:r>
             <a:r>
               <a:rPr lang="en-US" sz="2800" b="1" kern="0" dirty="0">
@@ -5846,8 +6118,47 @@
                 </a:solidFill>
                 <a:latin typeface="+mn-lt"/>
               </a:rPr>
-              <a:t>jointly advantageous</a:t>
-            </a:r>
+              <a:t>preventing it from shifting to the higher peak </a:t>
+            </a:r>
+            <a:r>
+              <a:rPr lang="en-US" sz="2800" kern="0" dirty="0">
+                <a:solidFill>
+                  <a:srgbClr val="000000"/>
+                </a:solidFill>
+                <a:latin typeface="+mn-lt"/>
+              </a:rPr>
+              <a:t>(Fig. 2).</a:t>
+            </a:r>
+          </a:p>
+          <a:p>
+            <a:pPr indent="205704" algn="l" defTabSz="908920" rtl="0">
+              <a:defRPr/>
+            </a:pPr>
+            <a:endParaRPr lang="en-US" b="1" kern="0" dirty="0" smtClean="0">
+              <a:solidFill>
+                <a:schemeClr val="accent2"/>
+              </a:solidFill>
+              <a:latin typeface="+mj-lt"/>
+            </a:endParaRPr>
+          </a:p>
+          <a:p>
+            <a:pPr indent="205704" algn="l" defTabSz="908920" rtl="0">
+              <a:defRPr/>
+            </a:pPr>
+            <a:r>
+              <a:rPr lang="en-US" b="1" kern="0" dirty="0" smtClean="0">
+                <a:solidFill>
+                  <a:schemeClr val="accent2"/>
+                </a:solidFill>
+                <a:latin typeface="+mj-lt"/>
+              </a:rPr>
+              <a:t>Stress-Induced Mutagenesis</a:t>
+            </a:r>
+          </a:p>
+          <a:p>
+            <a:pPr indent="205704" algn="l" defTabSz="908920" rtl="0">
+              <a:defRPr/>
+            </a:pPr>
             <a:r>
               <a:rPr lang="en-US" sz="2800" b="1" kern="0" dirty="0">
                 <a:solidFill>
@@ -5855,17 +6166,32 @@
                 </a:solidFill>
                 <a:latin typeface="+mn-lt"/>
               </a:rPr>
-              <a:t>, how can a population evolve from one co-adapted gene complex to a better one</a:t>
-            </a:r>
-            <a:r>
-              <a:rPr lang="en-US" sz="2800" b="1" kern="0" dirty="0">
-                <a:solidFill>
-                  <a:schemeClr val="tx2"/>
-                </a:solidFill>
-                <a:latin typeface="+mn-lt"/>
-              </a:rPr>
-              <a:t>? </a:t>
-            </a:r>
+              <a:t>The mutation rate is induced by stress responses in various species </a:t>
+            </a:r>
+            <a:r>
+              <a:rPr lang="en-US" sz="2800" kern="0" dirty="0">
+                <a:solidFill>
+                  <a:srgbClr val="000000"/>
+                </a:solidFill>
+                <a:latin typeface="+mn-lt"/>
+              </a:rPr>
+              <a:t>of bacteria (</a:t>
+            </a:r>
+            <a:r>
+              <a:rPr lang="en-US" sz="2800" kern="0" dirty="0" smtClean="0">
+                <a:solidFill>
+                  <a:srgbClr val="000000"/>
+                </a:solidFill>
+                <a:latin typeface="+mn-lt"/>
+              </a:rPr>
+              <a:t>2-4).</a:t>
+            </a:r>
+            <a:endParaRPr lang="en-US" sz="2800" kern="0" dirty="0" smtClean="0">
+              <a:solidFill>
+                <a:srgbClr val="000000"/>
+              </a:solidFill>
+              <a:latin typeface="+mn-lt"/>
+            </a:endParaRPr>
           </a:p>
           <a:p>
             <a:pPr indent="205704" algn="l" defTabSz="908920" rtl="0">
@@ -5878,7 +6204,7 @@
                 </a:solidFill>
                 <a:latin typeface="+mn-lt"/>
               </a:rPr>
-              <a:t>The problem is illustrated using </a:t>
+              <a:t>In a previous work </a:t>
             </a:r>
             <a:r>
               <a:rPr lang="en-US" sz="2800" kern="0" dirty="0" smtClean="0">
@@ -5887,537 +6213,16 @@
                 </a:solidFill>
                 <a:latin typeface="+mn-lt"/>
               </a:rPr>
-              <a:t>the </a:t>
-            </a:r>
-            <a:r>
-              <a:rPr lang="en-US" sz="2800" i="1" kern="0" dirty="0" smtClean="0">
+              <a:t>(5) </a:t>
+            </a:r>
+            <a:r>
+              <a:rPr lang="en-US" sz="2800" kern="0" dirty="0" smtClean="0">
                 <a:solidFill>
                   <a:srgbClr val="000000"/>
                 </a:solidFill>
                 <a:latin typeface="+mn-lt"/>
               </a:rPr>
-              <a:t>fitness landscape </a:t>
-            </a:r>
-            <a:r>
-              <a:rPr lang="en-US" sz="2800" kern="0" dirty="0" smtClean="0">
-                <a:solidFill>
-                  <a:srgbClr val="000000"/>
-                </a:solidFill>
-                <a:latin typeface="+mn-lt"/>
-              </a:rPr>
-              <a:t>metaphor:</a:t>
-            </a:r>
-            <a:endParaRPr lang="en-US" sz="2800" kern="0" dirty="0" smtClean="0">
-              <a:solidFill>
-                <a:srgbClr val="000000"/>
-              </a:solidFill>
-              <a:latin typeface="+mn-lt"/>
-            </a:endParaRPr>
-          </a:p>
-          <a:p>
-            <a:pPr indent="205704" algn="l" defTabSz="908920" rtl="0">
-              <a:defRPr/>
-            </a:pPr>
-            <a:endParaRPr lang="en-US" sz="2800" kern="0" dirty="0" smtClean="0">
-              <a:solidFill>
-                <a:srgbClr val="000000"/>
-              </a:solidFill>
-              <a:latin typeface="+mn-lt"/>
-            </a:endParaRPr>
-          </a:p>
-          <a:p>
-            <a:pPr indent="205704" algn="l" defTabSz="908920" rtl="0">
-              <a:defRPr/>
-            </a:pPr>
-            <a:endParaRPr lang="en-US" sz="2800" kern="0" dirty="0">
-              <a:solidFill>
-                <a:srgbClr val="000000"/>
-              </a:solidFill>
-              <a:latin typeface="+mn-lt"/>
-            </a:endParaRPr>
-          </a:p>
-          <a:p>
-            <a:pPr indent="205704" algn="l" defTabSz="908920" rtl="0">
-              <a:defRPr/>
-            </a:pPr>
-            <a:endParaRPr lang="en-US" sz="2800" kern="0" dirty="0" smtClean="0">
-              <a:solidFill>
-                <a:srgbClr val="000000"/>
-              </a:solidFill>
-              <a:latin typeface="+mn-lt"/>
-            </a:endParaRPr>
-          </a:p>
-          <a:p>
-            <a:pPr indent="205704" algn="l" defTabSz="908920" rtl="0">
-              <a:defRPr/>
-            </a:pPr>
-            <a:endParaRPr lang="en-US" sz="2800" kern="0" dirty="0">
-              <a:solidFill>
-                <a:srgbClr val="000000"/>
-              </a:solidFill>
-              <a:latin typeface="+mn-lt"/>
-            </a:endParaRPr>
-          </a:p>
-          <a:p>
-            <a:pPr indent="205704" algn="l" defTabSz="908920" rtl="0">
-              <a:defRPr/>
-            </a:pPr>
-            <a:endParaRPr lang="en-US" sz="2800" kern="0" dirty="0" smtClean="0">
-              <a:solidFill>
-                <a:srgbClr val="000000"/>
-              </a:solidFill>
-              <a:latin typeface="+mn-lt"/>
-            </a:endParaRPr>
-          </a:p>
-          <a:p>
-            <a:pPr indent="205704" algn="l" defTabSz="908920" rtl="0">
-              <a:defRPr/>
-            </a:pPr>
-            <a:endParaRPr lang="en-US" sz="2800" kern="0" dirty="0">
-              <a:solidFill>
-                <a:srgbClr val="000000"/>
-              </a:solidFill>
-              <a:latin typeface="+mn-lt"/>
-            </a:endParaRPr>
-          </a:p>
-          <a:p>
-            <a:pPr indent="205704" algn="l" defTabSz="908920" rtl="0">
-              <a:defRPr/>
-            </a:pPr>
-            <a:endParaRPr lang="en-US" sz="2800" kern="0" dirty="0" smtClean="0">
-              <a:solidFill>
-                <a:srgbClr val="000000"/>
-              </a:solidFill>
-              <a:latin typeface="+mn-lt"/>
-            </a:endParaRPr>
-          </a:p>
-          <a:p>
-            <a:pPr indent="205704" algn="l" defTabSz="908920" rtl="0">
-              <a:defRPr/>
-            </a:pPr>
-            <a:endParaRPr lang="en-US" sz="2800" kern="0" dirty="0">
-              <a:solidFill>
-                <a:srgbClr val="000000"/>
-              </a:solidFill>
-              <a:latin typeface="+mn-lt"/>
-            </a:endParaRPr>
-          </a:p>
-          <a:p>
-            <a:pPr indent="205704" algn="l" defTabSz="908920" rtl="0">
-              <a:defRPr/>
-            </a:pPr>
-            <a:endParaRPr lang="en-US" sz="2800" kern="0" dirty="0" smtClean="0">
-              <a:solidFill>
-                <a:srgbClr val="000000"/>
-              </a:solidFill>
-              <a:latin typeface="+mn-lt"/>
-            </a:endParaRPr>
-          </a:p>
-          <a:p>
-            <a:pPr indent="205704" algn="l" defTabSz="908920" rtl="0">
-              <a:defRPr/>
-            </a:pPr>
-            <a:endParaRPr lang="en-US" sz="2800" kern="0" dirty="0">
-              <a:solidFill>
-                <a:srgbClr val="000000"/>
-              </a:solidFill>
-              <a:latin typeface="+mn-lt"/>
-            </a:endParaRPr>
-          </a:p>
-          <a:p>
-            <a:pPr indent="205704" algn="l" defTabSz="908920" rtl="0">
-              <a:defRPr/>
-            </a:pPr>
-            <a:endParaRPr lang="en-US" sz="2800" kern="0" dirty="0" smtClean="0">
-              <a:solidFill>
-                <a:srgbClr val="000000"/>
-              </a:solidFill>
-              <a:latin typeface="+mn-lt"/>
-            </a:endParaRPr>
-          </a:p>
-          <a:p>
-            <a:pPr indent="205704" algn="l" defTabSz="908920" rtl="0">
-              <a:defRPr/>
-            </a:pPr>
-            <a:endParaRPr lang="en-US" sz="2800" kern="0" dirty="0">
-              <a:solidFill>
-                <a:srgbClr val="000000"/>
-              </a:solidFill>
-              <a:latin typeface="+mn-lt"/>
-            </a:endParaRPr>
-          </a:p>
-          <a:p>
-            <a:pPr indent="205704" algn="l" defTabSz="908920" rtl="0">
-              <a:defRPr/>
-            </a:pPr>
-            <a:endParaRPr lang="en-US" sz="2800" kern="0" dirty="0" smtClean="0">
-              <a:solidFill>
-                <a:srgbClr val="000000"/>
-              </a:solidFill>
-              <a:latin typeface="+mn-lt"/>
-            </a:endParaRPr>
-          </a:p>
-          <a:p>
-            <a:pPr indent="205704" algn="l" defTabSz="908920" rtl="0">
-              <a:defRPr/>
-            </a:pPr>
-            <a:endParaRPr lang="en-US" sz="2800" kern="0" dirty="0">
-              <a:solidFill>
-                <a:srgbClr val="000000"/>
-              </a:solidFill>
-              <a:latin typeface="+mn-lt"/>
-            </a:endParaRPr>
-          </a:p>
-          <a:p>
-            <a:pPr indent="205704" algn="l" defTabSz="908920" rtl="0">
-              <a:defRPr/>
-            </a:pPr>
-            <a:endParaRPr lang="en-US" sz="2800" kern="0" dirty="0" smtClean="0">
-              <a:solidFill>
-                <a:srgbClr val="000000"/>
-              </a:solidFill>
-              <a:latin typeface="+mn-lt"/>
-            </a:endParaRPr>
-          </a:p>
-          <a:p>
-            <a:pPr indent="205704" algn="l" defTabSz="908920" rtl="0">
-              <a:defRPr/>
-            </a:pPr>
-            <a:endParaRPr lang="en-US" sz="2800" kern="0" dirty="0">
-              <a:solidFill>
-                <a:srgbClr val="000000"/>
-              </a:solidFill>
-              <a:latin typeface="+mn-lt"/>
-            </a:endParaRPr>
-          </a:p>
-          <a:p>
-            <a:pPr indent="205704" algn="l" defTabSz="908920" rtl="0">
-              <a:defRPr/>
-            </a:pPr>
-            <a:endParaRPr lang="en-US" sz="2800" kern="0" dirty="0" smtClean="0">
-              <a:solidFill>
-                <a:srgbClr val="000000"/>
-              </a:solidFill>
-              <a:latin typeface="+mn-lt"/>
-            </a:endParaRPr>
-          </a:p>
-          <a:p>
-            <a:pPr indent="205704" algn="l" defTabSz="908920" rtl="0">
-              <a:defRPr/>
-            </a:pPr>
-            <a:endParaRPr lang="en-US" sz="2800" kern="0" dirty="0">
-              <a:solidFill>
-                <a:srgbClr val="000000"/>
-              </a:solidFill>
-              <a:latin typeface="+mn-lt"/>
-            </a:endParaRPr>
-          </a:p>
-          <a:p>
-            <a:pPr indent="205704" algn="l" defTabSz="908920" rtl="0">
-              <a:defRPr/>
-            </a:pPr>
-            <a:endParaRPr lang="en-US" sz="2800" kern="0" dirty="0" smtClean="0">
-              <a:solidFill>
-                <a:srgbClr val="000000"/>
-              </a:solidFill>
-              <a:latin typeface="+mn-lt"/>
-            </a:endParaRPr>
-          </a:p>
-          <a:p>
-            <a:pPr indent="205704" algn="l" defTabSz="908920" rtl="0">
-              <a:defRPr/>
-            </a:pPr>
-            <a:endParaRPr lang="en-US" sz="2800" kern="0" dirty="0">
-              <a:solidFill>
-                <a:srgbClr val="000000"/>
-              </a:solidFill>
-              <a:latin typeface="+mn-lt"/>
-            </a:endParaRPr>
-          </a:p>
-          <a:p>
-            <a:pPr indent="205704" algn="l" defTabSz="908920" rtl="0">
-              <a:defRPr/>
-            </a:pPr>
-            <a:r>
-              <a:rPr lang="en-US" sz="2800" kern="0" dirty="0" smtClean="0">
-                <a:solidFill>
-                  <a:srgbClr val="000000"/>
-                </a:solidFill>
-                <a:latin typeface="+mn-lt"/>
-              </a:rPr>
-              <a:t>In a </a:t>
-            </a:r>
-            <a:r>
-              <a:rPr lang="en-US" sz="2800" kern="0" dirty="0">
-                <a:solidFill>
-                  <a:srgbClr val="000000"/>
-                </a:solidFill>
-                <a:latin typeface="+mn-lt"/>
-              </a:rPr>
-              <a:t>single-peak fitness </a:t>
-            </a:r>
-            <a:r>
-              <a:rPr lang="en-US" sz="2800" kern="0" dirty="0" smtClean="0">
-                <a:solidFill>
-                  <a:srgbClr val="000000"/>
-                </a:solidFill>
-                <a:latin typeface="+mn-lt"/>
-              </a:rPr>
-              <a:t>landscape selection </a:t>
-            </a:r>
-            <a:r>
-              <a:rPr lang="en-US" sz="2800" kern="0" dirty="0">
-                <a:solidFill>
-                  <a:srgbClr val="000000"/>
-                </a:solidFill>
-                <a:latin typeface="+mn-lt"/>
-              </a:rPr>
-              <a:t>drives the population uphill towards the global </a:t>
-            </a:r>
-            <a:r>
-              <a:rPr lang="en-US" sz="2800" kern="0" dirty="0">
-                <a:solidFill>
-                  <a:srgbClr val="000000"/>
-                </a:solidFill>
-                <a:latin typeface="+mn-lt"/>
-              </a:rPr>
-              <a:t>maximum (</a:t>
-            </a:r>
-            <a:r>
-              <a:rPr lang="en-US" sz="2800" kern="0" dirty="0">
-                <a:solidFill>
-                  <a:srgbClr val="000000"/>
-                </a:solidFill>
-                <a:latin typeface="+mn-lt"/>
-              </a:rPr>
-              <a:t>Fig. 1</a:t>
-            </a:r>
-            <a:r>
-              <a:rPr lang="en-US" sz="2800" kern="0" dirty="0">
-                <a:solidFill>
-                  <a:srgbClr val="000000"/>
-                </a:solidFill>
-                <a:latin typeface="+mn-lt"/>
-              </a:rPr>
-              <a:t>). In </a:t>
-            </a:r>
-            <a:r>
-              <a:rPr lang="en-US" sz="2800" kern="0" dirty="0" smtClean="0">
-                <a:solidFill>
-                  <a:srgbClr val="000000"/>
-                </a:solidFill>
-                <a:latin typeface="+mn-lt"/>
-              </a:rPr>
-              <a:t>a </a:t>
-            </a:r>
-            <a:r>
-              <a:rPr lang="en-US" sz="2800" kern="0" dirty="0">
-                <a:solidFill>
-                  <a:srgbClr val="000000"/>
-                </a:solidFill>
-                <a:latin typeface="+mn-lt"/>
-              </a:rPr>
-              <a:t>multi-peak rugged fitness </a:t>
-            </a:r>
-            <a:r>
-              <a:rPr lang="en-US" sz="2800" kern="0" dirty="0" smtClean="0">
-                <a:solidFill>
-                  <a:srgbClr val="000000"/>
-                </a:solidFill>
-                <a:latin typeface="+mn-lt"/>
-              </a:rPr>
-              <a:t>landscape selection </a:t>
-            </a:r>
-            <a:r>
-              <a:rPr lang="en-US" sz="2800" kern="0" dirty="0">
-                <a:solidFill>
-                  <a:srgbClr val="000000"/>
-                </a:solidFill>
-                <a:latin typeface="+mn-lt"/>
-              </a:rPr>
-              <a:t>drives the population uphill towards the closest peak, </a:t>
-            </a:r>
-            <a:r>
-              <a:rPr lang="en-US" sz="2800" b="1" kern="0" dirty="0">
-                <a:solidFill>
-                  <a:schemeClr val="tx2"/>
-                </a:solidFill>
-                <a:latin typeface="+mn-lt"/>
-              </a:rPr>
-              <a:t>preventing it from shifting to the higher peak </a:t>
-            </a:r>
-            <a:r>
-              <a:rPr lang="en-US" sz="2800" kern="0" dirty="0">
-                <a:solidFill>
-                  <a:srgbClr val="000000"/>
-                </a:solidFill>
-                <a:latin typeface="+mn-lt"/>
-              </a:rPr>
-              <a:t>(</a:t>
-            </a:r>
-            <a:r>
-              <a:rPr lang="en-US" sz="2800" kern="0" dirty="0">
-                <a:solidFill>
-                  <a:srgbClr val="000000"/>
-                </a:solidFill>
-                <a:latin typeface="+mn-lt"/>
-              </a:rPr>
-              <a:t>Fig. 2</a:t>
-            </a:r>
-            <a:r>
-              <a:rPr lang="en-US" sz="2800" kern="0" dirty="0">
-                <a:solidFill>
-                  <a:srgbClr val="000000"/>
-                </a:solidFill>
-                <a:latin typeface="+mn-lt"/>
-              </a:rPr>
-              <a:t>).</a:t>
-            </a:r>
-            <a:endParaRPr lang="en-US" sz="2800" kern="0" dirty="0">
-              <a:solidFill>
-                <a:srgbClr val="000000"/>
-              </a:solidFill>
-              <a:latin typeface="+mn-lt"/>
-            </a:endParaRPr>
-          </a:p>
-          <a:p>
-            <a:pPr indent="205704" algn="l" defTabSz="908920" rtl="0">
-              <a:defRPr/>
-            </a:pPr>
-            <a:endParaRPr lang="en-US" b="1" kern="0" dirty="0" smtClean="0">
-              <a:solidFill>
-                <a:schemeClr val="accent2"/>
-              </a:solidFill>
-              <a:latin typeface="+mj-lt"/>
-            </a:endParaRPr>
-          </a:p>
-          <a:p>
-            <a:pPr indent="205704" algn="l" defTabSz="908920" rtl="0">
-              <a:defRPr/>
-            </a:pPr>
-            <a:r>
-              <a:rPr lang="en-US" b="1" kern="0" dirty="0" smtClean="0">
-                <a:solidFill>
-                  <a:schemeClr val="accent2"/>
-                </a:solidFill>
-                <a:latin typeface="+mj-lt"/>
-              </a:rPr>
-              <a:t>Stress-Induced </a:t>
-            </a:r>
-            <a:r>
-              <a:rPr lang="en-US" b="1" kern="0" dirty="0" smtClean="0">
-                <a:solidFill>
-                  <a:schemeClr val="accent2"/>
-                </a:solidFill>
-                <a:latin typeface="+mj-lt"/>
-              </a:rPr>
-              <a:t>Mutagenesis</a:t>
-            </a:r>
-          </a:p>
-          <a:p>
-            <a:pPr indent="205704" algn="l" defTabSz="908920" rtl="0">
-              <a:defRPr/>
-            </a:pPr>
-            <a:r>
-              <a:rPr lang="en-US" sz="2800" b="1" kern="0" dirty="0">
-                <a:solidFill>
-                  <a:schemeClr val="tx2"/>
-                </a:solidFill>
-                <a:latin typeface="+mn-lt"/>
-              </a:rPr>
-              <a:t>The mutation rate is induced by stress responses in various species </a:t>
-            </a:r>
-            <a:r>
-              <a:rPr lang="en-US" sz="2800" kern="0" dirty="0">
-                <a:solidFill>
-                  <a:srgbClr val="000000"/>
-                </a:solidFill>
-                <a:latin typeface="+mn-lt"/>
-              </a:rPr>
-              <a:t>of bacteria (</a:t>
-            </a:r>
-            <a:r>
-              <a:rPr lang="en-US" sz="2800" kern="0" dirty="0" smtClean="0">
-                <a:solidFill>
-                  <a:srgbClr val="000000"/>
-                </a:solidFill>
-                <a:latin typeface="+mn-lt"/>
-              </a:rPr>
-              <a:t>2-3).</a:t>
-            </a:r>
-            <a:endParaRPr lang="en-US" sz="2800" kern="0" dirty="0" smtClean="0">
-              <a:solidFill>
-                <a:srgbClr val="000000"/>
-              </a:solidFill>
-              <a:latin typeface="+mn-lt"/>
-            </a:endParaRPr>
-          </a:p>
-          <a:p>
-            <a:pPr indent="205704" algn="l" defTabSz="908920" rtl="0">
-              <a:defRPr/>
-            </a:pPr>
-            <a:r>
-              <a:rPr lang="en-US" sz="2800" kern="0" dirty="0" smtClean="0">
-                <a:solidFill>
-                  <a:srgbClr val="000000"/>
-                </a:solidFill>
-                <a:latin typeface="+mn-lt"/>
-              </a:rPr>
-              <a:t>In a previous work (4) we </a:t>
-            </a:r>
-            <a:r>
-              <a:rPr lang="en-US" sz="2800" kern="0" dirty="0" smtClean="0">
-                <a:solidFill>
-                  <a:srgbClr val="000000"/>
-                </a:solidFill>
-                <a:latin typeface="+mn-lt"/>
-              </a:rPr>
-              <a:t>studied the </a:t>
-            </a:r>
-            <a:r>
-              <a:rPr lang="en-US" sz="2800" kern="0" dirty="0" smtClean="0">
-                <a:solidFill>
-                  <a:srgbClr val="000000"/>
-                </a:solidFill>
-                <a:latin typeface="+mn-lt"/>
-              </a:rPr>
-              <a:t>evolution of stress-induced mutagenesis in </a:t>
-            </a:r>
-            <a:r>
-              <a:rPr lang="en-US" sz="2800" kern="0" dirty="0" smtClean="0">
-                <a:solidFill>
-                  <a:srgbClr val="000000"/>
-                </a:solidFill>
-                <a:latin typeface="+mn-lt"/>
-              </a:rPr>
-              <a:t>constant </a:t>
-            </a:r>
-            <a:r>
-              <a:rPr lang="en-US" sz="2800" kern="0" dirty="0" smtClean="0">
-                <a:solidFill>
-                  <a:srgbClr val="000000"/>
-                </a:solidFill>
-                <a:latin typeface="+mn-lt"/>
-              </a:rPr>
-              <a:t>and changing environments. </a:t>
-            </a:r>
-            <a:r>
-              <a:rPr lang="en-US" sz="2800" kern="0" dirty="0" smtClean="0">
-                <a:solidFill>
-                  <a:srgbClr val="000000"/>
-                </a:solidFill>
-                <a:latin typeface="+mn-lt"/>
-              </a:rPr>
-              <a:t>We showed </a:t>
-            </a:r>
-            <a:r>
-              <a:rPr lang="en-US" sz="2800" kern="0" dirty="0" smtClean="0">
-                <a:solidFill>
-                  <a:srgbClr val="000000"/>
-                </a:solidFill>
-                <a:latin typeface="+mn-lt"/>
-              </a:rPr>
-              <a:t>that</a:t>
+              <a:t>we studied the evolution of stress-induced mutagenesis in constant and changing environments. We showed that</a:t>
             </a:r>
             <a:r>
               <a:rPr lang="en-US" sz="2800" b="1" kern="0" dirty="0" smtClean="0">
@@ -7547,8 +7352,8 @@
           </a:p>
         </p:txBody>
       </p:sp>
-      <mc:AlternateContent xmlns:mc="http://schemas.openxmlformats.org/markup-compatibility/2006">
-        <mc:Choice xmlns:a14="http://schemas.microsoft.com/office/drawing/2010/main" Requires="a14">
+      <mc:AlternateContent xmlns:mc="http://schemas.openxmlformats.org/markup-compatibility/2006" xmlns:a14="http://schemas.microsoft.com/office/drawing/2010/main">
+        <mc:Choice Requires="a14">
           <p:sp>
             <p:nvSpPr>
               <p:cNvPr id="101" name="Text Box 13"/>
@@ -9038,12 +8843,6 @@
                   </a:rPr>
                   <a:t>.</a:t>
                 </a:r>
-                <a:endParaRPr lang="en-US" sz="2800" kern="0" dirty="0" smtClean="0">
-                  <a:solidFill>
-                    <a:schemeClr val="tx1"/>
-                  </a:solidFill>
-                  <a:latin typeface="+mn-lt"/>
-                </a:endParaRPr>
               </a:p>
               <a:p>
                 <a:pPr indent="205704" algn="l" defTabSz="908920" rtl="0">
@@ -9133,13 +8932,7 @@
                   <a:rPr lang="en-US" sz="2800" kern="0" dirty="0" smtClean="0">
                     <a:latin typeface="+mn-lt"/>
                   </a:rPr>
-                  <a:t> as the </a:t>
-                </a:r>
-                <a:r>
-                  <a:rPr lang="en-US" sz="2800" kern="0" dirty="0" smtClean="0">
-                    <a:latin typeface="+mn-lt"/>
-                  </a:rPr>
-                  <a:t>probability and </a:t>
+                  <a:t> as the probability and </a:t>
                 </a:r>
                 <a:r>
                   <a:rPr lang="en-US" sz="2800" i="1" kern="0" dirty="0" smtClean="0">
@@ -9864,12 +9657,6 @@
                   </a:rPr>
                   <a:t>.</a:t>
                 </a:r>
-                <a:endParaRPr lang="en-US" sz="2800" kern="0" dirty="0" smtClean="0">
-                  <a:solidFill>
-                    <a:srgbClr val="000000"/>
-                  </a:solidFill>
-                  <a:latin typeface="+mn-lt"/>
-                </a:endParaRPr>
               </a:p>
               <a:p>
                 <a:pPr indent="205704" algn="l" defTabSz="908920" rtl="0">
@@ -9907,7 +9694,7 @@
             </p:txBody>
           </p:sp>
         </mc:Choice>
-        <mc:Fallback>
+        <mc:Fallback xmlns="">
           <p:sp>
             <p:nvSpPr>
               <p:cNvPr id="101" name="Text Box 13"/>
@@ -9964,7 +9751,7 @@
         </p:nvSpPr>
         <p:spPr bwMode="auto">
           <a:xfrm>
-            <a:off x="29308836" y="28062001"/>
+            <a:off x="29307600" y="28062001"/>
             <a:ext cx="11520000" cy="4845956"/>
           </a:xfrm>
           <a:prstGeom prst="rect">
@@ -10397,14 +10184,20 @@
               <a:defRPr/>
             </a:pPr>
             <a:r>
-              <a:rPr lang="en-US" sz="4400" b="1" kern="0" dirty="0">
+              <a:rPr lang="en-US" sz="4400" b="1" kern="0" dirty="0" smtClean="0">
                 <a:solidFill>
                   <a:schemeClr val="accent2"/>
                 </a:solidFill>
                 <a:latin typeface="+mj-lt"/>
               </a:rPr>
-              <a:t>For more information</a:t>
-            </a:r>
+              <a:t>Contact information</a:t>
+            </a:r>
+            <a:endParaRPr lang="en-US" sz="4400" b="1" kern="0" dirty="0">
+              <a:solidFill>
+                <a:schemeClr val="accent2"/>
+              </a:solidFill>
+              <a:latin typeface="+mj-lt"/>
+            </a:endParaRPr>
           </a:p>
           <a:p>
             <a:pPr indent="205704" algn="l" defTabSz="908920" rtl="0" eaLnBrk="1" fontAlgn="base" hangingPunct="1">
@@ -10415,79 +10208,12 @@
                 <a:spcPct val="0"/>
               </a:spcAft>
             </a:pPr>
-            <a:r>
-              <a:rPr lang="en-US" sz="2800" dirty="0">
-                <a:solidFill>
-                  <a:srgbClr val="000000"/>
-                </a:solidFill>
-                <a:latin typeface="+mn-lt"/>
-              </a:rPr>
-              <a:t>Please contact Yoav Ram at </a:t>
-            </a:r>
-            <a:r>
-              <a:rPr lang="en-US" sz="2800" i="1" dirty="0">
-                <a:solidFill>
-                  <a:srgbClr val="000000"/>
-                </a:solidFill>
-                <a:latin typeface="+mn-lt"/>
-              </a:rPr>
-              <a:t>yoavram@post.tau.ac.il</a:t>
-            </a:r>
-            <a:r>
-              <a:rPr lang="en-US" sz="2800" dirty="0">
-                <a:solidFill>
-                  <a:srgbClr val="000000"/>
-                </a:solidFill>
-                <a:latin typeface="+mn-lt"/>
-              </a:rPr>
-              <a:t> </a:t>
-            </a:r>
-          </a:p>
-          <a:p>
-            <a:pPr indent="205704" algn="l" defTabSz="908920" rtl="0" eaLnBrk="1" fontAlgn="base" hangingPunct="1">
-              <a:spcBef>
-                <a:spcPct val="10000"/>
-              </a:spcBef>
-              <a:spcAft>
-                <a:spcPct val="0"/>
-              </a:spcAft>
-            </a:pPr>
-            <a:r>
-              <a:rPr lang="en-US" sz="2800" dirty="0">
-                <a:solidFill>
-                  <a:srgbClr val="000000"/>
-                </a:solidFill>
-                <a:latin typeface="+mn-lt"/>
-              </a:rPr>
-              <a:t>or </a:t>
-            </a:r>
-            <a:r>
-              <a:rPr lang="en-US" sz="2800" i="1" dirty="0">
-                <a:solidFill>
-                  <a:srgbClr val="000000"/>
-                </a:solidFill>
-                <a:latin typeface="+mn-lt"/>
-              </a:rPr>
-              <a:t>+972-545-383136 </a:t>
-            </a:r>
-            <a:r>
-              <a:rPr lang="en-US" sz="2800" dirty="0">
-                <a:solidFill>
-                  <a:srgbClr val="000000"/>
-                </a:solidFill>
-                <a:latin typeface="+mn-lt"/>
-              </a:rPr>
-              <a:t>or visit </a:t>
-            </a:r>
-            <a:r>
-              <a:rPr lang="en-US" sz="2800" i="1" dirty="0">
-                <a:solidFill>
-                  <a:srgbClr val="000000"/>
-                </a:solidFill>
-                <a:latin typeface="+mn-lt"/>
-              </a:rPr>
-              <a:t>www.yoavram.com</a:t>
-            </a:r>
+            <a:endParaRPr lang="en-US" sz="2800" i="1" dirty="0">
+              <a:solidFill>
+                <a:srgbClr val="000000"/>
+              </a:solidFill>
+              <a:latin typeface="+mn-lt"/>
+            </a:endParaRPr>
           </a:p>
         </p:txBody>
       </p:sp>
@@ -10501,7 +10227,7 @@
         </p:nvSpPr>
         <p:spPr bwMode="auto">
           <a:xfrm>
-            <a:off x="29308836" y="34132092"/>
+            <a:off x="29307600" y="34132092"/>
             <a:ext cx="11520000" cy="4737981"/>
           </a:xfrm>
           <a:prstGeom prst="rect">
@@ -10675,7 +10401,13 @@
               <a:rPr lang="en-US" sz="2400" dirty="0">
                 <a:latin typeface="+mn-lt"/>
               </a:rPr>
-              <a:t> 1988, 131:115–123.</a:t>
+              <a:t> 1988, </a:t>
+            </a:r>
+            <a:r>
+              <a:rPr lang="en-US" sz="2400" dirty="0" smtClean="0">
+                <a:latin typeface="+mn-lt"/>
+              </a:rPr>
+              <a:t>131:115–123</a:t>
             </a:r>
           </a:p>
           <a:p>
@@ -10684,77 +10416,32 @@
               <a:buAutoNum type="arabicPeriod"/>
             </a:pPr>
             <a:r>
-              <a:rPr lang="en-US" sz="2400" dirty="0" err="1">
-                <a:latin typeface="+mn-lt"/>
-              </a:rPr>
-              <a:t>Galhardo</a:t>
+              <a:rPr lang="en-US" sz="2400" dirty="0" smtClean="0">
+                <a:latin typeface="+mn-lt"/>
+              </a:rPr>
+              <a:t>Rosenberg SM, et al. </a:t>
+            </a:r>
+            <a:r>
+              <a:rPr lang="en-US" sz="2400" i="1" dirty="0">
+                <a:latin typeface="+mn-lt"/>
+              </a:rPr>
+              <a:t>Genetics </a:t>
             </a:r>
             <a:r>
               <a:rPr lang="en-US" sz="2400" dirty="0">
                 <a:latin typeface="+mn-lt"/>
               </a:rPr>
-              <a:t> RS, </a:t>
+              <a:t>1998, </a:t>
             </a:r>
             <a:r>
               <a:rPr lang="en-US" sz="2400" dirty="0" smtClean="0">
                 <a:latin typeface="+mn-lt"/>
               </a:rPr>
-              <a:t>et al. </a:t>
-            </a:r>
-            <a:r>
-              <a:rPr lang="en-US" sz="2400" i="1" dirty="0" err="1" smtClean="0">
-                <a:latin typeface="+mn-lt"/>
-              </a:rPr>
-              <a:t>Crit</a:t>
-            </a:r>
-            <a:r>
-              <a:rPr lang="en-US" sz="2400" i="1" dirty="0" smtClean="0">
-                <a:latin typeface="+mn-lt"/>
-              </a:rPr>
-              <a:t> </a:t>
-            </a:r>
-            <a:r>
-              <a:rPr lang="en-US" sz="2400" i="1" dirty="0">
-                <a:latin typeface="+mn-lt"/>
-              </a:rPr>
-              <a:t>Rev </a:t>
-            </a:r>
-            <a:r>
-              <a:rPr lang="en-US" sz="2400" i="1" dirty="0" err="1">
-                <a:latin typeface="+mn-lt"/>
-              </a:rPr>
-              <a:t>Biochem</a:t>
-            </a:r>
-            <a:r>
-              <a:rPr lang="en-US" sz="2400" i="1" dirty="0">
-                <a:latin typeface="+mn-lt"/>
-              </a:rPr>
-              <a:t> </a:t>
-            </a:r>
-            <a:r>
-              <a:rPr lang="en-US" sz="2400" i="1" dirty="0" err="1">
-                <a:latin typeface="+mn-lt"/>
-              </a:rPr>
-              <a:t>Mol</a:t>
-            </a:r>
-            <a:r>
-              <a:rPr lang="en-US" sz="2400" i="1" dirty="0">
-                <a:latin typeface="+mn-lt"/>
-              </a:rPr>
-              <a:t> </a:t>
-            </a:r>
-            <a:r>
-              <a:rPr lang="en-US" sz="2400" i="1" dirty="0" err="1">
-                <a:latin typeface="+mn-lt"/>
-              </a:rPr>
-              <a:t>Biol</a:t>
-            </a:r>
-            <a:r>
-              <a:rPr lang="en-US" sz="2400" dirty="0">
-                <a:latin typeface="+mn-lt"/>
-              </a:rPr>
-              <a:t> 2007, 42:399–435.</a:t>
-            </a:r>
+              <a:t>148:1559–66</a:t>
+            </a:r>
+            <a:endParaRPr lang="en-US" sz="2400" dirty="0">
+              <a:latin typeface="+mn-lt"/>
+            </a:endParaRPr>
           </a:p>
           <a:p>
             <a:pPr lvl="0" algn="l" rtl="0">
@@ -10765,32 +10452,83 @@
               <a:rPr lang="en-US" sz="2400" dirty="0" err="1">
                 <a:latin typeface="+mn-lt"/>
               </a:rPr>
-              <a:t>Bjedov</a:t>
+              <a:t>Galhardo</a:t>
             </a:r>
             <a:r>
               <a:rPr lang="en-US" sz="2400" dirty="0">
                 <a:latin typeface="+mn-lt"/>
               </a:rPr>
-              <a:t> I, et al</a:t>
+              <a:t> RS, </a:t>
             </a:r>
             <a:r>
               <a:rPr lang="en-US" sz="2400" dirty="0" smtClean="0">
                 <a:latin typeface="+mn-lt"/>
               </a:rPr>
-              <a:t>. </a:t>
+              <a:t>et al. </a:t>
+            </a:r>
+            <a:r>
+              <a:rPr lang="en-US" sz="2400" i="1" dirty="0" err="1" smtClean="0">
+                <a:latin typeface="+mn-lt"/>
+              </a:rPr>
+              <a:t>Crit</a:t>
+            </a:r>
+            <a:r>
+              <a:rPr lang="en-US" sz="2400" i="1" dirty="0" smtClean="0">
+                <a:latin typeface="+mn-lt"/>
+              </a:rPr>
+              <a:t> </a:t>
             </a:r>
             <a:r>
               <a:rPr lang="en-US" sz="2400" i="1" dirty="0">
                 <a:latin typeface="+mn-lt"/>
               </a:rPr>
-              <a:t>Science</a:t>
+              <a:t>Rev </a:t>
+            </a:r>
+            <a:r>
+              <a:rPr lang="en-US" sz="2400" i="1" dirty="0" err="1">
+                <a:latin typeface="+mn-lt"/>
+              </a:rPr>
+              <a:t>Biochem</a:t>
+            </a:r>
+            <a:r>
+              <a:rPr lang="en-US" sz="2400" i="1" dirty="0">
+                <a:latin typeface="+mn-lt"/>
+              </a:rPr>
+              <a:t> </a:t>
+            </a:r>
+            <a:r>
+              <a:rPr lang="en-US" sz="2400" i="1" dirty="0" err="1">
+                <a:latin typeface="+mn-lt"/>
+              </a:rPr>
+              <a:t>Mol</a:t>
+            </a:r>
+            <a:r>
+              <a:rPr lang="en-US" sz="2400" i="1" dirty="0">
+                <a:latin typeface="+mn-lt"/>
+              </a:rPr>
+              <a:t> </a:t>
+            </a:r>
+            <a:r>
+              <a:rPr lang="en-US" sz="2400" i="1" dirty="0" err="1">
+                <a:latin typeface="+mn-lt"/>
+              </a:rPr>
+              <a:t>Biol</a:t>
             </a:r>
             <a:r>
               <a:rPr lang="en-US" sz="2400" dirty="0">
                 <a:latin typeface="+mn-lt"/>
               </a:rPr>
-              <a:t> 2003, 300:1404–9.</a:t>
-            </a:r>
+              <a:t> 2007, </a:t>
+            </a:r>
+            <a:r>
+              <a:rPr lang="en-US" sz="2400" dirty="0" smtClean="0">
+                <a:latin typeface="+mn-lt"/>
+              </a:rPr>
+              <a:t>42:399–435</a:t>
+            </a:r>
+            <a:endParaRPr lang="en-US" sz="2400" dirty="0">
+              <a:latin typeface="+mn-lt"/>
+            </a:endParaRPr>
           </a:p>
           <a:p>
             <a:pPr lvl="0" algn="l" rtl="0">
@@ -10798,47 +10536,44 @@
               <a:buAutoNum type="arabicPeriod"/>
             </a:pPr>
             <a:r>
+              <a:rPr lang="en-US" sz="2400" dirty="0" err="1">
+                <a:latin typeface="+mn-lt"/>
+              </a:rPr>
+              <a:t>Bjedov</a:t>
+            </a:r>
+            <a:r>
               <a:rPr lang="en-US" sz="2400" dirty="0">
                 <a:latin typeface="+mn-lt"/>
               </a:rPr>
-              <a:t>Ram Y, </a:t>
-            </a:r>
-            <a:r>
-              <a:rPr lang="en-US" sz="2400" dirty="0" err="1">
-                <a:latin typeface="+mn-lt"/>
-              </a:rPr>
-              <a:t>Hadany</a:t>
+              <a:t> I, et al</a:t>
+            </a:r>
+            <a:r>
+              <a:rPr lang="en-US" sz="2400" dirty="0" smtClean="0">
+                <a:latin typeface="+mn-lt"/>
+              </a:rPr>
+              <a:t>. </a:t>
+            </a:r>
+            <a:r>
+              <a:rPr lang="en-US" sz="2400" i="1" dirty="0">
+                <a:latin typeface="+mn-lt"/>
+              </a:rPr>
+              <a:t>Science</a:t>
             </a:r>
             <a:r>
               <a:rPr lang="en-US" sz="2400" dirty="0">
                 <a:latin typeface="+mn-lt"/>
               </a:rPr>
-              <a:t> </a:t>
+              <a:t> 2003, </a:t>
             </a:r>
             <a:r>
               <a:rPr lang="en-US" sz="2400" dirty="0" smtClean="0">
                 <a:latin typeface="+mn-lt"/>
               </a:rPr>
-              <a:t>L. </a:t>
-            </a:r>
-            <a:r>
-              <a:rPr lang="en-US" sz="2400" i="1" dirty="0" smtClean="0">
-                <a:latin typeface="+mn-lt"/>
-              </a:rPr>
-              <a:t>Evolution</a:t>
-            </a:r>
-            <a:r>
-              <a:rPr lang="en-US" sz="2400" dirty="0" smtClean="0">
-                <a:latin typeface="+mn-lt"/>
-              </a:rPr>
-              <a:t> </a:t>
-            </a:r>
-            <a:r>
-              <a:rPr lang="en-US" sz="2400" dirty="0">
-                <a:latin typeface="+mn-lt"/>
-              </a:rPr>
-              <a:t>2012, 66:2315–28.</a:t>
-            </a:r>
+              <a:t>300:1404–9</a:t>
+            </a:r>
+            <a:endParaRPr lang="en-US" sz="2400" dirty="0">
+              <a:latin typeface="+mn-lt"/>
+            </a:endParaRPr>
           </a:p>
           <a:p>
             <a:pPr lvl="0" algn="l" rtl="0">
@@ -10846,35 +10581,56 @@
               <a:buAutoNum type="arabicPeriod"/>
             </a:pPr>
             <a:r>
+              <a:rPr lang="en-US" sz="2400" dirty="0">
+                <a:latin typeface="+mn-lt"/>
+              </a:rPr>
+              <a:t>Ram Y, </a:t>
+            </a:r>
+            <a:r>
               <a:rPr lang="en-US" sz="2400" dirty="0" err="1">
                 <a:latin typeface="+mn-lt"/>
               </a:rPr>
-              <a:t>Kibota</a:t>
+              <a:t>Hadany</a:t>
             </a:r>
             <a:r>
               <a:rPr lang="en-US" sz="2400" dirty="0">
                 <a:latin typeface="+mn-lt"/>
               </a:rPr>
-              <a:t> TT, Lynch </a:t>
+              <a:t> </a:t>
             </a:r>
             <a:r>
               <a:rPr lang="en-US" sz="2400" dirty="0" smtClean="0">
                 <a:latin typeface="+mn-lt"/>
               </a:rPr>
-              <a:t>M. </a:t>
-            </a:r>
-            <a:r>
-              <a:rPr lang="en-US" sz="2400" i="1" dirty="0">
-                <a:latin typeface="+mn-lt"/>
-              </a:rPr>
-              <a:t>Nature</a:t>
+              <a:t>L. </a:t>
+            </a:r>
+            <a:r>
+              <a:rPr lang="en-US" sz="2400" i="1" dirty="0" smtClean="0">
+                <a:latin typeface="+mn-lt"/>
+              </a:rPr>
+              <a:t>Evolution</a:t>
+            </a:r>
+            <a:r>
+              <a:rPr lang="en-US" sz="2400" dirty="0" smtClean="0">
+                <a:latin typeface="+mn-lt"/>
+              </a:rPr>
+              <a:t> </a:t>
             </a:r>
             <a:r>
               <a:rPr lang="en-US" sz="2400" dirty="0">
                 <a:latin typeface="+mn-lt"/>
               </a:rPr>
-              <a:t> 1996, 381:694–6.</a:t>
-            </a:r>
+              <a:t>2012, </a:t>
+            </a:r>
+            <a:r>
+              <a:rPr lang="en-US" sz="2400" dirty="0" smtClean="0">
+                <a:latin typeface="+mn-lt"/>
+              </a:rPr>
+              <a:t>66:2315–28</a:t>
+            </a:r>
+            <a:endParaRPr lang="en-US" sz="2400" dirty="0">
+              <a:latin typeface="+mn-lt"/>
+            </a:endParaRPr>
           </a:p>
           <a:p>
             <a:pPr lvl="0" algn="l" rtl="0">
@@ -10882,53 +10638,44 @@
               <a:buAutoNum type="arabicPeriod"/>
             </a:pPr>
             <a:r>
+              <a:rPr lang="en-US" sz="2400" dirty="0" err="1">
+                <a:latin typeface="+mn-lt"/>
+              </a:rPr>
+              <a:t>Kibota</a:t>
+            </a:r>
+            <a:r>
               <a:rPr lang="en-US" sz="2400" dirty="0">
                 <a:latin typeface="+mn-lt"/>
               </a:rPr>
-              <a:t>Gordo </a:t>
+              <a:t> TT, Lynch </a:t>
             </a:r>
             <a:r>
               <a:rPr lang="en-US" sz="2400" dirty="0" smtClean="0">
                 <a:latin typeface="+mn-lt"/>
               </a:rPr>
-              <a:t>I, et al. </a:t>
+              <a:t>M. </a:t>
             </a:r>
             <a:r>
               <a:rPr lang="en-US" sz="2400" i="1" dirty="0">
                 <a:latin typeface="+mn-lt"/>
               </a:rPr>
-              <a:t>J </a:t>
-            </a:r>
-            <a:r>
-              <a:rPr lang="en-US" sz="2400" i="1" dirty="0" err="1">
-                <a:latin typeface="+mn-lt"/>
-              </a:rPr>
-              <a:t>Mol</a:t>
-            </a:r>
-            <a:r>
-              <a:rPr lang="en-US" sz="2400" i="1" dirty="0">
-                <a:latin typeface="+mn-lt"/>
-              </a:rPr>
-              <a:t> </a:t>
-            </a:r>
-            <a:r>
-              <a:rPr lang="en-US" sz="2400" i="1" dirty="0" err="1">
-                <a:latin typeface="+mn-lt"/>
-              </a:rPr>
-              <a:t>Microbiol</a:t>
-            </a:r>
-            <a:r>
-              <a:rPr lang="en-US" sz="2400" i="1" dirty="0">
-                <a:latin typeface="+mn-lt"/>
-              </a:rPr>
-              <a:t> Biotech</a:t>
+              <a:t>Nature</a:t>
             </a:r>
             <a:r>
               <a:rPr lang="en-US" sz="2400" dirty="0">
                 <a:latin typeface="+mn-lt"/>
               </a:rPr>
-              <a:t> 2011, 21:20–35.</a:t>
-            </a:r>
+              <a:t> 1996, </a:t>
+            </a:r>
+            <a:r>
+              <a:rPr lang="en-US" sz="2400" dirty="0" smtClean="0">
+                <a:latin typeface="+mn-lt"/>
+              </a:rPr>
+              <a:t>381:694–6</a:t>
+            </a:r>
+            <a:endParaRPr lang="en-US" sz="2400" dirty="0">
+              <a:latin typeface="+mn-lt"/>
+            </a:endParaRPr>
           </a:p>
           <a:p>
             <a:pPr lvl="0" algn="l" rtl="0">
@@ -10939,26 +10686,59 @@
               <a:rPr lang="en-US" sz="2400" dirty="0">
                 <a:latin typeface="+mn-lt"/>
               </a:rPr>
-              <a:t>Drake JW, et al</a:t>
+              <a:t>Gordo </a:t>
             </a:r>
             <a:r>
               <a:rPr lang="en-US" sz="2400" dirty="0" smtClean="0">
                 <a:latin typeface="+mn-lt"/>
               </a:rPr>
-              <a:t>. </a:t>
+              <a:t>I, et al. </a:t>
             </a:r>
             <a:r>
               <a:rPr lang="en-US" sz="2400" i="1" dirty="0">
                 <a:latin typeface="+mn-lt"/>
               </a:rPr>
-              <a:t>Genetics</a:t>
+              <a:t>J </a:t>
+            </a:r>
+            <a:r>
+              <a:rPr lang="en-US" sz="2400" i="1" dirty="0" err="1">
+                <a:latin typeface="+mn-lt"/>
+              </a:rPr>
+              <a:t>Mol</a:t>
+            </a:r>
+            <a:r>
+              <a:rPr lang="en-US" sz="2400" i="1" dirty="0">
+                <a:latin typeface="+mn-lt"/>
+              </a:rPr>
+              <a:t> </a:t>
+            </a:r>
+            <a:r>
+              <a:rPr lang="en-US" sz="2400" i="1" dirty="0" err="1">
+                <a:latin typeface="+mn-lt"/>
+              </a:rPr>
+              <a:t>Microbiol</a:t>
+            </a:r>
+            <a:r>
+              <a:rPr lang="en-US" sz="2400" i="1" dirty="0">
+                <a:latin typeface="+mn-lt"/>
+              </a:rPr>
+              <a:t> Biotech</a:t>
             </a:r>
             <a:r>
               <a:rPr lang="en-US" sz="2400" dirty="0">
                 <a:latin typeface="+mn-lt"/>
               </a:rPr>
-              <a:t> 1998, 148:1667–86.</a:t>
-            </a:r>
+              <a:t> 2011, </a:t>
+            </a:r>
+            <a:r>
+              <a:rPr lang="en-US" sz="2400" dirty="0" smtClean="0">
+                <a:latin typeface="+mn-lt"/>
+              </a:rPr>
+              <a:t>21:20–35</a:t>
+            </a:r>
+            <a:endParaRPr lang="en-US" sz="2400" dirty="0">
+              <a:latin typeface="+mn-lt"/>
+            </a:endParaRPr>
           </a:p>
           <a:p>
             <a:pPr lvl="0" algn="l" rtl="0">
@@ -10966,35 +10746,38 @@
               <a:buAutoNum type="arabicPeriod"/>
             </a:pPr>
             <a:r>
-              <a:rPr lang="en-US" sz="2400" dirty="0" err="1">
-                <a:latin typeface="+mn-lt"/>
-              </a:rPr>
-              <a:t>Wielgoss</a:t>
-            </a:r>
-            <a:r>
               <a:rPr lang="en-US" sz="2400" dirty="0">
                 <a:latin typeface="+mn-lt"/>
               </a:rPr>
-              <a:t> S, et </a:t>
+              <a:t>Drake JW, et al</a:t>
             </a:r>
             <a:r>
               <a:rPr lang="en-US" sz="2400" dirty="0" smtClean="0">
                 <a:latin typeface="+mn-lt"/>
               </a:rPr>
-              <a:t>al. </a:t>
+              <a:t>. </a:t>
             </a:r>
             <a:r>
               <a:rPr lang="en-US" sz="2400" i="1" dirty="0">
                 <a:latin typeface="+mn-lt"/>
               </a:rPr>
-              <a:t>G3</a:t>
+              <a:t>Genetics</a:t>
             </a:r>
             <a:r>
               <a:rPr lang="en-US" sz="2400" dirty="0">
                 <a:latin typeface="+mn-lt"/>
               </a:rPr>
-              <a:t> 2011, 1:183.</a:t>
-            </a:r>
+              <a:t> 1998, </a:t>
+            </a:r>
+            <a:r>
+              <a:rPr lang="en-US" sz="2400" dirty="0" smtClean="0">
+                <a:latin typeface="+mn-lt"/>
+              </a:rPr>
+              <a:t>148:1667–86</a:t>
+            </a:r>
+            <a:endParaRPr lang="en-US" sz="2400" dirty="0">
+              <a:latin typeface="+mn-lt"/>
+            </a:endParaRPr>
           </a:p>
           <a:p>
             <a:pPr lvl="0" algn="l" rtl="0">
@@ -11002,9 +10785,54 @@
               <a:buAutoNum type="arabicPeriod"/>
             </a:pPr>
             <a:r>
+              <a:rPr lang="en-US" sz="2400" dirty="0" err="1">
+                <a:latin typeface="+mn-lt"/>
+              </a:rPr>
+              <a:t>Wielgoss</a:t>
+            </a:r>
+            <a:r>
               <a:rPr lang="en-US" sz="2400" dirty="0">
                 <a:latin typeface="+mn-lt"/>
               </a:rPr>
+              <a:t> S, et </a:t>
+            </a:r>
+            <a:r>
+              <a:rPr lang="en-US" sz="2400" dirty="0" smtClean="0">
+                <a:latin typeface="+mn-lt"/>
+              </a:rPr>
+              <a:t>al. </a:t>
+            </a:r>
+            <a:r>
+              <a:rPr lang="en-US" sz="2400" i="1" dirty="0">
+                <a:latin typeface="+mn-lt"/>
+              </a:rPr>
+              <a:t>G3</a:t>
+            </a:r>
+            <a:r>
+              <a:rPr lang="en-US" sz="2400" dirty="0">
+                <a:latin typeface="+mn-lt"/>
+              </a:rPr>
+              <a:t> 2011, </a:t>
+            </a:r>
+            <a:r>
+              <a:rPr lang="en-US" sz="2400" dirty="0" smtClean="0">
+                <a:latin typeface="+mn-lt"/>
+              </a:rPr>
+              <a:t>1:183</a:t>
+            </a:r>
+            <a:endParaRPr lang="en-US" sz="2400" dirty="0">
+              <a:latin typeface="+mn-lt"/>
+            </a:endParaRPr>
+          </a:p>
+          <a:p>
+            <a:pPr lvl="0" algn="l" rtl="0">
+              <a:buFont typeface="+mj-lt"/>
+              <a:buAutoNum type="arabicPeriod"/>
+            </a:pPr>
+            <a:r>
+              <a:rPr lang="en-US" sz="2400" dirty="0">
+                <a:latin typeface="+mn-lt"/>
+              </a:rPr>
               <a:t>Hall LMC, Henderson-</a:t>
             </a:r>
             <a:r>
@@ -11041,19 +10869,13 @@
               <a:rPr lang="en-US" sz="2400" dirty="0">
                 <a:latin typeface="+mn-lt"/>
               </a:rPr>
-              <a:t> 2006, </a:t>
-            </a:r>
-            <a:endParaRPr lang="en-US" sz="2400" dirty="0" smtClean="0">
-              <a:latin typeface="+mn-lt"/>
-            </a:endParaRPr>
-          </a:p>
-          <a:p>
-            <a:pPr marL="0" lvl="0" indent="0" algn="l" rtl="0"/>
+              <a:t> </a:t>
+            </a:r>
             <a:r>
               <a:rPr lang="en-US" sz="2400" dirty="0" smtClean="0">
                 <a:latin typeface="+mn-lt"/>
               </a:rPr>
-              <a:t>       152(</a:t>
+              <a:t>2006, 152(</a:t>
             </a:r>
             <a:r>
               <a:rPr lang="en-US" sz="2400" dirty="0" err="1" smtClean="0">
@@ -11071,15 +10893,15 @@
               <a:rPr lang="en-US" sz="2400" dirty="0">
                 <a:latin typeface="+mn-lt"/>
               </a:rPr>
-              <a:t>9):2505–14</a:t>
+              <a:t>9):</a:t>
             </a:r>
             <a:r>
               <a:rPr lang="en-US" sz="2400" dirty="0" smtClean="0">
                 <a:latin typeface="+mn-lt"/>
               </a:rPr>
-              <a:t>.</a:t>
-            </a:r>
-            <a:endParaRPr lang="en-US" sz="2400" dirty="0">
+              <a:t>2505–14</a:t>
+            </a:r>
+            <a:endParaRPr lang="en-US" sz="2200" dirty="0">
               <a:latin typeface="+mn-lt"/>
             </a:endParaRPr>
           </a:p>
@@ -11596,7 +11418,7 @@
           <p:nvPr>
             <p:extLst>
               <p:ext uri="{D42A27DB-BD31-4B8C-83A1-F6EECF244321}">
-                <p14:modId xmlns:p14="http://schemas.microsoft.com/office/powerpoint/2010/main" val="1670391130"/>
+                <p14:modId xmlns:p14="http://schemas.microsoft.com/office/powerpoint/2010/main" val="3356670333"/>
               </p:ext>
             </p:extLst>
           </p:nvPr>
@@ -11715,7 +11537,7 @@
                           <a:latin typeface="+mn-lt"/>
                           <a:cs typeface="Helvetica" pitchFamily="34" charset="0"/>
                         </a:rPr>
-                        <a:t>5, 6</a:t>
+                        <a:t>6,7</a:t>
                       </a:r>
                       <a:endParaRPr lang="he-IL" sz="2800" dirty="0">
                         <a:latin typeface="+mn-lt"/>
@@ -11817,7 +11639,7 @@
                           <a:latin typeface="+mn-lt"/>
                           <a:cs typeface="Helvetica" pitchFamily="34" charset="0"/>
                         </a:rPr>
-                        <a:t>6</a:t>
+                        <a:t>8</a:t>
                       </a:r>
                       <a:endParaRPr lang="he-IL" sz="2800" dirty="0" smtClean="0">
                         <a:latin typeface="+mn-lt"/>
@@ -11903,8 +11725,12 @@
                           <a:latin typeface="+mn-lt"/>
                           <a:cs typeface="Helvetica" pitchFamily="34" charset="0"/>
                         </a:rPr>
-                        <a:t>7, 8</a:t>
+                        <a:t>8,9</a:t>
                       </a:r>
+                      <a:endParaRPr lang="en-US" sz="2800" dirty="0" smtClean="0">
+                        <a:latin typeface="+mn-lt"/>
+                        <a:cs typeface="Helvetica" pitchFamily="34" charset="0"/>
+                      </a:endParaRPr>
                     </a:p>
                   </a:txBody>
                   <a:tcPr/>
@@ -11985,7 +11811,7 @@
                           <a:latin typeface="+mn-lt"/>
                           <a:cs typeface="Helvetica" pitchFamily="34" charset="0"/>
                         </a:rPr>
-                        <a:t>6</a:t>
+                        <a:t>7</a:t>
                       </a:r>
                       <a:endParaRPr lang="he-IL" sz="2800" dirty="0">
                         <a:latin typeface="+mn-lt"/>
@@ -12074,11 +11900,11 @@
                     <a:p>
                       <a:pPr algn="ctr" rtl="0"/>
                       <a:r>
-                        <a:rPr lang="en-US" sz="2800" dirty="0" smtClean="0">
+                        <a:rPr lang="en-US" sz="2800" smtClean="0">
                           <a:latin typeface="+mn-lt"/>
                           <a:cs typeface="Helvetica" pitchFamily="34" charset="0"/>
                         </a:rPr>
-                        <a:t>9</a:t>
+                        <a:t>10</a:t>
                       </a:r>
                       <a:endParaRPr lang="he-IL" sz="2800" dirty="0">
                         <a:latin typeface="+mn-lt"/>
@@ -12392,7 +12218,7 @@
       </p:sp>
       <p:pic>
         <p:nvPicPr>
-          <p:cNvPr id="1036" name="Picture 12"/>
+          <p:cNvPr id="1031" name="Picture 7" descr="D:\university\confrences\GRC2013\adaptation_time_s_0.05_logN_6.png"/>
           <p:cNvPicPr>
             <a:picLocks noChangeAspect="1" noChangeArrowheads="1"/>
           </p:cNvPicPr>
@@ -12400,70 +12226,6 @@
         </p:nvPicPr>
         <p:blipFill>
           <a:blip r:embed="rId4">
-            <a:extLst>
-              <a:ext uri="{28A0092B-C50C-407E-A947-70E740481C1C}">
-                <a14:useLocalDpi xmlns:a14="http://schemas.microsoft.com/office/drawing/2010/main" val="0"/>
-              </a:ext>
-            </a:extLst>
-          </a:blip>
-          <a:srcRect/>
-          <a:stretch>
-            <a:fillRect/>
-          </a:stretch>
-        </p:blipFill>
-        <p:spPr bwMode="auto">
-          <a:xfrm>
-            <a:off x="33110324" y="40785775"/>
-            <a:ext cx="3914775" cy="619125"/>
-          </a:xfrm>
-          <a:prstGeom prst="rect">
-            <a:avLst/>
-          </a:prstGeom>
-          <a:noFill/>
-          <a:ln>
-            <a:noFill/>
-          </a:ln>
-          <a:effectLst/>
-          <a:extLst>
-            <a:ext uri="{909E8E84-426E-40DD-AFC4-6F175D3DCCD1}">
-              <a14:hiddenFill xmlns:a14="http://schemas.microsoft.com/office/drawing/2010/main">
-                <a:solidFill>
-                  <a:schemeClr val="accent1"/>
-                </a:solidFill>
-              </a14:hiddenFill>
-            </a:ext>
-            <a:ext uri="{91240B29-F687-4F45-9708-019B960494DF}">
-              <a14:hiddenLine xmlns:a14="http://schemas.microsoft.com/office/drawing/2010/main" w="9525">
-                <a:solidFill>
-                  <a:schemeClr val="tx1"/>
-                </a:solidFill>
-                <a:miter lim="800000"/>
-                <a:headEnd/>
-                <a:tailEnd/>
-              </a14:hiddenLine>
-            </a:ext>
-            <a:ext uri="{AF507438-7753-43E0-B8FC-AC1667EBCBE1}">
-              <a14:hiddenEffects xmlns:a14="http://schemas.microsoft.com/office/drawing/2010/main">
-                <a:effectLst>
-                  <a:outerShdw dist="35921" dir="2700000" algn="ctr" rotWithShape="0">
-                    <a:schemeClr val="bg2"/>
-                  </a:outerShdw>
-                </a:effectLst>
-              </a14:hiddenEffects>
-            </a:ext>
-          </a:extLst>
-        </p:spPr>
-      </p:pic>
-      <p:pic>
-        <p:nvPicPr>
-          <p:cNvPr id="1031" name="Picture 7" descr="D:\university\confrences\GRC2013\adaptation_time_s_0.05_logN_6.png"/>
-          <p:cNvPicPr>
-            <a:picLocks noChangeAspect="1" noChangeArrowheads="1"/>
-          </p:cNvPicPr>
-          <p:nvPr/>
-        </p:nvPicPr>
-        <p:blipFill>
-          <a:blip r:embed="rId5">
             <a:extLst>
               <a:ext uri="{28A0092B-C50C-407E-A947-70E740481C1C}">
                 <a14:useLocalDpi xmlns:a14="http://schemas.microsoft.com/office/drawing/2010/main" val="0"/>
@@ -12504,7 +12266,7 @@
           <p:nvPr/>
         </p:nvPicPr>
         <p:blipFill>
-          <a:blip r:embed="rId6">
+          <a:blip r:embed="rId5">
             <a:extLst>
               <a:ext uri="{28A0092B-C50C-407E-A947-70E740481C1C}">
                 <a14:useLocalDpi xmlns:a14="http://schemas.microsoft.com/office/drawing/2010/main" val="0"/>
@@ -12545,7 +12307,7 @@
           <p:nvPr/>
         </p:nvPicPr>
         <p:blipFill rotWithShape="1">
-          <a:blip r:embed="rId7">
+          <a:blip r:embed="rId6">
             <a:extLst>
               <a:ext uri="{28A0092B-C50C-407E-A947-70E740481C1C}">
                 <a14:useLocalDpi xmlns:a14="http://schemas.microsoft.com/office/drawing/2010/main" val="0"/>
@@ -12584,7 +12346,7 @@
           <p:nvPr/>
         </p:nvPicPr>
         <p:blipFill rotWithShape="1">
-          <a:blip r:embed="rId8">
+          <a:blip r:embed="rId7">
             <a:extLst>
               <a:ext uri="{28A0092B-C50C-407E-A947-70E740481C1C}">
                 <a14:useLocalDpi xmlns:a14="http://schemas.microsoft.com/office/drawing/2010/main" val="0"/>
@@ -12682,7 +12444,7 @@
               <p:nvPr/>
             </p:nvPicPr>
             <p:blipFill rotWithShape="1">
-              <a:blip r:embed="rId9">
+              <a:blip r:embed="rId8">
                 <a:extLst>
                   <a:ext uri="{28A0092B-C50C-407E-A947-70E740481C1C}">
                     <a14:useLocalDpi xmlns:a14="http://schemas.microsoft.com/office/drawing/2010/main" val="0"/>
@@ -13018,7 +12780,7 @@
           <p:nvPr/>
         </p:nvPicPr>
         <p:blipFill>
-          <a:blip r:embed="rId10">
+          <a:blip r:embed="rId9">
             <a:extLst>
               <a:ext uri="{28A0092B-C50C-407E-A947-70E740481C1C}">
                 <a14:useLocalDpi xmlns:a14="http://schemas.microsoft.com/office/drawing/2010/main" val="0"/>
@@ -13183,7 +12945,7 @@
           <p:nvPr/>
         </p:nvPicPr>
         <p:blipFill>
-          <a:blip r:embed="rId11">
+          <a:blip r:embed="rId10">
             <a:extLst>
               <a:ext uri="{28A0092B-C50C-407E-A947-70E740481C1C}">
                 <a14:useLocalDpi xmlns:a14="http://schemas.microsoft.com/office/drawing/2010/main" val="0"/>
@@ -13348,7 +13110,7 @@
           <p:nvPr/>
         </p:nvPicPr>
         <p:blipFill rotWithShape="1">
-          <a:blip r:embed="rId12">
+          <a:blip r:embed="rId11">
             <a:extLst>
               <a:ext uri="{28A0092B-C50C-407E-A947-70E740481C1C}">
                 <a14:useLocalDpi xmlns:a14="http://schemas.microsoft.com/office/drawing/2010/main" val="0"/>
@@ -13418,6 +13180,47 @@
           <p:nvPr/>
         </p:nvPicPr>
         <p:blipFill>
+          <a:blip r:embed="rId12">
+            <a:extLst>
+              <a:ext uri="{28A0092B-C50C-407E-A947-70E740481C1C}">
+                <a14:useLocalDpi xmlns:a14="http://schemas.microsoft.com/office/drawing/2010/main" val="0"/>
+              </a:ext>
+            </a:extLst>
+          </a:blip>
+          <a:srcRect/>
+          <a:stretch>
+            <a:fillRect/>
+          </a:stretch>
+        </p:blipFill>
+        <p:spPr bwMode="auto">
+          <a:xfrm>
+            <a:off x="36467974" y="39056533"/>
+            <a:ext cx="1760984" cy="1760984"/>
+          </a:xfrm>
+          <a:prstGeom prst="rect">
+            <a:avLst/>
+          </a:prstGeom>
+          <a:noFill/>
+          <a:extLst>
+            <a:ext uri="{909E8E84-426E-40DD-AFC4-6F175D3DCCD1}">
+              <a14:hiddenFill xmlns:a14="http://schemas.microsoft.com/office/drawing/2010/main">
+                <a:solidFill>
+                  <a:srgbClr val="FFFFFF"/>
+                </a:solidFill>
+              </a14:hiddenFill>
+            </a:ext>
+          </a:extLst>
+        </p:spPr>
+      </p:pic>
+      <p:pic>
+        <p:nvPicPr>
+          <p:cNvPr id="1053" name="Picture 29" descr="D:\university\confrences\GRC2013\yoav_mypictr_Facebook.jpg"/>
+          <p:cNvPicPr>
+            <a:picLocks noChangeAspect="1" noChangeArrowheads="1"/>
+          </p:cNvPicPr>
+          <p:nvPr/>
+        </p:nvPicPr>
+        <p:blipFill>
           <a:blip r:embed="rId13">
             <a:extLst>
               <a:ext uri="{28A0092B-C50C-407E-A947-70E740481C1C}">
@@ -13432,13 +13235,20 @@
         </p:blipFill>
         <p:spPr bwMode="auto">
           <a:xfrm>
-            <a:off x="38452572" y="39051084"/>
-            <a:ext cx="2209800" cy="2209800"/>
+            <a:off x="38740604" y="38958642"/>
+            <a:ext cx="1905000" cy="2381250"/>
           </a:xfrm>
           <a:prstGeom prst="rect">
             <a:avLst/>
           </a:prstGeom>
           <a:noFill/>
+          <a:effectLst>
+            <a:outerShdw blurRad="50800" dist="38100" dir="2700000" algn="tl" rotWithShape="0">
+              <a:prstClr val="black">
+                <a:alpha val="40000"/>
+              </a:prstClr>
+            </a:outerShdw>
+          </a:effectLst>
           <a:extLst>
             <a:ext uri="{909E8E84-426E-40DD-AFC4-6F175D3DCCD1}">
               <a14:hiddenFill xmlns:a14="http://schemas.microsoft.com/office/drawing/2010/main">
@@ -13450,16 +13260,276 @@
           </a:extLst>
         </p:spPr>
       </p:pic>
+      <p:grpSp>
+        <p:nvGrpSpPr>
+          <p:cNvPr id="69" name="Group 68"/>
+          <p:cNvGrpSpPr/>
+          <p:nvPr/>
+        </p:nvGrpSpPr>
+        <p:grpSpPr>
+          <a:xfrm>
+            <a:off x="30243660" y="39803881"/>
+            <a:ext cx="4913312" cy="1384995"/>
+            <a:chOff x="1026840" y="5356373"/>
+            <a:chExt cx="4913312" cy="1384995"/>
+          </a:xfrm>
+        </p:grpSpPr>
+        <p:pic>
+          <p:nvPicPr>
+            <p:cNvPr id="70" name="Picture 1"/>
+            <p:cNvPicPr>
+              <a:picLocks noChangeAspect="1" noChangeArrowheads="1"/>
+            </p:cNvPicPr>
+            <p:nvPr/>
+          </p:nvPicPr>
+          <p:blipFill>
+            <a:blip r:embed="rId14">
+              <a:extLst>
+                <a:ext uri="{28A0092B-C50C-407E-A947-70E740481C1C}">
+                  <a14:useLocalDpi xmlns:a14="http://schemas.microsoft.com/office/drawing/2010/main" val="0"/>
+                </a:ext>
+              </a:extLst>
+            </a:blip>
+            <a:srcRect/>
+            <a:stretch>
+              <a:fillRect/>
+            </a:stretch>
+          </p:blipFill>
+          <p:spPr bwMode="auto">
+            <a:xfrm>
+              <a:off x="1026840" y="5932512"/>
+              <a:ext cx="304800" cy="304800"/>
+            </a:xfrm>
+            <a:prstGeom prst="rect">
+              <a:avLst/>
+            </a:prstGeom>
+            <a:noFill/>
+            <a:ln>
+              <a:noFill/>
+            </a:ln>
+            <a:effectLst/>
+            <a:extLst>
+              <a:ext uri="{909E8E84-426E-40DD-AFC4-6F175D3DCCD1}">
+                <a14:hiddenFill xmlns:a14="http://schemas.microsoft.com/office/drawing/2010/main">
+                  <a:solidFill>
+                    <a:schemeClr val="accent1"/>
+                  </a:solidFill>
+                </a14:hiddenFill>
+              </a:ext>
+              <a:ext uri="{91240B29-F687-4F45-9708-019B960494DF}">
+                <a14:hiddenLine xmlns:a14="http://schemas.microsoft.com/office/drawing/2010/main" w="9525">
+                  <a:solidFill>
+                    <a:schemeClr val="tx1"/>
+                  </a:solidFill>
+                  <a:miter lim="800000"/>
+                  <a:headEnd/>
+                  <a:tailEnd/>
+                </a14:hiddenLine>
+              </a:ext>
+              <a:ext uri="{AF507438-7753-43E0-B8FC-AC1667EBCBE1}">
+                <a14:hiddenEffects xmlns:a14="http://schemas.microsoft.com/office/drawing/2010/main">
+                  <a:effectLst>
+                    <a:outerShdw dist="35921" dir="2700000" algn="ctr" rotWithShape="0">
+                      <a:schemeClr val="bg2"/>
+                    </a:outerShdw>
+                  </a:effectLst>
+                </a14:hiddenEffects>
+              </a:ext>
+            </a:extLst>
+          </p:spPr>
+        </p:pic>
+        <p:pic>
+          <p:nvPicPr>
+            <p:cNvPr id="71" name="Picture 2"/>
+            <p:cNvPicPr>
+              <a:picLocks noChangeAspect="1" noChangeArrowheads="1"/>
+            </p:cNvPicPr>
+            <p:nvPr/>
+          </p:nvPicPr>
+          <p:blipFill>
+            <a:blip r:embed="rId15">
+              <a:extLst>
+                <a:ext uri="{28A0092B-C50C-407E-A947-70E740481C1C}">
+                  <a14:useLocalDpi xmlns:a14="http://schemas.microsoft.com/office/drawing/2010/main" val="0"/>
+                </a:ext>
+              </a:extLst>
+            </a:blip>
+            <a:srcRect/>
+            <a:stretch>
+              <a:fillRect/>
+            </a:stretch>
+          </p:blipFill>
+          <p:spPr bwMode="auto">
+            <a:xfrm>
+              <a:off x="1026840" y="5500464"/>
+              <a:ext cx="304800" cy="304800"/>
+            </a:xfrm>
+            <a:prstGeom prst="rect">
+              <a:avLst/>
+            </a:prstGeom>
+            <a:noFill/>
+            <a:ln>
+              <a:noFill/>
+            </a:ln>
+            <a:effectLst/>
+            <a:extLst>
+              <a:ext uri="{909E8E84-426E-40DD-AFC4-6F175D3DCCD1}">
+                <a14:hiddenFill xmlns:a14="http://schemas.microsoft.com/office/drawing/2010/main">
+                  <a:solidFill>
+                    <a:schemeClr val="accent1"/>
+                  </a:solidFill>
+                </a14:hiddenFill>
+              </a:ext>
+              <a:ext uri="{91240B29-F687-4F45-9708-019B960494DF}">
+                <a14:hiddenLine xmlns:a14="http://schemas.microsoft.com/office/drawing/2010/main" w="9525">
+                  <a:solidFill>
+                    <a:schemeClr val="tx1"/>
+                  </a:solidFill>
+                  <a:miter lim="800000"/>
+                  <a:headEnd/>
+                  <a:tailEnd/>
+                </a14:hiddenLine>
+              </a:ext>
+              <a:ext uri="{AF507438-7753-43E0-B8FC-AC1667EBCBE1}">
+                <a14:hiddenEffects xmlns:a14="http://schemas.microsoft.com/office/drawing/2010/main">
+                  <a:effectLst>
+                    <a:outerShdw dist="35921" dir="2700000" algn="ctr" rotWithShape="0">
+                      <a:schemeClr val="bg2"/>
+                    </a:outerShdw>
+                  </a:effectLst>
+                </a14:hiddenEffects>
+              </a:ext>
+            </a:extLst>
+          </p:spPr>
+        </p:pic>
+        <p:pic>
+          <p:nvPicPr>
+            <p:cNvPr id="73" name="Picture 3"/>
+            <p:cNvPicPr>
+              <a:picLocks noChangeAspect="1" noChangeArrowheads="1"/>
+            </p:cNvPicPr>
+            <p:nvPr/>
+          </p:nvPicPr>
+          <p:blipFill>
+            <a:blip r:embed="rId16">
+              <a:extLst>
+                <a:ext uri="{28A0092B-C50C-407E-A947-70E740481C1C}">
+                  <a14:useLocalDpi xmlns:a14="http://schemas.microsoft.com/office/drawing/2010/main" val="0"/>
+                </a:ext>
+              </a:extLst>
+            </a:blip>
+            <a:srcRect/>
+            <a:stretch>
+              <a:fillRect/>
+            </a:stretch>
+          </p:blipFill>
+          <p:spPr bwMode="auto">
+            <a:xfrm>
+              <a:off x="1026840" y="6309320"/>
+              <a:ext cx="304800" cy="304800"/>
+            </a:xfrm>
+            <a:prstGeom prst="rect">
+              <a:avLst/>
+            </a:prstGeom>
+            <a:noFill/>
+            <a:ln>
+              <a:noFill/>
+            </a:ln>
+            <a:effectLst/>
+            <a:extLst>
+              <a:ext uri="{909E8E84-426E-40DD-AFC4-6F175D3DCCD1}">
+                <a14:hiddenFill xmlns:a14="http://schemas.microsoft.com/office/drawing/2010/main">
+                  <a:solidFill>
+                    <a:schemeClr val="accent1"/>
+                  </a:solidFill>
+                </a14:hiddenFill>
+              </a:ext>
+              <a:ext uri="{91240B29-F687-4F45-9708-019B960494DF}">
+                <a14:hiddenLine xmlns:a14="http://schemas.microsoft.com/office/drawing/2010/main" w="9525">
+                  <a:solidFill>
+                    <a:schemeClr val="tx1"/>
+                  </a:solidFill>
+                  <a:miter lim="800000"/>
+                  <a:headEnd/>
+                  <a:tailEnd/>
+                </a14:hiddenLine>
+              </a:ext>
+              <a:ext uri="{AF507438-7753-43E0-B8FC-AC1667EBCBE1}">
+                <a14:hiddenEffects xmlns:a14="http://schemas.microsoft.com/office/drawing/2010/main">
+                  <a:effectLst>
+                    <a:outerShdw dist="35921" dir="2700000" algn="ctr" rotWithShape="0">
+                      <a:schemeClr val="bg2"/>
+                    </a:outerShdw>
+                  </a:effectLst>
+                </a14:hiddenEffects>
+              </a:ext>
+            </a:extLst>
+          </p:spPr>
+        </p:pic>
+        <p:sp>
+          <p:nvSpPr>
+            <p:cNvPr id="74" name="Rectangle 73"/>
+            <p:cNvSpPr/>
+            <p:nvPr/>
+          </p:nvSpPr>
+          <p:spPr>
+            <a:xfrm>
+              <a:off x="1368152" y="5356373"/>
+              <a:ext cx="4572000" cy="1384995"/>
+            </a:xfrm>
+            <a:prstGeom prst="rect">
+              <a:avLst/>
+            </a:prstGeom>
+          </p:spPr>
+          <p:txBody>
+            <a:bodyPr>
+              <a:spAutoFit/>
+            </a:bodyPr>
+            <a:lstStyle/>
+            <a:p>
+              <a:pPr algn="l" rtl="0"/>
+              <a:r>
+                <a:rPr lang="en-US" sz="2800" b="1" dirty="0"/>
+                <a:t>yoavram@post.tau.ac.il</a:t>
+              </a:r>
+            </a:p>
+            <a:p>
+              <a:pPr algn="l" rtl="0"/>
+              <a:r>
+                <a:rPr lang="en-US" sz="2800" b="1" dirty="0" smtClean="0"/>
+                <a:t>@</a:t>
+              </a:r>
+              <a:r>
+                <a:rPr lang="en-US" sz="2800" b="1" dirty="0"/>
+                <a:t>yoavram</a:t>
+              </a:r>
+            </a:p>
+            <a:p>
+              <a:pPr algn="l" rtl="0"/>
+              <a:r>
+                <a:rPr lang="en-US" sz="2800" b="1" dirty="0" smtClean="0"/>
+                <a:t>http</a:t>
+              </a:r>
+              <a:r>
+                <a:rPr lang="en-US" sz="2800" b="1" dirty="0"/>
+                <a:t>://www.yoavram.com</a:t>
+              </a:r>
+              <a:endParaRPr lang="he-IL" sz="2800" b="1" dirty="0"/>
+            </a:p>
+          </p:txBody>
+        </p:sp>
+      </p:grpSp>
       <p:pic>
         <p:nvPicPr>
-          <p:cNvPr id="1053" name="Picture 29" descr="D:\university\confrences\GRC2013\yoav_mypictr_Facebook.jpg"/>
+          <p:cNvPr id="1032" name="Picture 8" descr="http://english.tau.ac.il/sites/default/files/TAU_Logo_HomePage_Eng.png"/>
           <p:cNvPicPr>
             <a:picLocks noChangeAspect="1" noChangeArrowheads="1"/>
           </p:cNvPicPr>
           <p:nvPr/>
         </p:nvPicPr>
         <p:blipFill>
-          <a:blip r:embed="rId14">
+          <a:blip r:embed="rId17">
+            <a:biLevel thresh="75000"/>
             <a:extLst>
               <a:ext uri="{28A0092B-C50C-407E-A947-70E740481C1C}">
                 <a14:useLocalDpi xmlns:a14="http://schemas.microsoft.com/office/drawing/2010/main" val="0"/>
@@ -13473,20 +13543,13 @@
         </p:blipFill>
         <p:spPr bwMode="auto">
           <a:xfrm>
-            <a:off x="38563796" y="36292332"/>
-            <a:ext cx="1905000" cy="2381250"/>
+            <a:off x="36148316" y="40847117"/>
+            <a:ext cx="2400300" cy="485775"/>
           </a:xfrm>
           <a:prstGeom prst="rect">
             <a:avLst/>
           </a:prstGeom>
           <a:noFill/>
-          <a:effectLst>
-            <a:outerShdw blurRad="50800" dist="38100" dir="2700000" algn="tl" rotWithShape="0">
-              <a:prstClr val="black">
-                <a:alpha val="40000"/>
-              </a:prstClr>
-            </a:outerShdw>
-          </a:effectLst>
           <a:extLst>
             <a:ext uri="{909E8E84-426E-40DD-AFC4-6F175D3DCCD1}">
               <a14:hiddenFill xmlns:a14="http://schemas.microsoft.com/office/drawing/2010/main">
@@ -13511,7 +13574,75 @@
   <p:timing>
     <p:tnLst>
       <p:par>
-        <p:cTn id="1" dur="indefinite" restart="never" nodeType="tmRoot"/>
+        <p:cTn id="1" dur="indefinite" restart="never" nodeType="tmRoot">
+          <p:childTnLst>
+            <p:seq concurrent="1" nextAc="seek">
+              <p:cTn id="2" dur="indefinite" nodeType="mainSeq">
+                <p:childTnLst>
+                  <p:par>
+                    <p:cTn id="3" fill="hold">
+                      <p:stCondLst>
+                        <p:cond delay="indefinite"/>
+                      </p:stCondLst>
+                      <p:childTnLst>
+                        <p:par>
+                          <p:cTn id="4" fill="hold">
+                            <p:stCondLst>
+                              <p:cond delay="0"/>
+                            </p:stCondLst>
+                            <p:childTnLst>
+                              <p:par>
+                                <p:cTn id="5" presetID="1" presetClass="entr" presetSubtype="0" fill="hold" nodeType="clickEffect">
+                                  <p:stCondLst>
+                                    <p:cond delay="0"/>
+                                  </p:stCondLst>
+                                  <p:childTnLst>
+                                    <p:set>
+                                      <p:cBhvr>
+                                        <p:cTn id="6" dur="1" fill="hold">
+                                          <p:stCondLst>
+                                            <p:cond delay="0"/>
+                                          </p:stCondLst>
+                                        </p:cTn>
+                                        <p:tgtEl>
+                                          <p:spTgt spid="69"/>
+                                        </p:tgtEl>
+                                        <p:attrNameLst>
+                                          <p:attrName>style.visibility</p:attrName>
+                                        </p:attrNameLst>
+                                      </p:cBhvr>
+                                      <p:to>
+                                        <p:strVal val="visible"/>
+                                      </p:to>
+                                    </p:set>
+                                  </p:childTnLst>
+                                </p:cTn>
+                              </p:par>
+                            </p:childTnLst>
+                          </p:cTn>
+                        </p:par>
+                      </p:childTnLst>
+                    </p:cTn>
+                  </p:par>
+                </p:childTnLst>
+              </p:cTn>
+              <p:prevCondLst>
+                <p:cond evt="onPrev" delay="0">
+                  <p:tgtEl>
+                    <p:sldTgt/>
+                  </p:tgtEl>
+                </p:cond>
+              </p:prevCondLst>
+              <p:nextCondLst>
+                <p:cond evt="onNext" delay="0">
+                  <p:tgtEl>
+                    <p:sldTgt/>
+                  </p:tgtEl>
+                </p:cond>
+              </p:nextCondLst>
+            </p:seq>
+          </p:childTnLst>
+        </p:cTn>
       </p:par>
     </p:tnLst>
   </p:timing>

</xml_diff>

<commit_message>
revised intro, analytic model and simulation model
</commit_message>
<xml_diff>
--- a/poster.pptx
+++ b/poster.pptx
@@ -5250,13 +5250,22 @@
               <a:defRPr/>
             </a:pPr>
             <a:r>
-              <a:rPr lang="en-US" sz="2800" kern="0" dirty="0">
+              <a:rPr lang="en-US" sz="2800" kern="0" dirty="0" smtClean="0">
                 <a:solidFill>
                   <a:srgbClr val="000000"/>
                 </a:solidFill>
                 <a:latin typeface="+mn-lt"/>
               </a:rPr>
-              <a:t>We used </a:t>
+              <a:t>Figure 5 describes our </a:t>
+            </a:r>
+            <a:r>
+              <a:rPr lang="en-US" sz="2800" b="1" kern="0" dirty="0" smtClean="0">
+                <a:solidFill>
+                  <a:srgbClr val="000000"/>
+                </a:solidFill>
+                <a:latin typeface="+mn-lt"/>
+              </a:rPr>
+              <a:t>multi-locus </a:t>
             </a:r>
             <a:r>
               <a:rPr lang="en-US" sz="2800" b="1" kern="0" dirty="0">
@@ -5265,25 +5274,61 @@
                 </a:solidFill>
                 <a:latin typeface="+mn-lt"/>
               </a:rPr>
-              <a:t>multi-locus Wright-Fisher simulations</a:t>
-            </a:r>
-            <a:r>
-              <a:rPr lang="en-US" sz="2800" kern="0" dirty="0">
+              <a:t>Wright-Fisher </a:t>
+            </a:r>
+            <a:r>
+              <a:rPr lang="en-US" sz="2800" b="1" kern="0" dirty="0" smtClean="0">
                 <a:solidFill>
                   <a:srgbClr val="000000"/>
                 </a:solidFill>
                 <a:latin typeface="+mn-lt"/>
               </a:rPr>
-              <a:t>. </a:t>
-            </a:r>
-            <a:r>
-              <a:rPr lang="en-GB" sz="2800" kern="0" dirty="0">
+              <a:t>simulations</a:t>
+            </a:r>
+            <a:r>
+              <a:rPr lang="en-US" sz="2800" kern="0" dirty="0" smtClean="0">
                 <a:solidFill>
                   <a:srgbClr val="000000"/>
                 </a:solidFill>
                 <a:latin typeface="+mn-lt"/>
               </a:rPr>
-              <a:t>Fig. 5 describes the model in a similar way to Fig. 4, only node labels specify both the alleles at the A/a and B/b loci </a:t>
+              <a:t>.</a:t>
+            </a:r>
+            <a:r>
+              <a:rPr lang="en-US" sz="2800" kern="0" dirty="0" smtClean="0">
+                <a:solidFill>
+                  <a:srgbClr val="000000"/>
+                </a:solidFill>
+                <a:latin typeface="+mn-lt"/>
+              </a:rPr>
+              <a:t> </a:t>
+            </a:r>
+            <a:r>
+              <a:rPr lang="en-US" sz="2800" kern="0" dirty="0" smtClean="0">
+                <a:solidFill>
+                  <a:srgbClr val="000000"/>
+                </a:solidFill>
+                <a:latin typeface="+mn-lt"/>
+              </a:rPr>
+              <a:t>The major difference from </a:t>
+            </a:r>
+            <a:r>
+              <a:rPr lang="en-GB" sz="2800" kern="0" dirty="0" smtClean="0">
+                <a:solidFill>
+                  <a:srgbClr val="000000"/>
+                </a:solidFill>
+                <a:latin typeface="+mn-lt"/>
+              </a:rPr>
+              <a:t>Figure 4 is that nodes also specify the  </a:t>
+            </a:r>
+            <a:r>
+              <a:rPr lang="en-GB" sz="2800" b="1" kern="0" dirty="0" smtClean="0">
+                <a:solidFill>
+                  <a:srgbClr val="000000"/>
+                </a:solidFill>
+                <a:latin typeface="+mn-lt"/>
+              </a:rPr>
+              <a:t>number </a:t>
             </a:r>
             <a:r>
               <a:rPr lang="en-GB" sz="2800" b="1" kern="0" dirty="0">
@@ -5292,16 +5337,25 @@
                 </a:solidFill>
                 <a:latin typeface="+mn-lt"/>
               </a:rPr>
-              <a:t>and the number of deleterious mutations</a:t>
-            </a:r>
-            <a:r>
-              <a:rPr lang="en-GB" sz="2800" kern="0" dirty="0">
+              <a:t>of deleterious </a:t>
+            </a:r>
+            <a:r>
+              <a:rPr lang="en-GB" sz="2800" b="1" kern="0" dirty="0" smtClean="0">
                 <a:solidFill>
                   <a:srgbClr val="000000"/>
                 </a:solidFill>
                 <a:latin typeface="+mn-lt"/>
               </a:rPr>
-              <a:t>, but only as much as 3 deleterious mutations are shown to keep the figure simple. </a:t>
+              <a:t>mutations after the forward slash</a:t>
+            </a:r>
+            <a:r>
+              <a:rPr lang="en-GB" sz="2800" kern="0" dirty="0" smtClean="0">
+                <a:solidFill>
+                  <a:srgbClr val="000000"/>
+                </a:solidFill>
+                <a:latin typeface="+mn-lt"/>
+              </a:rPr>
+              <a:t>. The figure shows as much as three mutations for simplicity; the simulations had as much as 25.</a:t>
             </a:r>
             <a:endParaRPr lang="en-US" sz="2800" kern="0" dirty="0">
               <a:solidFill>
@@ -6049,13 +6103,40 @@
               <a:t>In a </a:t>
             </a:r>
             <a:r>
+              <a:rPr lang="en-US" sz="2800" b="1" kern="0" dirty="0">
+                <a:solidFill>
+                  <a:srgbClr val="000000"/>
+                </a:solidFill>
+                <a:latin typeface="+mn-lt"/>
+              </a:rPr>
+              <a:t>single-peak fitness </a:t>
+            </a:r>
+            <a:r>
+              <a:rPr lang="en-US" sz="2800" b="1" kern="0" dirty="0" smtClean="0">
+                <a:solidFill>
+                  <a:srgbClr val="000000"/>
+                </a:solidFill>
+                <a:latin typeface="+mn-lt"/>
+              </a:rPr>
+              <a:t>landscape </a:t>
+            </a:r>
+            <a:r>
+              <a:rPr lang="en-US" sz="2800" kern="0" dirty="0" smtClean="0">
+                <a:solidFill>
+                  <a:srgbClr val="000000"/>
+                </a:solidFill>
+                <a:latin typeface="+mn-lt"/>
+              </a:rPr>
+              <a:t>selection </a:t>
+            </a:r>
+            <a:r>
               <a:rPr lang="en-US" sz="2800" kern="0" dirty="0">
                 <a:solidFill>
                   <a:srgbClr val="000000"/>
                 </a:solidFill>
                 <a:latin typeface="+mn-lt"/>
               </a:rPr>
-              <a:t>single-peak fitness </a:t>
+              <a:t>drives the population uphill towards the global maximum (</a:t>
             </a:r>
             <a:r>
               <a:rPr lang="en-US" sz="2800" kern="0" dirty="0" smtClean="0">
@@ -6064,7 +6145,7 @@
                 </a:solidFill>
                 <a:latin typeface="+mn-lt"/>
               </a:rPr>
-              <a:t>landscape selection </a:t>
+              <a:t>Figure </a:t>
             </a:r>
             <a:r>
               <a:rPr lang="en-US" sz="2800" kern="0" dirty="0">
@@ -6073,7 +6154,7 @@
                 </a:solidFill>
                 <a:latin typeface="+mn-lt"/>
               </a:rPr>
-              <a:t>drives the population uphill towards the global maximum (Fig. 1). In </a:t>
+              <a:t>1). In </a:t>
             </a:r>
             <a:r>
               <a:rPr lang="en-US" sz="2800" kern="0" dirty="0" smtClean="0">
@@ -6085,13 +6166,58 @@
               <a:t>a </a:t>
             </a:r>
             <a:r>
+              <a:rPr lang="en-US" sz="2800" b="1" kern="0" dirty="0">
+                <a:solidFill>
+                  <a:srgbClr val="000000"/>
+                </a:solidFill>
+                <a:latin typeface="+mn-lt"/>
+              </a:rPr>
+              <a:t>multi-peak rugged fitness </a:t>
+            </a:r>
+            <a:r>
+              <a:rPr lang="en-US" sz="2800" b="1" kern="0" dirty="0" smtClean="0">
+                <a:solidFill>
+                  <a:srgbClr val="000000"/>
+                </a:solidFill>
+                <a:latin typeface="+mn-lt"/>
+              </a:rPr>
+              <a:t>landscape</a:t>
+            </a:r>
+            <a:r>
+              <a:rPr lang="en-US" sz="2800" kern="0" dirty="0" smtClean="0">
+                <a:solidFill>
+                  <a:srgbClr val="000000"/>
+                </a:solidFill>
+                <a:latin typeface="+mn-lt"/>
+              </a:rPr>
+              <a:t> selection </a:t>
+            </a:r>
+            <a:r>
               <a:rPr lang="en-US" sz="2800" kern="0" dirty="0">
                 <a:solidFill>
                   <a:srgbClr val="000000"/>
                 </a:solidFill>
                 <a:latin typeface="+mn-lt"/>
               </a:rPr>
-              <a:t>multi-peak rugged fitness </a:t>
+              <a:t>drives the population uphill towards the closest peak, </a:t>
+            </a:r>
+            <a:r>
+              <a:rPr lang="en-US" sz="2800" b="1" kern="0" dirty="0">
+                <a:solidFill>
+                  <a:schemeClr val="tx2"/>
+                </a:solidFill>
+                <a:latin typeface="+mn-lt"/>
+              </a:rPr>
+              <a:t>preventing it from shifting to the higher peak </a:t>
+            </a:r>
+            <a:r>
+              <a:rPr lang="en-US" sz="2800" kern="0" dirty="0">
+                <a:solidFill>
+                  <a:srgbClr val="000000"/>
+                </a:solidFill>
+                <a:latin typeface="+mn-lt"/>
+              </a:rPr>
+              <a:t>(</a:t>
             </a:r>
             <a:r>
               <a:rPr lang="en-US" sz="2800" kern="0" dirty="0" smtClean="0">
@@ -6100,7 +6226,7 @@
                 </a:solidFill>
                 <a:latin typeface="+mn-lt"/>
               </a:rPr>
-              <a:t>landscape selection </a:t>
+              <a:t>Figure </a:t>
             </a:r>
             <a:r>
               <a:rPr lang="en-US" sz="2800" kern="0" dirty="0">
@@ -6109,7 +6235,46 @@
                 </a:solidFill>
                 <a:latin typeface="+mn-lt"/>
               </a:rPr>
-              <a:t>drives the population uphill towards the closest peak, </a:t>
+              <a:t>2).</a:t>
+            </a:r>
+          </a:p>
+          <a:p>
+            <a:pPr indent="205704" algn="l" defTabSz="908920" rtl="0">
+              <a:defRPr/>
+            </a:pPr>
+            <a:endParaRPr lang="en-US" b="1" kern="0" dirty="0" smtClean="0">
+              <a:solidFill>
+                <a:schemeClr val="accent2"/>
+              </a:solidFill>
+              <a:latin typeface="+mj-lt"/>
+            </a:endParaRPr>
+          </a:p>
+          <a:p>
+            <a:pPr indent="205704" algn="l" defTabSz="908920" rtl="0">
+              <a:defRPr/>
+            </a:pPr>
+            <a:r>
+              <a:rPr lang="en-US" b="1" kern="0" dirty="0" smtClean="0">
+                <a:solidFill>
+                  <a:schemeClr val="accent2"/>
+                </a:solidFill>
+                <a:latin typeface="+mj-lt"/>
+              </a:rPr>
+              <a:t>Stress-Induced Mutagenesis</a:t>
+            </a:r>
+          </a:p>
+          <a:p>
+            <a:pPr indent="205704" algn="l" defTabSz="908920" rtl="0">
+              <a:defRPr/>
+            </a:pPr>
+            <a:r>
+              <a:rPr lang="en-US" sz="2800" b="1" kern="0" dirty="0" smtClean="0">
+                <a:solidFill>
+                  <a:schemeClr val="tx2"/>
+                </a:solidFill>
+                <a:latin typeface="+mn-lt"/>
+              </a:rPr>
+              <a:t>Mutagenesis is </a:t>
             </a:r>
             <a:r>
               <a:rPr lang="en-US" sz="2800" b="1" kern="0" dirty="0">
@@ -6118,7 +6283,7 @@
                 </a:solidFill>
                 <a:latin typeface="+mn-lt"/>
               </a:rPr>
-              <a:t>preventing it from shifting to the higher peak </a:t>
+              <a:t>induced by stress responses in various species </a:t>
             </a:r>
             <a:r>
               <a:rPr lang="en-US" sz="2800" kern="0" dirty="0">
@@ -6127,38 +6292,64 @@
                 </a:solidFill>
                 <a:latin typeface="+mn-lt"/>
               </a:rPr>
-              <a:t>(Fig. 2).</a:t>
-            </a:r>
+              <a:t>of bacteria (</a:t>
+            </a:r>
+            <a:r>
+              <a:rPr lang="en-US" sz="2800" kern="0" dirty="0" smtClean="0">
+                <a:solidFill>
+                  <a:srgbClr val="000000"/>
+                </a:solidFill>
+                <a:latin typeface="+mn-lt"/>
+              </a:rPr>
+              <a:t>2-4).</a:t>
+            </a:r>
+            <a:endParaRPr lang="en-US" sz="2800" kern="0" dirty="0" smtClean="0">
+              <a:solidFill>
+                <a:srgbClr val="000000"/>
+              </a:solidFill>
+              <a:latin typeface="+mn-lt"/>
+            </a:endParaRPr>
           </a:p>
           <a:p>
             <a:pPr indent="205704" algn="l" defTabSz="908920" rtl="0">
               <a:defRPr/>
             </a:pPr>
-            <a:endParaRPr lang="en-US" b="1" kern="0" dirty="0" smtClean="0">
-              <a:solidFill>
-                <a:schemeClr val="accent2"/>
-              </a:solidFill>
-              <a:latin typeface="+mj-lt"/>
-            </a:endParaRPr>
-          </a:p>
-          <a:p>
-            <a:pPr indent="205704" algn="l" defTabSz="908920" rtl="0">
-              <a:defRPr/>
-            </a:pPr>
-            <a:r>
-              <a:rPr lang="en-US" b="1" kern="0" dirty="0" smtClean="0">
-                <a:solidFill>
-                  <a:schemeClr val="accent2"/>
-                </a:solidFill>
-                <a:latin typeface="+mj-lt"/>
-              </a:rPr>
-              <a:t>Stress-Induced Mutagenesis</a:t>
-            </a:r>
-          </a:p>
-          <a:p>
-            <a:pPr indent="205704" algn="l" defTabSz="908920" rtl="0">
-              <a:defRPr/>
-            </a:pPr>
+            <a:r>
+              <a:rPr lang="en-US" sz="2800" kern="0" dirty="0" smtClean="0">
+                <a:solidFill>
+                  <a:srgbClr val="000000"/>
+                </a:solidFill>
+                <a:latin typeface="+mn-lt"/>
+              </a:rPr>
+              <a:t>In a previous work </a:t>
+            </a:r>
+            <a:r>
+              <a:rPr lang="en-US" sz="2800" kern="0" dirty="0" smtClean="0">
+                <a:solidFill>
+                  <a:srgbClr val="000000"/>
+                </a:solidFill>
+                <a:latin typeface="+mn-lt"/>
+              </a:rPr>
+              <a:t>(5) </a:t>
+            </a:r>
+            <a:r>
+              <a:rPr lang="en-US" sz="2800" kern="0" dirty="0" smtClean="0">
+                <a:solidFill>
+                  <a:srgbClr val="000000"/>
+                </a:solidFill>
+                <a:latin typeface="+mn-lt"/>
+              </a:rPr>
+              <a:t>we studied the evolution of stress-induced mutagenesis in constant and changing environments. We showed that</a:t>
+            </a:r>
+            <a:r>
+              <a:rPr lang="en-US" sz="2800" b="1" kern="0" dirty="0" smtClean="0">
+                <a:solidFill>
+                  <a:schemeClr val="accent1"/>
+                </a:solidFill>
+                <a:latin typeface="+mn-lt"/>
+              </a:rPr>
+              <a:t> </a:t>
+            </a:r>
             <a:r>
               <a:rPr lang="en-US" sz="2800" b="1" kern="0" dirty="0">
                 <a:solidFill>
@@ -6166,16 +6357,16 @@
                 </a:solidFill>
                 <a:latin typeface="+mn-lt"/>
               </a:rPr>
-              <a:t>The mutation rate is induced by stress responses in various species </a:t>
-            </a:r>
-            <a:r>
-              <a:rPr lang="en-US" sz="2800" kern="0" dirty="0">
+              <a:t>stress-induced mutagenesis is favored by selection </a:t>
+            </a:r>
+            <a:r>
+              <a:rPr lang="en-US" sz="2800" kern="0" dirty="0" smtClean="0">
                 <a:solidFill>
                   <a:srgbClr val="000000"/>
                 </a:solidFill>
                 <a:latin typeface="+mn-lt"/>
               </a:rPr>
-              <a:t>of bacteria (</a:t>
+              <a:t>over constant rate mutagenesis  because </a:t>
             </a:r>
             <a:r>
               <a:rPr lang="en-US" sz="2800" kern="0" dirty="0" smtClean="0">
@@ -6184,19 +6375,26 @@
                 </a:solidFill>
                 <a:latin typeface="+mn-lt"/>
               </a:rPr>
-              <a:t>2-4).</a:t>
-            </a:r>
-            <a:endParaRPr lang="en-US" sz="2800" kern="0" dirty="0" smtClean="0">
-              <a:solidFill>
-                <a:srgbClr val="000000"/>
-              </a:solidFill>
-              <a:latin typeface="+mn-lt"/>
-            </a:endParaRPr>
-          </a:p>
-          <a:p>
-            <a:pPr indent="205704" algn="l" defTabSz="908920" rtl="0">
-              <a:defRPr/>
-            </a:pPr>
+              <a:t>it generates beneficial </a:t>
+            </a:r>
+            <a:r>
+              <a:rPr lang="en-US" sz="2800" kern="0" smtClean="0">
+                <a:solidFill>
+                  <a:srgbClr val="000000"/>
+                </a:solidFill>
+                <a:latin typeface="+mn-lt"/>
+              </a:rPr>
+              <a:t>mutations </a:t>
+            </a:r>
+            <a:r>
+              <a:rPr lang="en-US" sz="2800" kern="0" smtClean="0">
+                <a:solidFill>
+                  <a:srgbClr val="000000"/>
+                </a:solidFill>
+                <a:latin typeface="+mn-lt"/>
+              </a:rPr>
+              <a:t>when </a:t>
+            </a:r>
             <a:r>
               <a:rPr lang="en-US" sz="2800" kern="0" dirty="0" smtClean="0">
                 <a:solidFill>
@@ -6204,52 +6402,7 @@
                 </a:solidFill>
                 <a:latin typeface="+mn-lt"/>
               </a:rPr>
-              <a:t>In a previous work </a:t>
-            </a:r>
-            <a:r>
-              <a:rPr lang="en-US" sz="2800" kern="0" dirty="0" smtClean="0">
-                <a:solidFill>
-                  <a:srgbClr val="000000"/>
-                </a:solidFill>
-                <a:latin typeface="+mn-lt"/>
-              </a:rPr>
-              <a:t>(5) </a:t>
-            </a:r>
-            <a:r>
-              <a:rPr lang="en-US" sz="2800" kern="0" dirty="0" smtClean="0">
-                <a:solidFill>
-                  <a:srgbClr val="000000"/>
-                </a:solidFill>
-                <a:latin typeface="+mn-lt"/>
-              </a:rPr>
-              <a:t>we studied the evolution of stress-induced mutagenesis in constant and changing environments. We showed that</a:t>
-            </a:r>
-            <a:r>
-              <a:rPr lang="en-US" sz="2800" b="1" kern="0" dirty="0" smtClean="0">
-                <a:solidFill>
-                  <a:schemeClr val="accent1"/>
-                </a:solidFill>
-                <a:latin typeface="+mn-lt"/>
-              </a:rPr>
-              <a:t> </a:t>
-            </a:r>
-            <a:r>
-              <a:rPr lang="en-US" sz="2800" b="1" kern="0" dirty="0">
-                <a:solidFill>
-                  <a:schemeClr val="tx2"/>
-                </a:solidFill>
-                <a:latin typeface="+mn-lt"/>
-              </a:rPr>
-              <a:t>stress-induced mutagenesis is favored by selection </a:t>
-            </a:r>
-            <a:r>
-              <a:rPr lang="en-US" sz="2800" kern="0" dirty="0" smtClean="0">
-                <a:solidFill>
-                  <a:srgbClr val="000000"/>
-                </a:solidFill>
-                <a:latin typeface="+mn-lt"/>
-              </a:rPr>
-              <a:t>over constant rate mutagenesis  because of the beneficial mutations it generates when they are most needed.</a:t>
+              <a:t>they are most needed.</a:t>
             </a:r>
           </a:p>
           <a:p>
@@ -7006,7 +7159,16 @@
                 </a:solidFill>
                 <a:latin typeface="+mn-lt"/>
               </a:rPr>
-              <a:t>. The genotype </a:t>
+              <a:t>. </a:t>
+            </a:r>
+            <a:r>
+              <a:rPr lang="en-GB" sz="2800" kern="0" dirty="0" smtClean="0">
+                <a:solidFill>
+                  <a:srgbClr val="000000"/>
+                </a:solidFill>
+                <a:latin typeface="+mn-lt"/>
+              </a:rPr>
+              <a:t>Genotype </a:t>
             </a:r>
             <a:r>
               <a:rPr lang="en-GB" sz="2800" i="1" kern="0" dirty="0" err="1" smtClean="0">
@@ -7051,8 +7213,23 @@
                 </a:solidFill>
                 <a:latin typeface="+mn-lt"/>
               </a:rPr>
-              <a:t>is the higher peak (see Fig. 3).</a:t>
-            </a:r>
+              <a:t>is the higher </a:t>
+            </a:r>
+            <a:r>
+              <a:rPr lang="en-GB" sz="2800" kern="0" dirty="0" smtClean="0">
+                <a:solidFill>
+                  <a:srgbClr val="000000"/>
+                </a:solidFill>
+                <a:latin typeface="+mn-lt"/>
+              </a:rPr>
+              <a:t>peak.</a:t>
+            </a:r>
+            <a:endParaRPr lang="en-GB" sz="2800" kern="0" dirty="0">
+              <a:solidFill>
+                <a:srgbClr val="000000"/>
+              </a:solidFill>
+              <a:latin typeface="+mn-lt"/>
+            </a:endParaRPr>
           </a:p>
           <a:p>
             <a:pPr algn="l" rtl="0"/>
@@ -7066,21 +7243,57 @@
           <a:p>
             <a:pPr algn="l" rtl="0"/>
             <a:r>
+              <a:rPr lang="en-GB" sz="2800" kern="0" dirty="0" smtClean="0">
+                <a:solidFill>
+                  <a:srgbClr val="000000"/>
+                </a:solidFill>
+                <a:latin typeface="+mn-lt"/>
+              </a:rPr>
+              <a:t>Figure </a:t>
+            </a:r>
+            <a:r>
               <a:rPr lang="en-GB" sz="2800" kern="0" dirty="0">
                 <a:solidFill>
                   <a:srgbClr val="000000"/>
                 </a:solidFill>
                 <a:latin typeface="+mn-lt"/>
               </a:rPr>
-              <a:t>Fig. 4 shows described the model. </a:t>
-            </a:r>
-            <a:r>
-              <a:rPr lang="en-GB" sz="2800" b="1" kern="0" dirty="0">
+              <a:t>4 </a:t>
+            </a:r>
+            <a:r>
+              <a:rPr lang="en-GB" sz="2800" kern="0" dirty="0" smtClean="0">
                 <a:solidFill>
                   <a:srgbClr val="000000"/>
                 </a:solidFill>
                 <a:latin typeface="+mn-lt"/>
               </a:rPr>
+              <a:t>described </a:t>
+            </a:r>
+            <a:r>
+              <a:rPr lang="en-GB" sz="2800" kern="0" dirty="0">
+                <a:solidFill>
+                  <a:srgbClr val="000000"/>
+                </a:solidFill>
+                <a:latin typeface="+mn-lt"/>
+              </a:rPr>
+              <a:t>the model. </a:t>
+            </a:r>
+            <a:endParaRPr lang="en-GB" sz="2800" kern="0" dirty="0" smtClean="0">
+              <a:solidFill>
+                <a:srgbClr val="000000"/>
+              </a:solidFill>
+              <a:latin typeface="+mn-lt"/>
+            </a:endParaRPr>
+          </a:p>
+          <a:p>
+            <a:pPr algn="l" rtl="0"/>
+            <a:r>
+              <a:rPr lang="en-GB" sz="2800" b="1" kern="0" dirty="0" smtClean="0">
+                <a:solidFill>
+                  <a:srgbClr val="000000"/>
+                </a:solidFill>
+                <a:latin typeface="+mn-lt"/>
+              </a:rPr>
               <a:t>E</a:t>
             </a:r>
             <a:r>
@@ -7090,7 +7303,34 @@
                 </a:solidFill>
                 <a:latin typeface="+mn-lt"/>
               </a:rPr>
-              <a:t>ach node represent a specific genotype</a:t>
+              <a:t>ach node </a:t>
+            </a:r>
+            <a:r>
+              <a:rPr lang="en-US" sz="2800" b="1" kern="0" dirty="0" smtClean="0">
+                <a:solidFill>
+                  <a:srgbClr val="000000"/>
+                </a:solidFill>
+                <a:latin typeface="+mn-lt"/>
+              </a:rPr>
+              <a:t>represents </a:t>
+            </a:r>
+            <a:r>
+              <a:rPr lang="en-US" sz="2800" b="1" kern="0" dirty="0">
+                <a:solidFill>
+                  <a:srgbClr val="000000"/>
+                </a:solidFill>
+                <a:latin typeface="+mn-lt"/>
+              </a:rPr>
+              <a:t>a </a:t>
+            </a:r>
+            <a:r>
+              <a:rPr lang="en-US" sz="2800" b="1" kern="0" dirty="0" smtClean="0">
+                <a:solidFill>
+                  <a:srgbClr val="000000"/>
+                </a:solidFill>
+                <a:latin typeface="+mn-lt"/>
+              </a:rPr>
+              <a:t>genotype</a:t>
             </a:r>
             <a:r>
               <a:rPr lang="en-US" sz="2800" kern="0" dirty="0">
@@ -7099,16 +7339,43 @@
                 </a:solidFill>
                 <a:latin typeface="+mn-lt"/>
               </a:rPr>
-              <a:t>. Node labels specify the alleles at the </a:t>
-            </a:r>
-            <a:r>
-              <a:rPr lang="en-US" sz="2800" i="1" kern="0" dirty="0">
+              <a:t>. </a:t>
+            </a:r>
+            <a:r>
+              <a:rPr lang="en-US" sz="2800" kern="0" dirty="0" smtClean="0">
                 <a:solidFill>
                   <a:srgbClr val="000000"/>
                 </a:solidFill>
                 <a:latin typeface="+mn-lt"/>
               </a:rPr>
-              <a:t>A/a </a:t>
+              <a:t>The </a:t>
+            </a:r>
+            <a:r>
+              <a:rPr lang="en-US" sz="2800" b="1" kern="0" dirty="0">
+                <a:solidFill>
+                  <a:srgbClr val="000000"/>
+                </a:solidFill>
+                <a:latin typeface="+mn-lt"/>
+              </a:rPr>
+              <a:t>“</a:t>
+            </a:r>
+            <a:r>
+              <a:rPr lang="en-US" sz="2800" b="1" i="1" kern="0" dirty="0">
+                <a:solidFill>
+                  <a:srgbClr val="000000"/>
+                </a:solidFill>
+                <a:latin typeface="+mn-lt"/>
+              </a:rPr>
+              <a:t>RIP</a:t>
+            </a:r>
+            <a:r>
+              <a:rPr lang="en-US" sz="2800" b="1" kern="0" dirty="0">
+                <a:solidFill>
+                  <a:srgbClr val="000000"/>
+                </a:solidFill>
+                <a:latin typeface="+mn-lt"/>
+              </a:rPr>
+              <a:t>” </a:t>
             </a:r>
             <a:r>
               <a:rPr lang="en-US" sz="2800" kern="0" dirty="0">
@@ -7117,16 +7384,34 @@
                 </a:solidFill>
                 <a:latin typeface="+mn-lt"/>
               </a:rPr>
-              <a:t>and </a:t>
-            </a:r>
-            <a:r>
-              <a:rPr lang="en-US" sz="2800" i="1" kern="0" dirty="0">
+              <a:t>node represents genotypes with deleterious mutations that will not contribute to adaptation. </a:t>
+            </a:r>
+            <a:endParaRPr lang="en-US" sz="2800" kern="0" dirty="0" smtClean="0">
+              <a:solidFill>
+                <a:srgbClr val="000000"/>
+              </a:solidFill>
+              <a:latin typeface="+mn-lt"/>
+            </a:endParaRPr>
+          </a:p>
+          <a:p>
+            <a:pPr algn="l" rtl="0"/>
+            <a:endParaRPr lang="en-US" sz="2800" kern="0" dirty="0" smtClean="0">
+              <a:solidFill>
+                <a:srgbClr val="000000"/>
+              </a:solidFill>
+              <a:latin typeface="+mn-lt"/>
+            </a:endParaRPr>
+          </a:p>
+          <a:p>
+            <a:pPr algn="l" rtl="0"/>
+            <a:r>
+              <a:rPr lang="en-US" sz="2800" kern="0" dirty="0" smtClean="0">
                 <a:solidFill>
                   <a:srgbClr val="000000"/>
                 </a:solidFill>
                 <a:latin typeface="+mn-lt"/>
               </a:rPr>
-              <a:t>B/b </a:t>
+              <a:t>Arrows </a:t>
             </a:r>
             <a:r>
               <a:rPr lang="en-US" sz="2800" kern="0" dirty="0">
@@ -7135,16 +7420,16 @@
                 </a:solidFill>
                 <a:latin typeface="+mn-lt"/>
               </a:rPr>
-              <a:t>loci. The “</a:t>
-            </a:r>
-            <a:r>
-              <a:rPr lang="en-US" sz="2800" i="1" kern="0" dirty="0">
+              <a:t>define the </a:t>
+            </a:r>
+            <a:r>
+              <a:rPr lang="en-US" sz="2800" kern="0" dirty="0" smtClean="0">
                 <a:solidFill>
                   <a:srgbClr val="000000"/>
                 </a:solidFill>
                 <a:latin typeface="+mn-lt"/>
               </a:rPr>
-              <a:t>RIP</a:t>
+              <a:t>direction </a:t>
             </a:r>
             <a:r>
               <a:rPr lang="en-US" sz="2800" kern="0" dirty="0">
@@ -7153,7 +7438,7 @@
                 </a:solidFill>
                 <a:latin typeface="+mn-lt"/>
               </a:rPr>
-              <a:t>” node represents genotypes with deleterious mutations that will not contribute to adaptation. Arrows define the </a:t>
+              <a:t>of mutation and </a:t>
             </a:r>
             <a:r>
               <a:rPr lang="en-US" sz="2800" kern="0" dirty="0" smtClean="0">
@@ -7162,7 +7447,7 @@
                 </a:solidFill>
                 <a:latin typeface="+mn-lt"/>
               </a:rPr>
-              <a:t>direction </a:t>
+              <a:t>denote </a:t>
             </a:r>
             <a:r>
               <a:rPr lang="en-US" sz="2800" kern="0" dirty="0">
@@ -7171,7 +7456,7 @@
                 </a:solidFill>
                 <a:latin typeface="+mn-lt"/>
               </a:rPr>
-              <a:t>of mutation and their labels denote the relevant mutation </a:t>
+              <a:t>the relevant mutation </a:t>
             </a:r>
             <a:r>
               <a:rPr lang="en-US" sz="2800" kern="0" dirty="0" smtClean="0">
@@ -7192,22 +7477,40 @@
               <a:t>U </a:t>
             </a:r>
             <a:r>
+              <a:rPr lang="en-US" sz="2800" b="1" kern="0" dirty="0" smtClean="0">
+                <a:solidFill>
+                  <a:srgbClr val="000000"/>
+                </a:solidFill>
+                <a:latin typeface="+mn-lt"/>
+              </a:rPr>
+              <a:t>(dashed lines) for </a:t>
+            </a:r>
+            <a:r>
               <a:rPr lang="en-US" sz="2800" b="1" kern="0" dirty="0">
                 <a:solidFill>
                   <a:srgbClr val="000000"/>
                 </a:solidFill>
                 <a:latin typeface="+mn-lt"/>
               </a:rPr>
-              <a:t>for deleterious mutation and </a:t>
-            </a:r>
-            <a:r>
-              <a:rPr lang="en-US" sz="2800" b="1" i="1" kern="0" dirty="0">
+              <a:t>deleterious mutation and </a:t>
+            </a:r>
+            <a:r>
+              <a:rPr lang="en-US" sz="2800" b="1" i="1" kern="0" dirty="0" smtClean="0">
                 <a:solidFill>
                   <a:srgbClr val="000000"/>
                 </a:solidFill>
                 <a:latin typeface="+mn-lt"/>
               </a:rPr>
-              <a:t>µ</a:t>
+              <a:t>µ </a:t>
+            </a:r>
+            <a:r>
+              <a:rPr lang="en-US" sz="2800" b="1" kern="0" dirty="0" smtClean="0">
+                <a:solidFill>
+                  <a:srgbClr val="000000"/>
+                </a:solidFill>
+                <a:latin typeface="+mn-lt"/>
+              </a:rPr>
+              <a:t>(solid lines) </a:t>
             </a:r>
             <a:r>
               <a:rPr lang="en-US" sz="2800" b="1" kern="0" dirty="0">
@@ -7216,7 +7519,64 @@
                 </a:solidFill>
                 <a:latin typeface="+mn-lt"/>
               </a:rPr>
-              <a:t> for beneficial mutation</a:t>
+              <a:t>for beneficial </a:t>
+            </a:r>
+            <a:r>
+              <a:rPr lang="en-US" sz="2800" b="1" kern="0" dirty="0" smtClean="0">
+                <a:solidFill>
+                  <a:srgbClr val="000000"/>
+                </a:solidFill>
+                <a:latin typeface="+mn-lt"/>
+              </a:rPr>
+              <a:t>mutations</a:t>
+            </a:r>
+            <a:r>
+              <a:rPr lang="en-US" sz="2800" kern="0" dirty="0" smtClean="0">
+                <a:solidFill>
+                  <a:srgbClr val="000000"/>
+                </a:solidFill>
+                <a:latin typeface="+mn-lt"/>
+              </a:rPr>
+              <a:t>. </a:t>
+            </a:r>
+          </a:p>
+          <a:p>
+            <a:pPr algn="l" rtl="0"/>
+            <a:endParaRPr lang="en-US" sz="2800" kern="0" dirty="0">
+              <a:solidFill>
+                <a:srgbClr val="000000"/>
+              </a:solidFill>
+              <a:latin typeface="+mn-lt"/>
+            </a:endParaRPr>
+          </a:p>
+          <a:p>
+            <a:pPr algn="l" rtl="0"/>
+            <a:r>
+              <a:rPr lang="en-US" sz="2800" kern="0" dirty="0" smtClean="0">
+                <a:solidFill>
+                  <a:srgbClr val="000000"/>
+                </a:solidFill>
+                <a:latin typeface="+mn-lt"/>
+              </a:rPr>
+              <a:t>Node </a:t>
+            </a:r>
+            <a:r>
+              <a:rPr lang="en-US" sz="2800" b="1" kern="0" dirty="0" smtClean="0">
+                <a:solidFill>
+                  <a:srgbClr val="000000"/>
+                </a:solidFill>
+                <a:latin typeface="+mn-lt"/>
+              </a:rPr>
+              <a:t>color </a:t>
+            </a:r>
+            <a:r>
+              <a:rPr lang="en-US" sz="2800" b="1" kern="0" dirty="0">
+                <a:solidFill>
+                  <a:srgbClr val="000000"/>
+                </a:solidFill>
+                <a:latin typeface="+mn-lt"/>
+              </a:rPr>
+              <a:t>indicates the fitness</a:t>
             </a:r>
             <a:r>
               <a:rPr lang="en-US" sz="2800" kern="0" dirty="0">
@@ -7225,25 +7585,34 @@
                 </a:solidFill>
                 <a:latin typeface="+mn-lt"/>
               </a:rPr>
-              <a:t>. Node </a:t>
-            </a:r>
-            <a:r>
-              <a:rPr lang="en-US" sz="2800" b="1" kern="0" dirty="0" err="1">
+              <a:t> of a genotype, from pale brown for </a:t>
+            </a:r>
+            <a:r>
+              <a:rPr lang="en-US" sz="2800" kern="0" dirty="0" smtClean="0">
                 <a:solidFill>
                   <a:srgbClr val="000000"/>
                 </a:solidFill>
                 <a:latin typeface="+mn-lt"/>
               </a:rPr>
-              <a:t>colour</a:t>
-            </a:r>
-            <a:r>
-              <a:rPr lang="en-US" sz="2800" b="1" kern="0" dirty="0">
+              <a:t>high fitness </a:t>
+            </a:r>
+            <a:r>
+              <a:rPr lang="en-US" sz="2800" kern="0" dirty="0">
                 <a:solidFill>
                   <a:srgbClr val="000000"/>
                 </a:solidFill>
                 <a:latin typeface="+mn-lt"/>
               </a:rPr>
-              <a:t> indicates the fitness</a:t>
+              <a:t>to dark brown for </a:t>
+            </a:r>
+            <a:r>
+              <a:rPr lang="en-US" sz="2800" kern="0" dirty="0" smtClean="0">
+                <a:solidFill>
+                  <a:srgbClr val="000000"/>
+                </a:solidFill>
+                <a:latin typeface="+mn-lt"/>
+              </a:rPr>
+              <a:t>low </a:t>
             </a:r>
             <a:r>
               <a:rPr lang="en-US" sz="2800" kern="0" dirty="0">
@@ -7252,7 +7621,7 @@
                 </a:solidFill>
                 <a:latin typeface="+mn-lt"/>
               </a:rPr>
-              <a:t> of a genotype, from pale brown for optimal fitness to dark brown for lower fitness.</a:t>
+              <a:t>fitness.</a:t>
             </a:r>
             <a:endParaRPr lang="en-US" sz="2000" b="1" kern="0" dirty="0">
               <a:solidFill>
@@ -11331,10 +11700,10 @@
         </p:nvGrpSpPr>
         <p:grpSpPr>
           <a:xfrm>
-            <a:off x="5906379" y="18794388"/>
-            <a:ext cx="4863401" cy="646331"/>
-            <a:chOff x="5832976" y="24915068"/>
-            <a:chExt cx="4863401" cy="646331"/>
+            <a:off x="5906379" y="18794389"/>
+            <a:ext cx="4863401" cy="720079"/>
+            <a:chOff x="5832976" y="24915069"/>
+            <a:chExt cx="4863401" cy="720079"/>
           </a:xfrm>
         </p:grpSpPr>
         <p:cxnSp>
@@ -11379,7 +11748,7 @@
           </p:nvSpPr>
           <p:spPr>
             <a:xfrm>
-              <a:off x="6532919" y="24915068"/>
+              <a:off x="6532919" y="24988817"/>
               <a:ext cx="3269978" cy="646331"/>
             </a:xfrm>
             <a:prstGeom prst="rect">
@@ -11900,7 +12269,7 @@
                     <a:p>
                       <a:pPr algn="ctr" rtl="0"/>
                       <a:r>
-                        <a:rPr lang="en-US" sz="2800" smtClean="0">
+                        <a:rPr lang="en-US" sz="2800" dirty="0" smtClean="0">
                           <a:latin typeface="+mn-lt"/>
                           <a:cs typeface="Helvetica" pitchFamily="34" charset="0"/>
                         </a:rPr>
@@ -12820,7 +13189,7 @@
         </p:nvSpPr>
         <p:spPr>
           <a:xfrm>
-            <a:off x="8418245" y="28836599"/>
+            <a:off x="8497244" y="28836599"/>
             <a:ext cx="1519159" cy="830997"/>
           </a:xfrm>
           <a:prstGeom prst="rect">

</xml_diff>

<commit_message>
revising simulation results... not done yet
</commit_message>
<xml_diff>
--- a/poster.pptx
+++ b/poster.pptx
@@ -3491,6 +3491,12 @@
               </a:rPr>
               <a:t>Results</a:t>
             </a:r>
+            <a:endParaRPr lang="en-US" sz="4400" b="1" kern="0" dirty="0" smtClean="0">
+              <a:solidFill>
+                <a:schemeClr val="accent2"/>
+              </a:solidFill>
+              <a:latin typeface="+mj-lt"/>
+            </a:endParaRPr>
           </a:p>
           <a:p>
             <a:pPr indent="205704" algn="just" defTabSz="908920" rtl="0" eaLnBrk="1" hangingPunct="1">
@@ -9334,28 +9340,28 @@
                     </a:solidFill>
                     <a:latin typeface="+mj-lt"/>
                   </a:rPr>
-                  <a:t>The population </a:t>
+                  <a:t>The </a:t>
                 </a:r>
                 <a:r>
-                  <a:rPr lang="en-US" b="1" kern="0" dirty="0">
+                  <a:rPr lang="en-US" b="1" kern="0" dirty="0" smtClean="0">
                     <a:solidFill>
                       <a:schemeClr val="accent2"/>
                     </a:solidFill>
                     <a:latin typeface="+mj-lt"/>
                   </a:rPr>
-                  <a:t>adaptation rate </a:t>
+                  <a:t>adaptation time </a:t>
                 </a:r>
                 <a:r>
-                  <a:rPr lang="el-GR" b="1" i="1" kern="0" dirty="0">
+                  <a:rPr lang="en-US" b="1" i="1" kern="0" dirty="0" smtClean="0">
                     <a:solidFill>
                       <a:schemeClr val="accent2"/>
                     </a:solidFill>
                     <a:latin typeface="+mj-lt"/>
                   </a:rPr>
-                  <a:t>ν</a:t>
+                  <a:t>T</a:t>
                 </a:r>
                 <a:r>
-                  <a:rPr lang="en-US" b="1" kern="0" dirty="0">
+                  <a:rPr lang="en-US" b="1" kern="0" dirty="0" smtClean="0">
                     <a:solidFill>
                       <a:schemeClr val="accent2"/>
                     </a:solidFill>
@@ -9444,7 +9450,7 @@
                           </a:solidFill>
                           <a:latin typeface="Cambria Math"/>
                         </a:rPr>
-                        <m:t>𝜈</m:t>
+                        <m:t>𝑇</m:t>
                       </m:r>
                       <m:r>
                         <a:rPr lang="en-US" sz="2800" b="0" i="1" kern="0" smtClean="0">
@@ -9454,6 +9460,24 @@
                           <a:latin typeface="Cambria Math"/>
                         </a:rPr>
                         <m:t>≈</m:t>
+                      </m:r>
+                      <m:r>
+                        <a:rPr lang="en-US" sz="2800" b="0" i="1" kern="0" smtClean="0">
+                          <a:solidFill>
+                            <a:schemeClr val="tx1"/>
+                          </a:solidFill>
+                          <a:latin typeface="Cambria Math"/>
+                        </a:rPr>
+                        <m:t>1</m:t>
+                      </m:r>
+                      <m:r>
+                        <a:rPr lang="en-US" sz="2800" b="0" i="1" kern="0" smtClean="0">
+                          <a:solidFill>
+                            <a:schemeClr val="tx1"/>
+                          </a:solidFill>
+                          <a:latin typeface="Cambria Math"/>
+                        </a:rPr>
+                        <m:t>/</m:t>
                       </m:r>
                       <m:r>
                         <a:rPr lang="en-US" sz="2800" b="0" i="1" kern="0" smtClean="0">
@@ -9628,7 +9652,7 @@
                               </a:solidFill>
                               <a:latin typeface="Cambria Math"/>
                             </a:rPr>
-                            <m:t>𝜈</m:t>
+                            <m:t>𝑇</m:t>
                           </m:r>
                         </m:e>
                         <m:sub>
@@ -9651,6 +9675,24 @@
                           <a:latin typeface="Cambria Math"/>
                         </a:rPr>
                         <m:t>≈</m:t>
+                      </m:r>
+                      <m:r>
+                        <a:rPr lang="en-US" sz="2800" b="0" i="1" kern="0" smtClean="0">
+                          <a:solidFill>
+                            <a:srgbClr val="000000"/>
+                          </a:solidFill>
+                          <a:latin typeface="Cambria Math"/>
+                        </a:rPr>
+                        <m:t>1</m:t>
+                      </m:r>
+                      <m:r>
+                        <a:rPr lang="en-US" sz="2800" b="0" i="1" kern="0" smtClean="0">
+                          <a:solidFill>
+                            <a:srgbClr val="000000"/>
+                          </a:solidFill>
+                          <a:latin typeface="Cambria Math"/>
+                        </a:rPr>
+                        <m:t>/</m:t>
                       </m:r>
                       <m:r>
                         <a:rPr lang="en-US" sz="2800" b="0" i="1" kern="0" smtClean="0">
@@ -9999,13 +10041,13 @@
                       </m:sSubPr>
                       <m:e>
                         <m:r>
-                          <a:rPr lang="en-US" sz="2800" i="1" kern="0">
+                          <a:rPr lang="en-US" sz="2800" b="0" i="1" kern="0" smtClean="0">
                             <a:solidFill>
                               <a:schemeClr val="tx1"/>
                             </a:solidFill>
                             <a:latin typeface="Cambria Math"/>
                           </a:rPr>
-                          <m:t>𝜈</m:t>
+                          <m:t>𝑇</m:t>
                         </m:r>
                       </m:e>
                       <m:sub>
@@ -10027,7 +10069,7 @@
                         </a:solidFill>
                         <a:latin typeface="Cambria Math"/>
                       </a:rPr>
-                      <m:t>&gt;</m:t>
+                      <m:t>&lt;</m:t>
                     </m:r>
                     <m:r>
                       <a:rPr lang="en-US" sz="2800" b="0" i="1" kern="0" smtClean="0">
@@ -10036,7 +10078,7 @@
                         </a:solidFill>
                         <a:latin typeface="Cambria Math"/>
                       </a:rPr>
-                      <m:t>𝜈</m:t>
+                      <m:t>𝑇</m:t>
                     </m:r>
                   </m:oMath>
                 </a14:m>
@@ -10123,7 +10165,7 @@
                     </a:solidFill>
                     <a:latin typeface="+mn-lt"/>
                   </a:rPr>
-                  <a:t>SIM increases the adaption </a:t>
+                  <a:t>SIM </a:t>
                 </a:r>
                 <a:r>
                   <a:rPr lang="en-US" sz="2800" b="1" kern="0" dirty="0" smtClean="0">
@@ -10132,16 +10174,34 @@
                     </a:solidFill>
                     <a:latin typeface="+mn-lt"/>
                   </a:rPr>
-                  <a:t>rate </a:t>
+                  <a:t>decreases </a:t>
                 </a:r>
                 <a:r>
-                  <a:rPr lang="el-GR" sz="2800" b="1" i="1" kern="0" dirty="0">
+                  <a:rPr lang="en-US" sz="2800" b="1" kern="0" dirty="0" smtClean="0">
                     <a:solidFill>
                       <a:schemeClr val="tx2"/>
                     </a:solidFill>
                     <a:latin typeface="+mn-lt"/>
                   </a:rPr>
-                  <a:t>ν</a:t>
+                  <a:t>the </a:t>
+                </a:r>
+                <a:r>
+                  <a:rPr lang="en-US" sz="2800" b="1" kern="0" dirty="0" smtClean="0">
+                    <a:solidFill>
+                      <a:schemeClr val="tx2"/>
+                    </a:solidFill>
+                    <a:latin typeface="+mn-lt"/>
+                  </a:rPr>
+                  <a:t>waiting time for adaptation </a:t>
+                </a:r>
+                <a:r>
+                  <a:rPr lang="en-US" sz="2800" b="1" i="1" kern="0" dirty="0" smtClean="0">
+                    <a:solidFill>
+                      <a:schemeClr val="tx2"/>
+                    </a:solidFill>
+                    <a:latin typeface="+mn-lt"/>
+                  </a:rPr>
+                  <a:t>T</a:t>
                 </a:r>
                 <a:r>
                   <a:rPr lang="en-US" sz="2800" b="1" kern="0" dirty="0" smtClean="0">
@@ -12731,88 +12791,6 @@
       </p:sp>
       <p:pic>
         <p:nvPicPr>
-          <p:cNvPr id="1031" name="Picture 7" descr="D:\university\confrences\GRC2013\adaptation_time_s_0.05_logN_6.png"/>
-          <p:cNvPicPr>
-            <a:picLocks noChangeAspect="1" noChangeArrowheads="1"/>
-          </p:cNvPicPr>
-          <p:nvPr/>
-        </p:nvPicPr>
-        <p:blipFill>
-          <a:blip r:embed="rId4">
-            <a:extLst>
-              <a:ext uri="{28A0092B-C50C-407E-A947-70E740481C1C}">
-                <a14:useLocalDpi xmlns:a14="http://schemas.microsoft.com/office/drawing/2010/main" val="0"/>
-              </a:ext>
-            </a:extLst>
-          </a:blip>
-          <a:srcRect/>
-          <a:stretch>
-            <a:fillRect/>
-          </a:stretch>
-        </p:blipFill>
-        <p:spPr bwMode="auto">
-          <a:xfrm>
-            <a:off x="30459112" y="18938404"/>
-            <a:ext cx="9145588" cy="7316788"/>
-          </a:xfrm>
-          <a:prstGeom prst="rect">
-            <a:avLst/>
-          </a:prstGeom>
-          <a:noFill/>
-          <a:extLst>
-            <a:ext uri="{909E8E84-426E-40DD-AFC4-6F175D3DCCD1}">
-              <a14:hiddenFill xmlns:a14="http://schemas.microsoft.com/office/drawing/2010/main">
-                <a:solidFill>
-                  <a:srgbClr val="FFFFFF"/>
-                </a:solidFill>
-              </a14:hiddenFill>
-            </a:ext>
-          </a:extLst>
-        </p:spPr>
-      </p:pic>
-      <p:pic>
-        <p:nvPicPr>
-          <p:cNvPr id="9" name="Picture 6" descr="D:\university\confrences\GRC2013\app_fix_probs_s_0.05_logN_6.png"/>
-          <p:cNvPicPr>
-            <a:picLocks noChangeAspect="1" noChangeArrowheads="1"/>
-          </p:cNvPicPr>
-          <p:nvPr/>
-        </p:nvPicPr>
-        <p:blipFill>
-          <a:blip r:embed="rId5">
-            <a:extLst>
-              <a:ext uri="{28A0092B-C50C-407E-A947-70E740481C1C}">
-                <a14:useLocalDpi xmlns:a14="http://schemas.microsoft.com/office/drawing/2010/main" val="0"/>
-              </a:ext>
-            </a:extLst>
-          </a:blip>
-          <a:srcRect/>
-          <a:stretch>
-            <a:fillRect/>
-          </a:stretch>
-        </p:blipFill>
-        <p:spPr bwMode="auto">
-          <a:xfrm>
-            <a:off x="29451572" y="8281220"/>
-            <a:ext cx="6084888" cy="9742487"/>
-          </a:xfrm>
-          <a:prstGeom prst="rect">
-            <a:avLst/>
-          </a:prstGeom>
-          <a:noFill/>
-          <a:extLst>
-            <a:ext uri="{909E8E84-426E-40DD-AFC4-6F175D3DCCD1}">
-              <a14:hiddenFill xmlns:a14="http://schemas.microsoft.com/office/drawing/2010/main">
-                <a:solidFill>
-                  <a:srgbClr val="FFFFFF"/>
-                </a:solidFill>
-              </a14:hiddenFill>
-            </a:ext>
-          </a:extLst>
-        </p:spPr>
-      </p:pic>
-      <p:pic>
-        <p:nvPicPr>
           <p:cNvPr id="17" name="Picture 13" descr="D:\university\confrences\GRC2013\fitness_landscape_analytic_model.png"/>
           <p:cNvPicPr>
             <a:picLocks noChangeAspect="1" noChangeArrowheads="1"/>
@@ -12820,7 +12798,7 @@
           <p:nvPr/>
         </p:nvPicPr>
         <p:blipFill rotWithShape="1">
-          <a:blip r:embed="rId6">
+          <a:blip r:embed="rId4">
             <a:extLst>
               <a:ext uri="{28A0092B-C50C-407E-A947-70E740481C1C}">
                 <a14:useLocalDpi xmlns:a14="http://schemas.microsoft.com/office/drawing/2010/main" val="0"/>
@@ -12859,7 +12837,7 @@
           <p:nvPr/>
         </p:nvPicPr>
         <p:blipFill rotWithShape="1">
-          <a:blip r:embed="rId7">
+          <a:blip r:embed="rId5">
             <a:extLst>
               <a:ext uri="{28A0092B-C50C-407E-A947-70E740481C1C}">
                 <a14:useLocalDpi xmlns:a14="http://schemas.microsoft.com/office/drawing/2010/main" val="0"/>
@@ -12957,7 +12935,7 @@
               <p:nvPr/>
             </p:nvPicPr>
             <p:blipFill rotWithShape="1">
-              <a:blip r:embed="rId8">
+              <a:blip r:embed="rId6">
                 <a:extLst>
                   <a:ext uri="{28A0092B-C50C-407E-A947-70E740481C1C}">
                     <a14:useLocalDpi xmlns:a14="http://schemas.microsoft.com/office/drawing/2010/main" val="0"/>
@@ -13293,7 +13271,7 @@
           <p:nvPr/>
         </p:nvPicPr>
         <p:blipFill>
-          <a:blip r:embed="rId9">
+          <a:blip r:embed="rId7">
             <a:extLst>
               <a:ext uri="{28A0092B-C50C-407E-A947-70E740481C1C}">
                 <a14:useLocalDpi xmlns:a14="http://schemas.microsoft.com/office/drawing/2010/main" val="0"/>
@@ -13458,7 +13436,7 @@
           <p:nvPr/>
         </p:nvPicPr>
         <p:blipFill>
-          <a:blip r:embed="rId10">
+          <a:blip r:embed="rId8">
             <a:extLst>
               <a:ext uri="{28A0092B-C50C-407E-A947-70E740481C1C}">
                 <a14:useLocalDpi xmlns:a14="http://schemas.microsoft.com/office/drawing/2010/main" val="0"/>
@@ -13529,7 +13507,7 @@
         </p:nvSpPr>
         <p:spPr>
           <a:xfrm>
-            <a:off x="30171652" y="8497244"/>
+            <a:off x="32259884" y="6841060"/>
             <a:ext cx="1519159" cy="830997"/>
           </a:xfrm>
           <a:prstGeom prst="rect">
@@ -13560,7 +13538,7 @@
         </p:nvSpPr>
         <p:spPr>
           <a:xfrm>
-            <a:off x="30171651" y="13066847"/>
+            <a:off x="34060084" y="6985076"/>
             <a:ext cx="1519159" cy="830997"/>
           </a:xfrm>
           <a:prstGeom prst="rect">
@@ -13583,37 +13561,6 @@
           </a:p>
         </p:txBody>
       </p:sp>
-      <p:sp>
-        <p:nvSpPr>
-          <p:cNvPr id="114" name="TextBox 113"/>
-          <p:cNvSpPr txBox="1"/>
-          <p:nvPr/>
-        </p:nvSpPr>
-        <p:spPr>
-          <a:xfrm>
-            <a:off x="30884741" y="19519539"/>
-            <a:ext cx="1519159" cy="830997"/>
-          </a:xfrm>
-          <a:prstGeom prst="rect">
-            <a:avLst/>
-          </a:prstGeom>
-          <a:noFill/>
-        </p:spPr>
-        <p:txBody>
-          <a:bodyPr wrap="square" rtlCol="1">
-            <a:spAutoFit/>
-          </a:bodyPr>
-          <a:lstStyle/>
-          <a:p>
-            <a:pPr rtl="0"/>
-            <a:r>
-              <a:rPr lang="en-US" sz="4800" dirty="0" smtClean="0"/>
-              <a:t>[8]</a:t>
-            </a:r>
-            <a:endParaRPr lang="he-IL" sz="4800" dirty="0"/>
-          </a:p>
-        </p:txBody>
-      </p:sp>
       <p:pic>
         <p:nvPicPr>
           <p:cNvPr id="1047" name="Picture 23" descr="D:\university\confrences\GRC2013\fitness_landscape_colorbar.png"/>
@@ -13623,7 +13570,7 @@
           <p:nvPr/>
         </p:nvPicPr>
         <p:blipFill rotWithShape="1">
-          <a:blip r:embed="rId11">
+          <a:blip r:embed="rId9">
             <a:extLst>
               <a:ext uri="{28A0092B-C50C-407E-A947-70E740481C1C}">
                 <a14:useLocalDpi xmlns:a14="http://schemas.microsoft.com/office/drawing/2010/main" val="0"/>
@@ -13693,7 +13640,7 @@
           <p:nvPr/>
         </p:nvPicPr>
         <p:blipFill>
-          <a:blip r:embed="rId12">
+          <a:blip r:embed="rId10">
             <a:extLst>
               <a:ext uri="{28A0092B-C50C-407E-A947-70E740481C1C}">
                 <a14:useLocalDpi xmlns:a14="http://schemas.microsoft.com/office/drawing/2010/main" val="0"/>
@@ -13734,7 +13681,7 @@
           <p:nvPr/>
         </p:nvPicPr>
         <p:blipFill>
-          <a:blip r:embed="rId13">
+          <a:blip r:embed="rId11">
             <a:extLst>
               <a:ext uri="{28A0092B-C50C-407E-A947-70E740481C1C}">
                 <a14:useLocalDpi xmlns:a14="http://schemas.microsoft.com/office/drawing/2010/main" val="0"/>
@@ -13796,7 +13743,7 @@
             <p:nvPr/>
           </p:nvPicPr>
           <p:blipFill>
-            <a:blip r:embed="rId14">
+            <a:blip r:embed="rId12">
               <a:extLst>
                 <a:ext uri="{28A0092B-C50C-407E-A947-70E740481C1C}">
                   <a14:useLocalDpi xmlns:a14="http://schemas.microsoft.com/office/drawing/2010/main" val="0"/>
@@ -13860,7 +13807,7 @@
             <p:nvPr/>
           </p:nvPicPr>
           <p:blipFill>
-            <a:blip r:embed="rId15">
+            <a:blip r:embed="rId13">
               <a:extLst>
                 <a:ext uri="{28A0092B-C50C-407E-A947-70E740481C1C}">
                   <a14:useLocalDpi xmlns:a14="http://schemas.microsoft.com/office/drawing/2010/main" val="0"/>
@@ -13924,7 +13871,7 @@
             <p:nvPr/>
           </p:nvPicPr>
           <p:blipFill>
-            <a:blip r:embed="rId16">
+            <a:blip r:embed="rId14">
               <a:extLst>
                 <a:ext uri="{28A0092B-C50C-407E-A947-70E740481C1C}">
                   <a14:useLocalDpi xmlns:a14="http://schemas.microsoft.com/office/drawing/2010/main" val="0"/>
@@ -14041,7 +13988,7 @@
           <p:nvPr/>
         </p:nvPicPr>
         <p:blipFill>
-          <a:blip r:embed="rId17">
+          <a:blip r:embed="rId15">
             <a:biLevel thresh="75000"/>
             <a:extLst>
               <a:ext uri="{28A0092B-C50C-407E-A947-70E740481C1C}">
@@ -14074,6 +14021,115 @@
           </a:extLst>
         </p:spPr>
       </p:pic>
+      <p:pic>
+        <p:nvPicPr>
+          <p:cNvPr id="1035" name="Picture 11" descr="D:\university\confrences\GRC2013\adaptation_time_s_0.05_logN_6.png"/>
+          <p:cNvPicPr>
+            <a:picLocks noChangeAspect="1" noChangeArrowheads="1"/>
+          </p:cNvPicPr>
+          <p:nvPr/>
+        </p:nvPicPr>
+        <p:blipFill>
+          <a:blip r:embed="rId16">
+            <a:extLst>
+              <a:ext uri="{28A0092B-C50C-407E-A947-70E740481C1C}">
+                <a14:useLocalDpi xmlns:a14="http://schemas.microsoft.com/office/drawing/2010/main" val="0"/>
+              </a:ext>
+            </a:extLst>
+          </a:blip>
+          <a:srcRect/>
+          <a:stretch>
+            <a:fillRect/>
+          </a:stretch>
+        </p:blipFill>
+        <p:spPr bwMode="auto">
+          <a:xfrm>
+            <a:off x="30494806" y="19182457"/>
+            <a:ext cx="9145588" cy="7316787"/>
+          </a:xfrm>
+          <a:prstGeom prst="rect">
+            <a:avLst/>
+          </a:prstGeom>
+          <a:noFill/>
+          <a:extLst>
+            <a:ext uri="{909E8E84-426E-40DD-AFC4-6F175D3DCCD1}">
+              <a14:hiddenFill xmlns:a14="http://schemas.microsoft.com/office/drawing/2010/main">
+                <a:solidFill>
+                  <a:srgbClr val="FFFFFF"/>
+                </a:solidFill>
+              </a14:hiddenFill>
+            </a:ext>
+          </a:extLst>
+        </p:spPr>
+      </p:pic>
+      <p:sp>
+        <p:nvSpPr>
+          <p:cNvPr id="114" name="TextBox 113"/>
+          <p:cNvSpPr txBox="1"/>
+          <p:nvPr/>
+        </p:nvSpPr>
+        <p:spPr>
+          <a:xfrm>
+            <a:off x="30963740" y="19835599"/>
+            <a:ext cx="1519159" cy="830997"/>
+          </a:xfrm>
+          <a:prstGeom prst="rect">
+            <a:avLst/>
+          </a:prstGeom>
+          <a:noFill/>
+        </p:spPr>
+        <p:txBody>
+          <a:bodyPr wrap="square" rtlCol="1">
+            <a:spAutoFit/>
+          </a:bodyPr>
+          <a:lstStyle/>
+          <a:p>
+            <a:pPr rtl="0"/>
+            <a:r>
+              <a:rPr lang="en-US" sz="4800" dirty="0" smtClean="0"/>
+              <a:t>[8]</a:t>
+            </a:r>
+            <a:endParaRPr lang="he-IL" sz="4800" dirty="0"/>
+          </a:p>
+        </p:txBody>
+      </p:sp>
+      <p:sp>
+        <p:nvSpPr>
+          <p:cNvPr id="7" name="Rectangle 6"/>
+          <p:cNvSpPr/>
+          <p:nvPr/>
+        </p:nvSpPr>
+        <p:spPr>
+          <a:xfrm>
+            <a:off x="32333518" y="19151384"/>
+            <a:ext cx="5468164" cy="584775"/>
+          </a:xfrm>
+          <a:prstGeom prst="rect">
+            <a:avLst/>
+          </a:prstGeom>
+        </p:spPr>
+        <p:txBody>
+          <a:bodyPr wrap="none">
+            <a:spAutoFit/>
+          </a:bodyPr>
+          <a:lstStyle/>
+          <a:p>
+            <a:pPr algn="ctr" rtl="0"/>
+            <a:r>
+              <a:rPr lang="en-US" sz="3200" b="1" kern="0" dirty="0" smtClean="0">
+                <a:solidFill>
+                  <a:schemeClr val="accent2"/>
+                </a:solidFill>
+                <a:latin typeface="+mj-lt"/>
+              </a:rPr>
+              <a:t>SIM decreases adaptation time</a:t>
+            </a:r>
+            <a:endParaRPr lang="he-IL" sz="3200" dirty="0">
+              <a:latin typeface="+mj-lt"/>
+            </a:endParaRPr>
+          </a:p>
+        </p:txBody>
+      </p:sp>
     </p:spTree>
     <p:extLst>
       <p:ext uri="{BB962C8B-B14F-4D97-AF65-F5344CB8AC3E}">

</xml_diff>